<commit_message>
GNU/Linux added and linux distribution is under construct
</commit_message>
<xml_diff>
--- a/PowerPoint/amirkabir_linux_festival.pptx
+++ b/PowerPoint/amirkabir_linux_festival.pptx
@@ -5,10 +5,10 @@
     <p:sldMasterId id="2147483648" r:id="rId1"/>
   </p:sldMasterIdLst>
   <p:notesMasterIdLst>
-    <p:notesMasterId r:id="rId19"/>
+    <p:notesMasterId r:id="rId22"/>
   </p:notesMasterIdLst>
   <p:handoutMasterIdLst>
-    <p:handoutMasterId r:id="rId20"/>
+    <p:handoutMasterId r:id="rId23"/>
   </p:handoutMasterIdLst>
   <p:sldIdLst>
     <p:sldId id="256" r:id="rId2"/>
@@ -28,6 +28,9 @@
     <p:sldId id="272" r:id="rId16"/>
     <p:sldId id="274" r:id="rId17"/>
     <p:sldId id="276" r:id="rId18"/>
+    <p:sldId id="278" r:id="rId19"/>
+    <p:sldId id="279" r:id="rId20"/>
+    <p:sldId id="280" r:id="rId21"/>
   </p:sldIdLst>
   <p:sldSz cx="12192000" cy="6858000"/>
   <p:notesSz cx="6858000" cy="9144000"/>
@@ -6358,11 +6361,7 @@
           <a:p>
             <a:r>
               <a:rPr lang="en-US" sz="2800" dirty="0" smtClean="0"/>
-              <a:t>gnu/linux</a:t>
-            </a:r>
-            <a:r>
-              <a:rPr lang="en-US" sz="2800" dirty="0" smtClean="0"/>
-              <a:t>:</a:t>
+              <a:t>gnu/linux:</a:t>
             </a:r>
             <a:endParaRPr lang="en-US" sz="2800" dirty="0"/>
           </a:p>
@@ -6377,6 +6376,639 @@
         <p:spPr>
           <a:xfrm>
             <a:off x="533400" y="1663065"/>
+            <a:ext cx="9525000" cy="646331"/>
+          </a:xfrm>
+          <a:prstGeom prst="rect">
+            <a:avLst/>
+          </a:prstGeom>
+        </p:spPr>
+        <p:txBody>
+          <a:bodyPr wrap="square">
+            <a:spAutoFit/>
+          </a:bodyPr>
+          <a:lstStyle/>
+          <a:p>
+            <a:pPr marL="285750" indent="-285750">
+              <a:buFont typeface="Arial" panose="020B0604020202020204" pitchFamily="34" charset="0"/>
+              <a:buChar char="•"/>
+            </a:pPr>
+            <a:r>
+              <a:rPr lang="en-US" dirty="0">
+                <a:solidFill>
+                  <a:schemeClr val="accent1"/>
+                </a:solidFill>
+              </a:rPr>
+              <a:t>Many computer users </a:t>
+            </a:r>
+            <a:r>
+              <a:rPr lang="en-US" dirty="0">
+                <a:solidFill>
+                  <a:schemeClr val="accent3"/>
+                </a:solidFill>
+              </a:rPr>
+              <a:t>run</a:t>
+            </a:r>
+            <a:r>
+              <a:rPr lang="en-US" dirty="0">
+                <a:solidFill>
+                  <a:schemeClr val="accent1"/>
+                </a:solidFill>
+              </a:rPr>
+              <a:t> a </a:t>
+            </a:r>
+            <a:r>
+              <a:rPr lang="en-US" dirty="0">
+                <a:solidFill>
+                  <a:schemeClr val="accent3"/>
+                </a:solidFill>
+              </a:rPr>
+              <a:t>modified</a:t>
+            </a:r>
+            <a:r>
+              <a:rPr lang="en-US" dirty="0">
+                <a:solidFill>
+                  <a:schemeClr val="accent1"/>
+                </a:solidFill>
+              </a:rPr>
+              <a:t> version of the </a:t>
+            </a:r>
+            <a:r>
+              <a:rPr lang="en-US" dirty="0">
+                <a:solidFill>
+                  <a:schemeClr val="accent3"/>
+                </a:solidFill>
+              </a:rPr>
+              <a:t>GNU</a:t>
+            </a:r>
+            <a:r>
+              <a:rPr lang="en-US" dirty="0">
+                <a:solidFill>
+                  <a:schemeClr val="accent1"/>
+                </a:solidFill>
+              </a:rPr>
+              <a:t> system </a:t>
+            </a:r>
+            <a:r>
+              <a:rPr lang="en-US" dirty="0" smtClean="0">
+                <a:solidFill>
+                  <a:schemeClr val="accent1"/>
+                </a:solidFill>
+              </a:rPr>
+              <a:t>every day</a:t>
+            </a:r>
+            <a:r>
+              <a:rPr lang="en-US" dirty="0">
+                <a:solidFill>
+                  <a:schemeClr val="accent1"/>
+                </a:solidFill>
+              </a:rPr>
+              <a:t>, without realizing it. </a:t>
+            </a:r>
+            <a:r>
+              <a:rPr lang="en-US" dirty="0" smtClean="0">
+                <a:solidFill>
+                  <a:schemeClr val="accent3"/>
+                </a:solidFill>
+              </a:rPr>
+              <a:t>the </a:t>
+            </a:r>
+            <a:r>
+              <a:rPr lang="en-US" dirty="0">
+                <a:solidFill>
+                  <a:schemeClr val="accent3"/>
+                </a:solidFill>
+              </a:rPr>
+              <a:t>version of GNU </a:t>
+            </a:r>
+            <a:r>
+              <a:rPr lang="en-US" dirty="0">
+                <a:solidFill>
+                  <a:schemeClr val="accent1"/>
+                </a:solidFill>
+              </a:rPr>
+              <a:t>which is widely used </a:t>
+            </a:r>
+            <a:r>
+              <a:rPr lang="en-US" dirty="0" smtClean="0">
+                <a:solidFill>
+                  <a:schemeClr val="accent1"/>
+                </a:solidFill>
+              </a:rPr>
+              <a:t>today </a:t>
+            </a:r>
+            <a:r>
+              <a:rPr lang="en-US" dirty="0">
+                <a:solidFill>
+                  <a:schemeClr val="accent1"/>
+                </a:solidFill>
+              </a:rPr>
+              <a:t>is often called “</a:t>
+            </a:r>
+            <a:r>
+              <a:rPr lang="en-US" dirty="0" smtClean="0">
+                <a:solidFill>
+                  <a:schemeClr val="accent3"/>
+                </a:solidFill>
+              </a:rPr>
+              <a:t>Linux</a:t>
+            </a:r>
+            <a:r>
+              <a:rPr lang="en-US" dirty="0" smtClean="0">
+                <a:solidFill>
+                  <a:schemeClr val="accent1"/>
+                </a:solidFill>
+              </a:rPr>
+              <a:t>”</a:t>
+            </a:r>
+            <a:endParaRPr lang="en-US" dirty="0">
+              <a:solidFill>
+                <a:schemeClr val="accent1"/>
+              </a:solidFill>
+            </a:endParaRPr>
+          </a:p>
+        </p:txBody>
+      </p:sp>
+      <p:sp>
+        <p:nvSpPr>
+          <p:cNvPr id="3" name="Rectangle 2"/>
+          <p:cNvSpPr/>
+          <p:nvPr/>
+        </p:nvSpPr>
+        <p:spPr>
+          <a:xfrm>
+            <a:off x="533400" y="2438400"/>
+            <a:ext cx="9525000" cy="369332"/>
+          </a:xfrm>
+          <a:prstGeom prst="rect">
+            <a:avLst/>
+          </a:prstGeom>
+        </p:spPr>
+        <p:txBody>
+          <a:bodyPr wrap="square">
+            <a:spAutoFit/>
+          </a:bodyPr>
+          <a:lstStyle/>
+          <a:p>
+            <a:pPr marL="285750" indent="-285750">
+              <a:buFont typeface="Arial" panose="020B0604020202020204" pitchFamily="34" charset="0"/>
+              <a:buChar char="•"/>
+            </a:pPr>
+            <a:r>
+              <a:rPr lang="en-US" dirty="0" smtClean="0">
+                <a:solidFill>
+                  <a:schemeClr val="accent1"/>
+                </a:solidFill>
+                <a:latin typeface="Times New Roman" panose="02020603050405020304" pitchFamily="18" charset="0"/>
+              </a:rPr>
+              <a:t> </a:t>
+            </a:r>
+            <a:r>
+              <a:rPr lang="en-US" dirty="0" smtClean="0">
+                <a:solidFill>
+                  <a:schemeClr val="accent3"/>
+                </a:solidFill>
+                <a:latin typeface="Times New Roman" panose="02020603050405020304" pitchFamily="18" charset="0"/>
+              </a:rPr>
+              <a:t>There </a:t>
+            </a:r>
+            <a:r>
+              <a:rPr lang="en-US" dirty="0">
+                <a:solidFill>
+                  <a:schemeClr val="accent3"/>
+                </a:solidFill>
+                <a:latin typeface="Times New Roman" panose="02020603050405020304" pitchFamily="18" charset="0"/>
+              </a:rPr>
+              <a:t>really is a </a:t>
+            </a:r>
+            <a:r>
+              <a:rPr lang="en-US" dirty="0" smtClean="0">
+                <a:solidFill>
+                  <a:schemeClr val="accent3"/>
+                </a:solidFill>
+                <a:latin typeface="Times New Roman" panose="02020603050405020304" pitchFamily="18" charset="0"/>
+              </a:rPr>
+              <a:t>Linux</a:t>
+            </a:r>
+            <a:r>
+              <a:rPr lang="en-US" dirty="0" smtClean="0">
+                <a:solidFill>
+                  <a:schemeClr val="accent1"/>
+                </a:solidFill>
+                <a:latin typeface="Times New Roman" panose="02020603050405020304" pitchFamily="18" charset="0"/>
+              </a:rPr>
+              <a:t>, </a:t>
+            </a:r>
+            <a:r>
+              <a:rPr lang="en-US" dirty="0">
+                <a:solidFill>
+                  <a:schemeClr val="accent1"/>
+                </a:solidFill>
+                <a:latin typeface="Times New Roman" panose="02020603050405020304" pitchFamily="18" charset="0"/>
+              </a:rPr>
+              <a:t>but it is </a:t>
+            </a:r>
+            <a:r>
+              <a:rPr lang="en-US" dirty="0">
+                <a:solidFill>
+                  <a:schemeClr val="accent3"/>
+                </a:solidFill>
+                <a:latin typeface="Times New Roman" panose="02020603050405020304" pitchFamily="18" charset="0"/>
+              </a:rPr>
+              <a:t>just a part of the system </a:t>
+            </a:r>
+            <a:r>
+              <a:rPr lang="en-US" dirty="0">
+                <a:solidFill>
+                  <a:schemeClr val="accent1"/>
+                </a:solidFill>
+                <a:latin typeface="Times New Roman" panose="02020603050405020304" pitchFamily="18" charset="0"/>
+              </a:rPr>
+              <a:t>they use. </a:t>
+            </a:r>
+            <a:r>
+              <a:rPr lang="en-US" dirty="0">
+                <a:solidFill>
+                  <a:schemeClr val="accent3"/>
+                </a:solidFill>
+                <a:latin typeface="Times New Roman" panose="02020603050405020304" pitchFamily="18" charset="0"/>
+              </a:rPr>
+              <a:t>Linux is the </a:t>
+            </a:r>
+            <a:r>
+              <a:rPr lang="en-US" dirty="0" smtClean="0">
+                <a:solidFill>
+                  <a:schemeClr val="accent3"/>
+                </a:solidFill>
+                <a:latin typeface="Times New Roman" panose="02020603050405020304" pitchFamily="18" charset="0"/>
+              </a:rPr>
+              <a:t>kernel</a:t>
+            </a:r>
+            <a:r>
+              <a:rPr lang="en-US" dirty="0" smtClean="0">
+                <a:solidFill>
+                  <a:schemeClr val="accent1"/>
+                </a:solidFill>
+                <a:latin typeface="Times New Roman" panose="02020603050405020304" pitchFamily="18" charset="0"/>
+              </a:rPr>
+              <a:t>. </a:t>
+            </a:r>
+            <a:endParaRPr lang="en-US" dirty="0">
+              <a:solidFill>
+                <a:schemeClr val="accent1"/>
+              </a:solidFill>
+            </a:endParaRPr>
+          </a:p>
+        </p:txBody>
+      </p:sp>
+      <p:sp>
+        <p:nvSpPr>
+          <p:cNvPr id="4" name="Rectangle 3"/>
+          <p:cNvSpPr/>
+          <p:nvPr/>
+        </p:nvSpPr>
+        <p:spPr>
+          <a:xfrm>
+            <a:off x="342900" y="2936736"/>
+            <a:ext cx="9715500" cy="1477328"/>
+          </a:xfrm>
+          <a:prstGeom prst="rect">
+            <a:avLst/>
+          </a:prstGeom>
+        </p:spPr>
+        <p:txBody>
+          <a:bodyPr wrap="square">
+            <a:spAutoFit/>
+          </a:bodyPr>
+          <a:lstStyle/>
+          <a:p>
+            <a:pPr marL="1200150" lvl="2" indent="-285750">
+              <a:buFont typeface="Arial" panose="020B0604020202020204" pitchFamily="34" charset="0"/>
+              <a:buChar char="•"/>
+            </a:pPr>
+            <a:r>
+              <a:rPr lang="en-US" dirty="0" smtClean="0">
+                <a:solidFill>
+                  <a:schemeClr val="accent6"/>
+                </a:solidFill>
+                <a:latin typeface="Times New Roman" panose="02020603050405020304" pitchFamily="18" charset="0"/>
+              </a:rPr>
+              <a:t>Kernel</a:t>
+            </a:r>
+            <a:r>
+              <a:rPr lang="en-US" b="1" dirty="0">
+                <a:solidFill>
+                  <a:schemeClr val="accent1"/>
+                </a:solidFill>
+                <a:latin typeface="Microsoft Sans Serif" panose="020B0604020202020204" pitchFamily="34" charset="0"/>
+              </a:rPr>
+              <a:t> </a:t>
+            </a:r>
+            <a:r>
+              <a:rPr lang="en-US" dirty="0" smtClean="0">
+                <a:solidFill>
+                  <a:schemeClr val="accent1"/>
+                </a:solidFill>
+                <a:latin typeface="Times New Roman" panose="02020603050405020304" pitchFamily="18" charset="0"/>
+                <a:cs typeface="Times New Roman" panose="02020603050405020304" pitchFamily="18" charset="0"/>
+              </a:rPr>
+              <a:t>is</a:t>
+            </a:r>
+            <a:r>
+              <a:rPr lang="en-US" b="1" dirty="0" smtClean="0">
+                <a:solidFill>
+                  <a:schemeClr val="accent1"/>
+                </a:solidFill>
+                <a:latin typeface="Microsoft Sans Serif" panose="020B0604020202020204" pitchFamily="34" charset="0"/>
+              </a:rPr>
+              <a:t> </a:t>
+            </a:r>
+            <a:r>
+              <a:rPr lang="en-US" dirty="0" smtClean="0">
+                <a:solidFill>
+                  <a:schemeClr val="accent1"/>
+                </a:solidFill>
+                <a:latin typeface="Times New Roman" panose="02020603050405020304" pitchFamily="18" charset="0"/>
+              </a:rPr>
+              <a:t>the </a:t>
+            </a:r>
+            <a:r>
+              <a:rPr lang="en-US" dirty="0">
+                <a:solidFill>
+                  <a:schemeClr val="accent1"/>
+                </a:solidFill>
+                <a:latin typeface="Times New Roman" panose="02020603050405020304" pitchFamily="18" charset="0"/>
+              </a:rPr>
+              <a:t>program in the system that </a:t>
+            </a:r>
+            <a:r>
+              <a:rPr lang="en-US" dirty="0">
+                <a:solidFill>
+                  <a:schemeClr val="accent3"/>
+                </a:solidFill>
+                <a:latin typeface="Times New Roman" panose="02020603050405020304" pitchFamily="18" charset="0"/>
+              </a:rPr>
+              <a:t>allocates</a:t>
+            </a:r>
+            <a:r>
+              <a:rPr lang="en-US" dirty="0">
+                <a:solidFill>
+                  <a:schemeClr val="accent1"/>
+                </a:solidFill>
+                <a:latin typeface="Times New Roman" panose="02020603050405020304" pitchFamily="18" charset="0"/>
+              </a:rPr>
+              <a:t> the machine's </a:t>
+            </a:r>
+            <a:r>
+              <a:rPr lang="en-US" dirty="0">
+                <a:solidFill>
+                  <a:schemeClr val="accent3"/>
+                </a:solidFill>
+                <a:latin typeface="Times New Roman" panose="02020603050405020304" pitchFamily="18" charset="0"/>
+              </a:rPr>
+              <a:t>resources</a:t>
+            </a:r>
+            <a:r>
+              <a:rPr lang="en-US" dirty="0">
+                <a:solidFill>
+                  <a:schemeClr val="accent1"/>
+                </a:solidFill>
+                <a:latin typeface="Times New Roman" panose="02020603050405020304" pitchFamily="18" charset="0"/>
+              </a:rPr>
+              <a:t> to the other </a:t>
+            </a:r>
+            <a:r>
+              <a:rPr lang="en-US" dirty="0" smtClean="0">
+                <a:solidFill>
+                  <a:schemeClr val="accent3"/>
+                </a:solidFill>
+                <a:latin typeface="Times New Roman" panose="02020603050405020304" pitchFamily="18" charset="0"/>
+              </a:rPr>
+              <a:t>programs</a:t>
+            </a:r>
+            <a:r>
+              <a:rPr lang="en-US" dirty="0" smtClean="0">
+                <a:solidFill>
+                  <a:schemeClr val="accent1"/>
+                </a:solidFill>
+                <a:latin typeface="Times New Roman" panose="02020603050405020304" pitchFamily="18" charset="0"/>
+              </a:rPr>
+              <a:t> </a:t>
+            </a:r>
+            <a:r>
+              <a:rPr lang="en-US" dirty="0">
+                <a:solidFill>
+                  <a:schemeClr val="accent1"/>
+                </a:solidFill>
+                <a:latin typeface="Times New Roman" panose="02020603050405020304" pitchFamily="18" charset="0"/>
+              </a:rPr>
+              <a:t>that you </a:t>
+            </a:r>
+            <a:r>
+              <a:rPr lang="en-US" dirty="0" smtClean="0">
+                <a:solidFill>
+                  <a:schemeClr val="accent1"/>
+                </a:solidFill>
+                <a:latin typeface="Times New Roman" panose="02020603050405020304" pitchFamily="18" charset="0"/>
+              </a:rPr>
+              <a:t>run.</a:t>
+            </a:r>
+          </a:p>
+          <a:p>
+            <a:pPr marL="1200150" lvl="2" indent="-285750">
+              <a:buFont typeface="Arial" panose="020B0604020202020204" pitchFamily="34" charset="0"/>
+              <a:buChar char="•"/>
+            </a:pPr>
+            <a:r>
+              <a:rPr lang="en-US" dirty="0">
+                <a:solidFill>
+                  <a:schemeClr val="accent6"/>
+                </a:solidFill>
+                <a:latin typeface="Times New Roman" panose="02020603050405020304" pitchFamily="18" charset="0"/>
+              </a:rPr>
+              <a:t>K</a:t>
+            </a:r>
+            <a:r>
+              <a:rPr lang="en-US" dirty="0" smtClean="0">
+                <a:solidFill>
+                  <a:schemeClr val="accent6"/>
+                </a:solidFill>
+                <a:latin typeface="Times New Roman" panose="02020603050405020304" pitchFamily="18" charset="0"/>
+              </a:rPr>
+              <a:t>ernel </a:t>
+            </a:r>
+            <a:r>
+              <a:rPr lang="en-US" dirty="0">
+                <a:solidFill>
+                  <a:schemeClr val="accent1"/>
+                </a:solidFill>
+                <a:latin typeface="Times New Roman" panose="02020603050405020304" pitchFamily="18" charset="0"/>
+              </a:rPr>
+              <a:t>is an </a:t>
+            </a:r>
+            <a:r>
+              <a:rPr lang="en-US" dirty="0">
+                <a:solidFill>
+                  <a:schemeClr val="accent3"/>
+                </a:solidFill>
+                <a:latin typeface="Times New Roman" panose="02020603050405020304" pitchFamily="18" charset="0"/>
+              </a:rPr>
+              <a:t>essential part of an operating </a:t>
+            </a:r>
+            <a:r>
+              <a:rPr lang="en-US" dirty="0" smtClean="0">
+                <a:solidFill>
+                  <a:schemeClr val="accent3"/>
+                </a:solidFill>
+                <a:latin typeface="Times New Roman" panose="02020603050405020304" pitchFamily="18" charset="0"/>
+              </a:rPr>
+              <a:t>system</a:t>
+            </a:r>
+            <a:r>
+              <a:rPr lang="en-US" dirty="0" smtClean="0">
+                <a:solidFill>
+                  <a:schemeClr val="accent1"/>
+                </a:solidFill>
+                <a:latin typeface="Times New Roman" panose="02020603050405020304" pitchFamily="18" charset="0"/>
+              </a:rPr>
+              <a:t>.</a:t>
+            </a:r>
+          </a:p>
+          <a:p>
+            <a:pPr marL="1200150" lvl="2" indent="-285750">
+              <a:buFont typeface="Arial" panose="020B0604020202020204" pitchFamily="34" charset="0"/>
+              <a:buChar char="•"/>
+            </a:pPr>
+            <a:r>
+              <a:rPr lang="en-US" dirty="0" smtClean="0">
+                <a:solidFill>
+                  <a:schemeClr val="accent6"/>
+                </a:solidFill>
+                <a:latin typeface="Times New Roman" panose="02020603050405020304" pitchFamily="18" charset="0"/>
+              </a:rPr>
+              <a:t>Kernel </a:t>
+            </a:r>
+            <a:r>
+              <a:rPr lang="en-US" dirty="0" smtClean="0">
+                <a:solidFill>
+                  <a:schemeClr val="accent1"/>
+                </a:solidFill>
+                <a:latin typeface="Times New Roman" panose="02020603050405020304" pitchFamily="18" charset="0"/>
+              </a:rPr>
+              <a:t>is </a:t>
+            </a:r>
+            <a:r>
+              <a:rPr lang="en-US" dirty="0" smtClean="0">
+                <a:solidFill>
+                  <a:schemeClr val="accent3"/>
+                </a:solidFill>
+                <a:latin typeface="Times New Roman" panose="02020603050405020304" pitchFamily="18" charset="0"/>
+              </a:rPr>
+              <a:t>useless by itself</a:t>
+            </a:r>
+            <a:r>
+              <a:rPr lang="en-US" dirty="0" smtClean="0">
+                <a:solidFill>
+                  <a:schemeClr val="accent1"/>
+                </a:solidFill>
+                <a:latin typeface="Times New Roman" panose="02020603050405020304" pitchFamily="18" charset="0"/>
+              </a:rPr>
+              <a:t>.</a:t>
+            </a:r>
+          </a:p>
+          <a:p>
+            <a:pPr marL="1200150" lvl="2" indent="-285750">
+              <a:buFont typeface="Arial" panose="020B0604020202020204" pitchFamily="34" charset="0"/>
+              <a:buChar char="•"/>
+            </a:pPr>
+            <a:r>
+              <a:rPr lang="en-US" dirty="0" smtClean="0">
+                <a:solidFill>
+                  <a:schemeClr val="accent6"/>
+                </a:solidFill>
+                <a:latin typeface="Times New Roman" panose="02020603050405020304" pitchFamily="18" charset="0"/>
+              </a:rPr>
+              <a:t>Kernel</a:t>
+            </a:r>
+            <a:r>
+              <a:rPr lang="en-US" dirty="0" smtClean="0">
+                <a:solidFill>
+                  <a:schemeClr val="accent1"/>
+                </a:solidFill>
+                <a:latin typeface="Times New Roman" panose="02020603050405020304" pitchFamily="18" charset="0"/>
+              </a:rPr>
+              <a:t> can </a:t>
+            </a:r>
+            <a:r>
+              <a:rPr lang="en-US" dirty="0">
+                <a:solidFill>
+                  <a:schemeClr val="accent1"/>
+                </a:solidFill>
+                <a:latin typeface="Times New Roman" panose="02020603050405020304" pitchFamily="18" charset="0"/>
+              </a:rPr>
+              <a:t>only </a:t>
+            </a:r>
+            <a:r>
+              <a:rPr lang="en-US" dirty="0">
+                <a:solidFill>
+                  <a:schemeClr val="accent3"/>
+                </a:solidFill>
+                <a:latin typeface="Times New Roman" panose="02020603050405020304" pitchFamily="18" charset="0"/>
+              </a:rPr>
+              <a:t>function</a:t>
+            </a:r>
+            <a:r>
+              <a:rPr lang="en-US" dirty="0">
+                <a:solidFill>
+                  <a:schemeClr val="accent1"/>
+                </a:solidFill>
+                <a:latin typeface="Times New Roman" panose="02020603050405020304" pitchFamily="18" charset="0"/>
+              </a:rPr>
+              <a:t> in the context of a complete </a:t>
+            </a:r>
+            <a:r>
+              <a:rPr lang="en-US" dirty="0">
+                <a:solidFill>
+                  <a:schemeClr val="accent3"/>
+                </a:solidFill>
+                <a:latin typeface="Times New Roman" panose="02020603050405020304" pitchFamily="18" charset="0"/>
+              </a:rPr>
+              <a:t>operating </a:t>
+            </a:r>
+            <a:r>
+              <a:rPr lang="en-US" dirty="0" smtClean="0">
+                <a:solidFill>
+                  <a:schemeClr val="accent3"/>
+                </a:solidFill>
+                <a:latin typeface="Times New Roman" panose="02020603050405020304" pitchFamily="18" charset="0"/>
+              </a:rPr>
+              <a:t>system</a:t>
+            </a:r>
+            <a:r>
+              <a:rPr lang="en-US" dirty="0" smtClean="0">
+                <a:solidFill>
+                  <a:schemeClr val="accent1"/>
+                </a:solidFill>
+                <a:latin typeface="Times New Roman" panose="02020603050405020304" pitchFamily="18" charset="0"/>
+              </a:rPr>
+              <a:t>.</a:t>
+            </a:r>
+            <a:endParaRPr lang="en-US" dirty="0">
+              <a:solidFill>
+                <a:schemeClr val="accent1"/>
+              </a:solidFill>
+            </a:endParaRPr>
+          </a:p>
+        </p:txBody>
+      </p:sp>
+      <p:sp>
+        <p:nvSpPr>
+          <p:cNvPr id="5" name="Rectangle 4"/>
+          <p:cNvSpPr/>
+          <p:nvPr/>
+        </p:nvSpPr>
+        <p:spPr>
+          <a:xfrm>
+            <a:off x="533400" y="4495800"/>
             <a:ext cx="9525000" cy="923330"/>
           </a:xfrm>
           <a:prstGeom prst="rect">
@@ -6398,56 +7030,300 @@
                 <a:solidFill>
                   <a:schemeClr val="accent1"/>
                 </a:solidFill>
-              </a:rPr>
-              <a:t>Many computer users run a modified version of the GNU system every day, without realizing it. </a:t>
-            </a:r>
-            <a:r>
-              <a:rPr lang="en-US" dirty="0" smtClean="0">
-                <a:solidFill>
-                  <a:schemeClr val="accent1"/>
-                </a:solidFill>
-              </a:rPr>
-              <a:t>the </a:t>
-            </a:r>
-            <a:r>
-              <a:rPr lang="en-US" dirty="0">
-                <a:solidFill>
-                  <a:schemeClr val="accent1"/>
-                </a:solidFill>
-              </a:rPr>
-              <a:t>version of GNU which is widely used </a:t>
-            </a:r>
-            <a:r>
-              <a:rPr lang="en-US" dirty="0" smtClean="0">
-                <a:solidFill>
-                  <a:schemeClr val="accent1"/>
-                </a:solidFill>
-              </a:rPr>
-              <a:t>today </a:t>
-            </a:r>
-            <a:r>
-              <a:rPr lang="en-US" dirty="0">
-                <a:solidFill>
-                  <a:schemeClr val="accent1"/>
-                </a:solidFill>
-              </a:rPr>
-              <a:t>is often called “</a:t>
-            </a:r>
-            <a:r>
-              <a:rPr lang="en-US" dirty="0" smtClean="0">
-                <a:solidFill>
-                  <a:schemeClr val="accent1"/>
-                </a:solidFill>
-              </a:rPr>
-              <a:t>Linux”, and many of its users are not aware that it is basically the GNU system, developed </a:t>
-            </a:r>
-            <a:r>
-              <a:rPr lang="en-US" dirty="0">
-                <a:solidFill>
-                  <a:schemeClr val="accent1"/>
-                </a:solidFill>
-              </a:rPr>
-              <a:t>by the GNU Project.</a:t>
+                <a:latin typeface="Times New Roman" panose="02020603050405020304" pitchFamily="18" charset="0"/>
+              </a:rPr>
+              <a:t>Linux is normally used in combination with the</a:t>
+            </a:r>
+            <a:r>
+              <a:rPr lang="en-US" dirty="0">
+                <a:solidFill>
+                  <a:schemeClr val="accent3"/>
+                </a:solidFill>
+                <a:latin typeface="Times New Roman" panose="02020603050405020304" pitchFamily="18" charset="0"/>
+              </a:rPr>
+              <a:t> GNU operating system</a:t>
+            </a:r>
+            <a:r>
+              <a:rPr lang="en-US" dirty="0">
+                <a:solidFill>
+                  <a:schemeClr val="accent1"/>
+                </a:solidFill>
+                <a:latin typeface="Times New Roman" panose="02020603050405020304" pitchFamily="18" charset="0"/>
+              </a:rPr>
+              <a:t>: the whole system is basically </a:t>
+            </a:r>
+            <a:r>
+              <a:rPr lang="en-US" dirty="0">
+                <a:solidFill>
+                  <a:schemeClr val="accent3"/>
+                </a:solidFill>
+                <a:latin typeface="Times New Roman" panose="02020603050405020304" pitchFamily="18" charset="0"/>
+              </a:rPr>
+              <a:t>GNU with Linux added</a:t>
+            </a:r>
+            <a:r>
+              <a:rPr lang="en-US" dirty="0">
+                <a:solidFill>
+                  <a:schemeClr val="accent1"/>
+                </a:solidFill>
+                <a:latin typeface="Times New Roman" panose="02020603050405020304" pitchFamily="18" charset="0"/>
+              </a:rPr>
+              <a:t>, or GNU/Linux. All the </a:t>
+            </a:r>
+            <a:r>
+              <a:rPr lang="en-US" dirty="0">
+                <a:solidFill>
+                  <a:schemeClr val="accent3"/>
+                </a:solidFill>
+                <a:latin typeface="Times New Roman" panose="02020603050405020304" pitchFamily="18" charset="0"/>
+              </a:rPr>
+              <a:t>so-called “Linux” distributions are really distributions of GNU/Linux.</a:t>
+            </a:r>
+            <a:endParaRPr lang="en-US" dirty="0">
+              <a:solidFill>
+                <a:schemeClr val="accent3"/>
+              </a:solidFill>
+            </a:endParaRPr>
+          </a:p>
+        </p:txBody>
+      </p:sp>
+    </p:spTree>
+    <p:extLst>
+      <p:ext uri="{BB962C8B-B14F-4D97-AF65-F5344CB8AC3E}">
+        <p14:creationId xmlns:p14="http://schemas.microsoft.com/office/powerpoint/2010/main" val="887535324"/>
+      </p:ext>
+    </p:extLst>
+  </p:cSld>
+  <p:clrMapOvr>
+    <a:masterClrMapping/>
+  </p:clrMapOvr>
+  <p:timing>
+    <p:tnLst>
+      <p:par>
+        <p:cTn id="1" dur="indefinite" restart="never" nodeType="tmRoot"/>
+      </p:par>
+    </p:tnLst>
+  </p:timing>
+</p:sld>
+</file>
+
+<file path=ppt/slides/slide18.xml><?xml version="1.0" encoding="utf-8"?>
+<p:sld xmlns:a="http://schemas.openxmlformats.org/drawingml/2006/main" xmlns:r="http://schemas.openxmlformats.org/officeDocument/2006/relationships" xmlns:p="http://schemas.openxmlformats.org/presentationml/2006/main">
+  <p:cSld>
+    <p:spTree>
+      <p:nvGrpSpPr>
+        <p:cNvPr id="1" name=""/>
+        <p:cNvGrpSpPr/>
+        <p:nvPr/>
+      </p:nvGrpSpPr>
+      <p:grpSpPr>
+        <a:xfrm>
+          <a:off x="0" y="0"/>
+          <a:ext cx="0" cy="0"/>
+          <a:chOff x="0" y="0"/>
+          <a:chExt cx="0" cy="0"/>
+        </a:xfrm>
+      </p:grpSpPr>
+      <p:sp>
+        <p:nvSpPr>
+          <p:cNvPr id="2" name="Title 1"/>
+          <p:cNvSpPr>
+            <a:spLocks noGrp="1"/>
+          </p:cNvSpPr>
+          <p:nvPr>
+            <p:ph type="title"/>
+          </p:nvPr>
+        </p:nvSpPr>
+        <p:spPr>
+          <a:xfrm>
+            <a:off x="1447800" y="2895600"/>
+            <a:ext cx="9144000" cy="685800"/>
+          </a:xfrm>
+        </p:spPr>
+        <p:txBody>
+          <a:bodyPr/>
+          <a:lstStyle/>
+          <a:p>
+            <a:pPr algn="ctr"/>
+            <a:r>
+              <a:rPr lang="en-US" dirty="0" smtClean="0">
+                <a:solidFill>
+                  <a:schemeClr val="accent5"/>
+                </a:solidFill>
+              </a:rPr>
+              <a:t>linux_distribution</a:t>
+            </a:r>
+            <a:endParaRPr lang="en-US" dirty="0">
+              <a:solidFill>
+                <a:schemeClr val="accent5"/>
+              </a:solidFill>
+            </a:endParaRPr>
+          </a:p>
+        </p:txBody>
+      </p:sp>
+    </p:spTree>
+    <p:extLst>
+      <p:ext uri="{BB962C8B-B14F-4D97-AF65-F5344CB8AC3E}">
+        <p14:creationId xmlns:p14="http://schemas.microsoft.com/office/powerpoint/2010/main" val="3710185661"/>
+      </p:ext>
+    </p:extLst>
+  </p:cSld>
+  <p:clrMapOvr>
+    <a:masterClrMapping/>
+  </p:clrMapOvr>
+  <p:timing>
+    <p:tnLst>
+      <p:par>
+        <p:cTn id="1" dur="indefinite" restart="never" nodeType="tmRoot"/>
+      </p:par>
+    </p:tnLst>
+  </p:timing>
+</p:sld>
+</file>
+
+<file path=ppt/slides/slide19.xml><?xml version="1.0" encoding="utf-8"?>
+<p:sld xmlns:a="http://schemas.openxmlformats.org/drawingml/2006/main" xmlns:r="http://schemas.openxmlformats.org/officeDocument/2006/relationships" xmlns:p="http://schemas.openxmlformats.org/presentationml/2006/main">
+  <p:cSld>
+    <p:spTree>
+      <p:nvGrpSpPr>
+        <p:cNvPr id="1" name=""/>
+        <p:cNvGrpSpPr/>
+        <p:nvPr/>
+      </p:nvGrpSpPr>
+      <p:grpSpPr>
+        <a:xfrm>
+          <a:off x="0" y="0"/>
+          <a:ext cx="0" cy="0"/>
+          <a:chOff x="0" y="0"/>
+          <a:chExt cx="0" cy="0"/>
+        </a:xfrm>
+      </p:grpSpPr>
+      <p:sp>
+        <p:nvSpPr>
+          <p:cNvPr id="2" name="Title 1"/>
+          <p:cNvSpPr>
+            <a:spLocks noGrp="1"/>
+          </p:cNvSpPr>
+          <p:nvPr>
+            <p:ph type="title"/>
+          </p:nvPr>
+        </p:nvSpPr>
+        <p:spPr>
+          <a:xfrm>
+            <a:off x="533400" y="838200"/>
+            <a:ext cx="4495800" cy="457200"/>
+          </a:xfrm>
+        </p:spPr>
+        <p:txBody>
+          <a:bodyPr>
+            <a:normAutofit fontScale="90000"/>
+          </a:bodyPr>
+          <a:lstStyle/>
+          <a:p>
+            <a:r>
+              <a:rPr lang="en-US" sz="2800" dirty="0" smtClean="0"/>
+              <a:t>linux_distributions:</a:t>
+            </a:r>
+            <a:endParaRPr lang="en-US" sz="2800" dirty="0"/>
+          </a:p>
+        </p:txBody>
+      </p:sp>
+      <p:sp>
+        <p:nvSpPr>
+          <p:cNvPr id="18" name="Rectangle 17"/>
+          <p:cNvSpPr/>
+          <p:nvPr/>
+        </p:nvSpPr>
+        <p:spPr>
+          <a:xfrm>
+            <a:off x="533400" y="1663065"/>
+            <a:ext cx="9677400" cy="646331"/>
+          </a:xfrm>
+          <a:prstGeom prst="rect">
+            <a:avLst/>
+          </a:prstGeom>
+        </p:spPr>
+        <p:txBody>
+          <a:bodyPr wrap="square">
+            <a:spAutoFit/>
+          </a:bodyPr>
+          <a:lstStyle/>
+          <a:p>
+            <a:pPr marL="285750" indent="-285750">
+              <a:buFont typeface="Arial" panose="020B0604020202020204" pitchFamily="34" charset="0"/>
+              <a:buChar char="•"/>
+            </a:pPr>
+            <a:r>
+              <a:rPr lang="en-US" dirty="0" smtClean="0">
+                <a:solidFill>
+                  <a:schemeClr val="accent1"/>
+                </a:solidFill>
+              </a:rPr>
+              <a:t>A linux distribution consists of the </a:t>
+            </a:r>
+            <a:r>
+              <a:rPr lang="en-US" dirty="0" smtClean="0">
+                <a:solidFill>
+                  <a:schemeClr val="accent3"/>
+                </a:solidFill>
+              </a:rPr>
+              <a:t>components</a:t>
+            </a:r>
+            <a:r>
+              <a:rPr lang="en-US" dirty="0" smtClean="0">
+                <a:solidFill>
+                  <a:schemeClr val="accent1"/>
+                </a:solidFill>
+              </a:rPr>
+              <a:t> needed to </a:t>
+            </a:r>
+            <a:r>
+              <a:rPr lang="en-US" dirty="0" smtClean="0">
+                <a:solidFill>
+                  <a:schemeClr val="accent3"/>
+                </a:solidFill>
+              </a:rPr>
+              <a:t>create a working linux </a:t>
+            </a:r>
+            <a:r>
+              <a:rPr lang="en-US" dirty="0" smtClean="0">
+                <a:solidFill>
+                  <a:schemeClr val="accent1"/>
+                </a:solidFill>
+              </a:rPr>
+              <a:t>system and the </a:t>
+            </a:r>
+            <a:r>
+              <a:rPr lang="en-US" dirty="0" smtClean="0">
+                <a:solidFill>
+                  <a:schemeClr val="accent3"/>
+                </a:solidFill>
+              </a:rPr>
+              <a:t>procedure</a:t>
+            </a:r>
+            <a:r>
+              <a:rPr lang="en-US" dirty="0" smtClean="0">
+                <a:solidFill>
+                  <a:schemeClr val="accent1"/>
+                </a:solidFill>
+              </a:rPr>
+              <a:t> needed  to get those </a:t>
+            </a:r>
+            <a:r>
+              <a:rPr lang="en-US" dirty="0" smtClean="0">
+                <a:solidFill>
+                  <a:schemeClr val="accent3"/>
+                </a:solidFill>
+              </a:rPr>
+              <a:t>components installed </a:t>
+            </a:r>
+            <a:r>
+              <a:rPr lang="en-US" dirty="0" smtClean="0">
+                <a:solidFill>
+                  <a:schemeClr val="accent1"/>
+                </a:solidFill>
+              </a:rPr>
+              <a:t>and running.</a:t>
             </a:r>
             <a:endParaRPr lang="en-US" dirty="0">
               <a:solidFill>
@@ -6457,10 +7333,378 @@
           </a:p>
         </p:txBody>
       </p:sp>
+      <p:sp>
+        <p:nvSpPr>
+          <p:cNvPr id="3" name="Rectangle 2"/>
+          <p:cNvSpPr/>
+          <p:nvPr/>
+        </p:nvSpPr>
+        <p:spPr>
+          <a:xfrm>
+            <a:off x="533400" y="2438400"/>
+            <a:ext cx="9525000" cy="646331"/>
+          </a:xfrm>
+          <a:prstGeom prst="rect">
+            <a:avLst/>
+          </a:prstGeom>
+        </p:spPr>
+        <p:txBody>
+          <a:bodyPr wrap="square">
+            <a:spAutoFit/>
+          </a:bodyPr>
+          <a:lstStyle/>
+          <a:p>
+            <a:pPr marL="285750" indent="-285750">
+              <a:buFont typeface="Arial" panose="020B0604020202020204" pitchFamily="34" charset="0"/>
+              <a:buChar char="•"/>
+            </a:pPr>
+            <a:r>
+              <a:rPr lang="en-US" dirty="0" smtClean="0">
+                <a:solidFill>
+                  <a:schemeClr val="accent1"/>
+                </a:solidFill>
+                <a:latin typeface="Times New Roman" panose="02020603050405020304" pitchFamily="18" charset="0"/>
+              </a:rPr>
+              <a:t>Diffrent distributions are </a:t>
+            </a:r>
+            <a:r>
+              <a:rPr lang="en-US" dirty="0" smtClean="0">
+                <a:solidFill>
+                  <a:schemeClr val="accent3"/>
+                </a:solidFill>
+                <a:latin typeface="Times New Roman" panose="02020603050405020304" pitchFamily="18" charset="0"/>
+              </a:rPr>
+              <a:t>diffrent combination </a:t>
+            </a:r>
+            <a:r>
+              <a:rPr lang="en-US" dirty="0" smtClean="0">
+                <a:solidFill>
+                  <a:schemeClr val="accent1"/>
+                </a:solidFill>
+                <a:latin typeface="Times New Roman" panose="02020603050405020304" pitchFamily="18" charset="0"/>
+              </a:rPr>
+              <a:t>of </a:t>
+            </a:r>
+            <a:r>
+              <a:rPr lang="en-US" dirty="0" smtClean="0">
+                <a:solidFill>
+                  <a:schemeClr val="accent3"/>
+                </a:solidFill>
+                <a:latin typeface="Times New Roman" panose="02020603050405020304" pitchFamily="18" charset="0"/>
+              </a:rPr>
+              <a:t>linux kernel version</a:t>
+            </a:r>
+            <a:r>
+              <a:rPr lang="en-US" dirty="0" smtClean="0">
+                <a:solidFill>
+                  <a:schemeClr val="accent1"/>
+                </a:solidFill>
+                <a:latin typeface="Times New Roman" panose="02020603050405020304" pitchFamily="18" charset="0"/>
+              </a:rPr>
+              <a:t>, </a:t>
+            </a:r>
+            <a:r>
+              <a:rPr lang="en-US" dirty="0" smtClean="0">
+                <a:solidFill>
+                  <a:schemeClr val="accent3"/>
+                </a:solidFill>
+                <a:latin typeface="Times New Roman" panose="02020603050405020304" pitchFamily="18" charset="0"/>
+              </a:rPr>
+              <a:t>GNU tools</a:t>
+            </a:r>
+            <a:r>
+              <a:rPr lang="en-US" dirty="0" smtClean="0">
+                <a:solidFill>
+                  <a:schemeClr val="accent1"/>
+                </a:solidFill>
+                <a:latin typeface="Times New Roman" panose="02020603050405020304" pitchFamily="18" charset="0"/>
+              </a:rPr>
+              <a:t>, </a:t>
+            </a:r>
+            <a:r>
+              <a:rPr lang="en-US" dirty="0" smtClean="0">
+                <a:solidFill>
+                  <a:schemeClr val="accent3"/>
+                </a:solidFill>
+                <a:latin typeface="Times New Roman" panose="02020603050405020304" pitchFamily="18" charset="0"/>
+              </a:rPr>
+              <a:t>management tools</a:t>
+            </a:r>
+            <a:r>
+              <a:rPr lang="en-US" dirty="0" smtClean="0">
+                <a:solidFill>
+                  <a:schemeClr val="accent1"/>
+                </a:solidFill>
+                <a:latin typeface="Times New Roman" panose="02020603050405020304" pitchFamily="18" charset="0"/>
+              </a:rPr>
+              <a:t> and </a:t>
+            </a:r>
+            <a:r>
+              <a:rPr lang="en-US" dirty="0" smtClean="0">
+                <a:solidFill>
+                  <a:schemeClr val="accent3"/>
+                </a:solidFill>
+                <a:latin typeface="Times New Roman" panose="02020603050405020304" pitchFamily="18" charset="0"/>
+              </a:rPr>
+              <a:t>other tools</a:t>
+            </a:r>
+            <a:endParaRPr lang="en-US" dirty="0">
+              <a:solidFill>
+                <a:schemeClr val="accent3"/>
+              </a:solidFill>
+            </a:endParaRPr>
+          </a:p>
+        </p:txBody>
+      </p:sp>
+      <p:sp>
+        <p:nvSpPr>
+          <p:cNvPr id="6" name="Rectangle 5"/>
+          <p:cNvSpPr/>
+          <p:nvPr/>
+        </p:nvSpPr>
+        <p:spPr>
+          <a:xfrm>
+            <a:off x="838200" y="4312077"/>
+            <a:ext cx="9677400" cy="646331"/>
+          </a:xfrm>
+          <a:prstGeom prst="rect">
+            <a:avLst/>
+          </a:prstGeom>
+        </p:spPr>
+        <p:txBody>
+          <a:bodyPr wrap="square">
+            <a:spAutoFit/>
+          </a:bodyPr>
+          <a:lstStyle/>
+          <a:p>
+            <a:pPr marL="742950" lvl="1" indent="-285750">
+              <a:buFont typeface="Arial" panose="020B0604020202020204" pitchFamily="34" charset="0"/>
+              <a:buChar char="•"/>
+            </a:pPr>
+            <a:r>
+              <a:rPr lang="en-US" dirty="0" smtClean="0">
+                <a:solidFill>
+                  <a:schemeClr val="accent2"/>
+                </a:solidFill>
+              </a:rPr>
+              <a:t>differ based </a:t>
+            </a:r>
+            <a:r>
+              <a:rPr lang="en-US" dirty="0">
+                <a:solidFill>
+                  <a:schemeClr val="accent2"/>
+                </a:solidFill>
+              </a:rPr>
+              <a:t>on which desktop </a:t>
+            </a:r>
+            <a:r>
+              <a:rPr lang="en-US" dirty="0" smtClean="0">
+                <a:solidFill>
+                  <a:schemeClr val="accent2"/>
+                </a:solidFill>
+              </a:rPr>
+              <a:t>environment: </a:t>
+            </a:r>
+            <a:r>
+              <a:rPr lang="en-US" dirty="0" smtClean="0">
+                <a:solidFill>
+                  <a:schemeClr val="accent1"/>
+                </a:solidFill>
+              </a:rPr>
+              <a:t>This </a:t>
+            </a:r>
+            <a:r>
+              <a:rPr lang="en-US" dirty="0">
+                <a:solidFill>
+                  <a:schemeClr val="accent1"/>
+                </a:solidFill>
+              </a:rPr>
+              <a:t>case is seen with </a:t>
+            </a:r>
+            <a:r>
+              <a:rPr lang="en-US" dirty="0">
+                <a:solidFill>
+                  <a:schemeClr val="accent3"/>
+                </a:solidFill>
+              </a:rPr>
+              <a:t>Ubuntu</a:t>
+            </a:r>
+            <a:r>
+              <a:rPr lang="en-US" dirty="0">
+                <a:solidFill>
+                  <a:schemeClr val="accent1"/>
+                </a:solidFill>
+              </a:rPr>
+              <a:t>, where Ubuntu uses </a:t>
+            </a:r>
+            <a:r>
+              <a:rPr lang="en-US" dirty="0">
+                <a:solidFill>
+                  <a:schemeClr val="accent3"/>
+                </a:solidFill>
+              </a:rPr>
+              <a:t>Gnome/Unity</a:t>
+            </a:r>
+            <a:r>
+              <a:rPr lang="en-US" dirty="0">
+                <a:solidFill>
+                  <a:schemeClr val="accent1"/>
+                </a:solidFill>
+              </a:rPr>
+              <a:t>, Kubuntu uses </a:t>
+            </a:r>
+            <a:r>
+              <a:rPr lang="en-US" dirty="0">
+                <a:solidFill>
+                  <a:schemeClr val="accent3"/>
+                </a:solidFill>
+              </a:rPr>
+              <a:t>KDE</a:t>
+            </a:r>
+            <a:r>
+              <a:rPr lang="en-US" dirty="0">
+                <a:solidFill>
+                  <a:schemeClr val="accent1"/>
+                </a:solidFill>
+              </a:rPr>
+              <a:t>, Xubuntu uses </a:t>
+            </a:r>
+            <a:r>
+              <a:rPr lang="en-US" dirty="0">
+                <a:solidFill>
+                  <a:schemeClr val="accent3"/>
+                </a:solidFill>
+              </a:rPr>
+              <a:t>Xfce</a:t>
+            </a:r>
+            <a:r>
+              <a:rPr lang="en-US" dirty="0">
+                <a:solidFill>
+                  <a:schemeClr val="accent1"/>
+                </a:solidFill>
+              </a:rPr>
+              <a:t>, Lubuntu uses </a:t>
+            </a:r>
+            <a:r>
+              <a:rPr lang="en-US" dirty="0">
+                <a:solidFill>
+                  <a:schemeClr val="accent3"/>
+                </a:solidFill>
+              </a:rPr>
+              <a:t>LXDE</a:t>
+            </a:r>
+            <a:r>
+              <a:rPr lang="en-US" dirty="0">
+                <a:solidFill>
+                  <a:schemeClr val="accent1"/>
+                </a:solidFill>
+              </a:rPr>
+              <a:t>, and so on.</a:t>
+            </a:r>
+            <a:endParaRPr lang="en-US" dirty="0">
+              <a:solidFill>
+                <a:schemeClr val="accent1"/>
+              </a:solidFill>
+            </a:endParaRPr>
+          </a:p>
+        </p:txBody>
+      </p:sp>
+      <p:sp>
+        <p:nvSpPr>
+          <p:cNvPr id="8" name="Rectangle 7"/>
+          <p:cNvSpPr/>
+          <p:nvPr/>
+        </p:nvSpPr>
+        <p:spPr>
+          <a:xfrm>
+            <a:off x="838200" y="3359592"/>
+            <a:ext cx="9677400" cy="923330"/>
+          </a:xfrm>
+          <a:prstGeom prst="rect">
+            <a:avLst/>
+          </a:prstGeom>
+        </p:spPr>
+        <p:txBody>
+          <a:bodyPr wrap="square">
+            <a:spAutoFit/>
+          </a:bodyPr>
+          <a:lstStyle/>
+          <a:p>
+            <a:pPr marL="742950" lvl="1" indent="-285750">
+              <a:buFont typeface="Arial" panose="020B0604020202020204" pitchFamily="34" charset="0"/>
+              <a:buChar char="•"/>
+            </a:pPr>
+            <a:r>
+              <a:rPr lang="en-US" dirty="0">
+                <a:solidFill>
+                  <a:schemeClr val="accent2"/>
+                </a:solidFill>
+              </a:rPr>
+              <a:t>For the display manager </a:t>
+            </a:r>
+            <a:r>
+              <a:rPr lang="en-US" dirty="0" smtClean="0">
+                <a:solidFill>
+                  <a:schemeClr val="accent2"/>
+                </a:solidFill>
+              </a:rPr>
+              <a:t>example: </a:t>
+            </a:r>
+            <a:r>
+              <a:rPr lang="en-US" dirty="0" smtClean="0">
+                <a:solidFill>
+                  <a:schemeClr val="accent1"/>
+                </a:solidFill>
+              </a:rPr>
+              <a:t>a </a:t>
+            </a:r>
+            <a:r>
+              <a:rPr lang="en-US" dirty="0">
+                <a:solidFill>
+                  <a:schemeClr val="accent1"/>
+                </a:solidFill>
+              </a:rPr>
+              <a:t>distribution could continue to use </a:t>
+            </a:r>
+            <a:r>
+              <a:rPr lang="en-US" dirty="0">
+                <a:solidFill>
+                  <a:schemeClr val="accent3"/>
+                </a:solidFill>
+              </a:rPr>
+              <a:t>X.Org’s X-Server </a:t>
+            </a:r>
+            <a:r>
+              <a:rPr lang="en-US" dirty="0">
+                <a:solidFill>
+                  <a:schemeClr val="accent1"/>
+                </a:solidFill>
+              </a:rPr>
+              <a:t>because it has been the standard for the past few decades, or the distribution could use </a:t>
+            </a:r>
+            <a:r>
+              <a:rPr lang="en-US" dirty="0">
+                <a:solidFill>
+                  <a:schemeClr val="accent3"/>
+                </a:solidFill>
+              </a:rPr>
+              <a:t>Wayland</a:t>
+            </a:r>
+            <a:r>
+              <a:rPr lang="en-US" dirty="0">
+                <a:solidFill>
+                  <a:schemeClr val="accent1"/>
+                </a:solidFill>
+              </a:rPr>
+              <a:t> instead because it provides new features and other needed updates</a:t>
+            </a:r>
+          </a:p>
+        </p:txBody>
+      </p:sp>
     </p:spTree>
     <p:extLst>
       <p:ext uri="{BB962C8B-B14F-4D97-AF65-F5344CB8AC3E}">
-        <p14:creationId xmlns:p14="http://schemas.microsoft.com/office/powerpoint/2010/main" val="887535324"/>
+        <p14:creationId xmlns:p14="http://schemas.microsoft.com/office/powerpoint/2010/main" val="2066988315"/>
       </p:ext>
     </p:extLst>
   </p:cSld>
@@ -6548,6 +7792,36 @@
       </p:par>
     </p:tnLst>
   </p:timing>
+</p:sld>
+</file>
+
+<file path=ppt/slides/slide20.xml><?xml version="1.0" encoding="utf-8"?>
+<p:sld xmlns:a="http://schemas.openxmlformats.org/drawingml/2006/main" xmlns:r="http://schemas.openxmlformats.org/officeDocument/2006/relationships" xmlns:p="http://schemas.openxmlformats.org/presentationml/2006/main">
+  <p:cSld>
+    <p:spTree>
+      <p:nvGrpSpPr>
+        <p:cNvPr id="1" name=""/>
+        <p:cNvGrpSpPr/>
+        <p:nvPr/>
+      </p:nvGrpSpPr>
+      <p:grpSpPr>
+        <a:xfrm>
+          <a:off x="0" y="0"/>
+          <a:ext cx="0" cy="0"/>
+          <a:chOff x="0" y="0"/>
+          <a:chExt cx="0" cy="0"/>
+        </a:xfrm>
+      </p:grpSpPr>
+    </p:spTree>
+    <p:extLst>
+      <p:ext uri="{BB962C8B-B14F-4D97-AF65-F5344CB8AC3E}">
+        <p14:creationId xmlns:p14="http://schemas.microsoft.com/office/powerpoint/2010/main" val="992394703"/>
+      </p:ext>
+    </p:extLst>
+  </p:cSld>
+  <p:clrMapOvr>
+    <a:masterClrMapping/>
+  </p:clrMapOvr>
 </p:sld>
 </file>
 

</xml_diff>

<commit_message>
Debian added ubuntu started
</commit_message>
<xml_diff>
--- a/PowerPoint/amirkabir_linux_festival.pptx
+++ b/PowerPoint/amirkabir_linux_festival.pptx
@@ -5,10 +5,10 @@
     <p:sldMasterId id="2147483648" r:id="rId1"/>
   </p:sldMasterIdLst>
   <p:notesMasterIdLst>
-    <p:notesMasterId r:id="rId22"/>
+    <p:notesMasterId r:id="rId24"/>
   </p:notesMasterIdLst>
   <p:handoutMasterIdLst>
-    <p:handoutMasterId r:id="rId23"/>
+    <p:handoutMasterId r:id="rId25"/>
   </p:handoutMasterIdLst>
   <p:sldIdLst>
     <p:sldId id="256" r:id="rId2"/>
@@ -30,7 +30,9 @@
     <p:sldId id="276" r:id="rId18"/>
     <p:sldId id="278" r:id="rId19"/>
     <p:sldId id="279" r:id="rId20"/>
-    <p:sldId id="280" r:id="rId21"/>
+    <p:sldId id="282" r:id="rId21"/>
+    <p:sldId id="283" r:id="rId22"/>
+    <p:sldId id="281" r:id="rId23"/>
   </p:sldIdLst>
   <p:sldSz cx="12192000" cy="6858000"/>
   <p:notesSz cx="6858000" cy="9144000"/>
@@ -7211,7 +7213,7 @@
         <p:spPr>
           <a:xfrm>
             <a:off x="533400" y="838200"/>
-            <a:ext cx="4495800" cy="457200"/>
+            <a:ext cx="5943600" cy="457200"/>
           </a:xfrm>
         </p:spPr>
         <p:txBody>
@@ -7221,8 +7223,16 @@
           <a:lstStyle/>
           <a:p>
             <a:r>
+              <a:rPr lang="en-US" sz="2800" dirty="0"/>
+              <a:t>w</a:t>
+            </a:r>
+            <a:r>
               <a:rPr lang="en-US" sz="2800" dirty="0" smtClean="0"/>
-              <a:t>linux_distributions:</a:t>
+              <a:t>hat_are_linux_distributions</a:t>
+            </a:r>
+            <a:r>
+              <a:rPr lang="en-US" sz="2800" dirty="0" smtClean="0"/>
+              <a:t>:</a:t>
             </a:r>
             <a:endParaRPr lang="en-US" sz="2800" dirty="0"/>
           </a:p>
@@ -7812,16 +7822,1133 @@
           <a:chExt cx="0" cy="0"/>
         </a:xfrm>
       </p:grpSpPr>
+      <p:sp>
+        <p:nvSpPr>
+          <p:cNvPr id="2" name="Title 1"/>
+          <p:cNvSpPr>
+            <a:spLocks noGrp="1"/>
+          </p:cNvSpPr>
+          <p:nvPr>
+            <p:ph type="title"/>
+          </p:nvPr>
+        </p:nvSpPr>
+        <p:spPr>
+          <a:xfrm>
+            <a:off x="533400" y="838200"/>
+            <a:ext cx="4495800" cy="457200"/>
+          </a:xfrm>
+        </p:spPr>
+        <p:txBody>
+          <a:bodyPr>
+            <a:normAutofit fontScale="90000"/>
+          </a:bodyPr>
+          <a:lstStyle/>
+          <a:p>
+            <a:r>
+              <a:rPr lang="en-US" sz="2800" dirty="0" smtClean="0"/>
+              <a:t>debian:</a:t>
+            </a:r>
+            <a:endParaRPr lang="en-US" sz="2800" dirty="0"/>
+          </a:p>
+        </p:txBody>
+      </p:sp>
+      <p:sp>
+        <p:nvSpPr>
+          <p:cNvPr id="18" name="Rectangle 17"/>
+          <p:cNvSpPr/>
+          <p:nvPr/>
+        </p:nvSpPr>
+        <p:spPr>
+          <a:xfrm>
+            <a:off x="685800" y="1655891"/>
+            <a:ext cx="9829800" cy="3139321"/>
+          </a:xfrm>
+          <a:prstGeom prst="rect">
+            <a:avLst/>
+          </a:prstGeom>
+        </p:spPr>
+        <p:txBody>
+          <a:bodyPr wrap="square">
+            <a:spAutoFit/>
+          </a:bodyPr>
+          <a:lstStyle/>
+          <a:p>
+            <a:pPr marL="285750" indent="-285750">
+              <a:buFont typeface="Arial" panose="020B0604020202020204" pitchFamily="34" charset="0"/>
+              <a:buChar char="•"/>
+            </a:pPr>
+            <a:r>
+              <a:rPr lang="en-US" dirty="0" smtClean="0">
+                <a:solidFill>
+                  <a:schemeClr val="accent1"/>
+                </a:solidFill>
+              </a:rPr>
+              <a:t>Debian</a:t>
+            </a:r>
+            <a:r>
+              <a:rPr lang="en-US" b="1" dirty="0" smtClean="0">
+                <a:solidFill>
+                  <a:schemeClr val="accent1"/>
+                </a:solidFill>
+              </a:rPr>
+              <a:t> </a:t>
+            </a:r>
+            <a:r>
+              <a:rPr lang="en-US" dirty="0" smtClean="0">
+                <a:solidFill>
+                  <a:schemeClr val="accent1"/>
+                </a:solidFill>
+              </a:rPr>
+              <a:t>is </a:t>
+            </a:r>
+            <a:r>
+              <a:rPr lang="en-US" dirty="0">
+                <a:solidFill>
+                  <a:schemeClr val="accent1"/>
+                </a:solidFill>
+              </a:rPr>
+              <a:t>a Linux distribution </a:t>
+            </a:r>
+            <a:r>
+              <a:rPr lang="en-US" dirty="0">
+                <a:solidFill>
+                  <a:schemeClr val="accent3"/>
+                </a:solidFill>
+              </a:rPr>
+              <a:t>composed of free and open-source </a:t>
+            </a:r>
+            <a:r>
+              <a:rPr lang="en-US" dirty="0" smtClean="0">
+                <a:solidFill>
+                  <a:schemeClr val="accent3"/>
+                </a:solidFill>
+              </a:rPr>
+              <a:t>software</a:t>
+            </a:r>
+            <a:r>
+              <a:rPr lang="en-US" dirty="0" smtClean="0">
+                <a:solidFill>
+                  <a:schemeClr val="accent1"/>
+                </a:solidFill>
+              </a:rPr>
+              <a:t>.</a:t>
+            </a:r>
+          </a:p>
+          <a:p>
+            <a:pPr marL="285750" indent="-285750">
+              <a:buFont typeface="Arial" panose="020B0604020202020204" pitchFamily="34" charset="0"/>
+              <a:buChar char="•"/>
+            </a:pPr>
+            <a:endParaRPr lang="en-US" dirty="0" smtClean="0">
+              <a:solidFill>
+                <a:schemeClr val="accent1"/>
+              </a:solidFill>
+            </a:endParaRPr>
+          </a:p>
+          <a:p>
+            <a:pPr marL="285750" indent="-285750">
+              <a:buFont typeface="Arial" panose="020B0604020202020204" pitchFamily="34" charset="0"/>
+              <a:buChar char="•"/>
+            </a:pPr>
+            <a:r>
+              <a:rPr lang="en-US" dirty="0">
+                <a:solidFill>
+                  <a:schemeClr val="accent1"/>
+                </a:solidFill>
+              </a:rPr>
+              <a:t>D</a:t>
+            </a:r>
+            <a:r>
+              <a:rPr lang="en-US" dirty="0" smtClean="0">
+                <a:solidFill>
+                  <a:schemeClr val="accent1"/>
+                </a:solidFill>
+              </a:rPr>
+              <a:t>eveloped </a:t>
+            </a:r>
+            <a:r>
+              <a:rPr lang="en-US" dirty="0">
+                <a:solidFill>
+                  <a:schemeClr val="accent1"/>
+                </a:solidFill>
+              </a:rPr>
+              <a:t>by the </a:t>
+            </a:r>
+            <a:r>
+              <a:rPr lang="en-US" dirty="0">
+                <a:solidFill>
+                  <a:schemeClr val="accent3"/>
+                </a:solidFill>
+              </a:rPr>
+              <a:t>community-supported Debian Project, </a:t>
+            </a:r>
+            <a:r>
+              <a:rPr lang="en-US" dirty="0">
+                <a:solidFill>
+                  <a:schemeClr val="accent1"/>
+                </a:solidFill>
+              </a:rPr>
+              <a:t>which was established by</a:t>
+            </a:r>
+            <a:r>
+              <a:rPr lang="en-US" dirty="0">
+                <a:solidFill>
+                  <a:schemeClr val="accent3"/>
+                </a:solidFill>
+              </a:rPr>
+              <a:t> Ian Murdock </a:t>
+            </a:r>
+            <a:r>
+              <a:rPr lang="en-US" dirty="0">
+                <a:solidFill>
+                  <a:schemeClr val="accent1"/>
+                </a:solidFill>
+              </a:rPr>
+              <a:t>on August 16, 1993. </a:t>
+            </a:r>
+            <a:endParaRPr lang="en-US" dirty="0" smtClean="0">
+              <a:solidFill>
+                <a:schemeClr val="accent1"/>
+              </a:solidFill>
+            </a:endParaRPr>
+          </a:p>
+          <a:p>
+            <a:pPr marL="285750" indent="-285750">
+              <a:buFont typeface="Arial" panose="020B0604020202020204" pitchFamily="34" charset="0"/>
+              <a:buChar char="•"/>
+            </a:pPr>
+            <a:endParaRPr lang="en-US" dirty="0">
+              <a:solidFill>
+                <a:schemeClr val="accent1"/>
+              </a:solidFill>
+            </a:endParaRPr>
+          </a:p>
+          <a:p>
+            <a:pPr marL="285750" indent="-285750">
+              <a:buFont typeface="Arial" panose="020B0604020202020204" pitchFamily="34" charset="0"/>
+              <a:buChar char="•"/>
+            </a:pPr>
+            <a:r>
+              <a:rPr lang="en-US" dirty="0">
+                <a:solidFill>
+                  <a:schemeClr val="accent1"/>
+                </a:solidFill>
+              </a:rPr>
+              <a:t>Debian aims to provide an extremely stable distribution (and therefore contains older software</a:t>
+            </a:r>
+            <a:r>
+              <a:rPr lang="en-US" dirty="0" smtClean="0">
+                <a:solidFill>
+                  <a:schemeClr val="accent1"/>
+                </a:solidFill>
+                <a:latin typeface="Libre Franklin"/>
+              </a:rPr>
+              <a:t>) .</a:t>
+            </a:r>
+            <a:endParaRPr lang="en-US" dirty="0">
+              <a:solidFill>
+                <a:schemeClr val="accent1"/>
+              </a:solidFill>
+            </a:endParaRPr>
+          </a:p>
+          <a:p>
+            <a:endParaRPr lang="en-US" dirty="0" smtClean="0">
+              <a:solidFill>
+                <a:schemeClr val="accent1"/>
+              </a:solidFill>
+            </a:endParaRPr>
+          </a:p>
+          <a:p>
+            <a:pPr marL="285750" indent="-285750">
+              <a:buFont typeface="Arial" panose="020B0604020202020204" pitchFamily="34" charset="0"/>
+              <a:buChar char="•"/>
+            </a:pPr>
+            <a:r>
+              <a:rPr lang="en-US" dirty="0" smtClean="0">
+                <a:solidFill>
+                  <a:schemeClr val="accent1"/>
+                </a:solidFill>
+              </a:rPr>
+              <a:t>The </a:t>
+            </a:r>
+            <a:r>
+              <a:rPr lang="en-US" dirty="0">
+                <a:solidFill>
+                  <a:schemeClr val="accent1"/>
+                </a:solidFill>
+              </a:rPr>
+              <a:t>Debian </a:t>
+            </a:r>
+            <a:r>
+              <a:rPr lang="en-US" dirty="0" smtClean="0">
+                <a:solidFill>
+                  <a:schemeClr val="accent3"/>
+                </a:solidFill>
+              </a:rPr>
+              <a:t>Stable branch</a:t>
+            </a:r>
+            <a:r>
+              <a:rPr lang="en-US" dirty="0" smtClean="0">
+                <a:solidFill>
+                  <a:schemeClr val="accent1"/>
+                </a:solidFill>
+              </a:rPr>
+              <a:t> is the </a:t>
+            </a:r>
+            <a:r>
+              <a:rPr lang="en-US" dirty="0" smtClean="0">
+                <a:solidFill>
+                  <a:schemeClr val="accent3"/>
+                </a:solidFill>
+              </a:rPr>
+              <a:t>most popular edition </a:t>
+            </a:r>
+            <a:r>
+              <a:rPr lang="en-US" dirty="0">
+                <a:solidFill>
+                  <a:schemeClr val="accent1"/>
+                </a:solidFill>
+              </a:rPr>
+              <a:t>for personal computers and </a:t>
+            </a:r>
+            <a:r>
+              <a:rPr lang="en-US" dirty="0" smtClean="0">
+                <a:solidFill>
+                  <a:schemeClr val="accent1"/>
+                </a:solidFill>
+              </a:rPr>
+              <a:t>servers</a:t>
+            </a:r>
+            <a:r>
+              <a:rPr lang="en-US" dirty="0">
+                <a:solidFill>
+                  <a:schemeClr val="accent1"/>
+                </a:solidFill>
+              </a:rPr>
+              <a:t>, and is the basis for </a:t>
+            </a:r>
+            <a:r>
+              <a:rPr lang="en-US" dirty="0" smtClean="0">
+                <a:solidFill>
+                  <a:schemeClr val="accent1"/>
+                </a:solidFill>
+              </a:rPr>
+              <a:t>many </a:t>
+            </a:r>
+            <a:r>
+              <a:rPr lang="en-US" dirty="0">
+                <a:solidFill>
+                  <a:schemeClr val="accent1"/>
+                </a:solidFill>
+              </a:rPr>
+              <a:t>other distributions</a:t>
+            </a:r>
+            <a:r>
+              <a:rPr lang="en-US" dirty="0" smtClean="0">
+                <a:solidFill>
+                  <a:schemeClr val="accent1"/>
+                </a:solidFill>
+              </a:rPr>
+              <a:t>.</a:t>
+            </a:r>
+          </a:p>
+          <a:p>
+            <a:pPr marL="285750" indent="-285750">
+              <a:buFont typeface="Arial" panose="020B0604020202020204" pitchFamily="34" charset="0"/>
+              <a:buChar char="•"/>
+            </a:pPr>
+            <a:endParaRPr lang="en-US" dirty="0">
+              <a:solidFill>
+                <a:schemeClr val="accent1"/>
+              </a:solidFill>
+            </a:endParaRPr>
+          </a:p>
+          <a:p>
+            <a:pPr marL="285750" indent="-285750">
+              <a:buFont typeface="Arial" panose="020B0604020202020204" pitchFamily="34" charset="0"/>
+              <a:buChar char="•"/>
+            </a:pPr>
+            <a:r>
+              <a:rPr lang="en-US" dirty="0" smtClean="0">
+                <a:solidFill>
+                  <a:schemeClr val="accent1"/>
+                </a:solidFill>
+              </a:rPr>
+              <a:t>Debian is great for </a:t>
+            </a:r>
+            <a:r>
+              <a:rPr lang="en-US" dirty="0" smtClean="0">
+                <a:solidFill>
+                  <a:schemeClr val="accent3"/>
+                </a:solidFill>
+              </a:rPr>
+              <a:t>servers</a:t>
+            </a:r>
+            <a:r>
+              <a:rPr lang="en-US" dirty="0" smtClean="0">
+                <a:solidFill>
+                  <a:schemeClr val="accent1"/>
+                </a:solidFill>
+              </a:rPr>
+              <a:t>.</a:t>
+            </a:r>
+            <a:endParaRPr lang="en-US" dirty="0">
+              <a:solidFill>
+                <a:schemeClr val="accent1"/>
+              </a:solidFill>
+            </a:endParaRPr>
+          </a:p>
+        </p:txBody>
+      </p:sp>
+      <p:pic>
+        <p:nvPicPr>
+          <p:cNvPr id="3" name="Picture 2"/>
+          <p:cNvPicPr>
+            <a:picLocks noChangeAspect="1"/>
+          </p:cNvPicPr>
+          <p:nvPr/>
+        </p:nvPicPr>
+        <p:blipFill rotWithShape="1">
+          <a:blip r:embed="rId2">
+            <a:extLst>
+              <a:ext uri="{28A0092B-C50C-407E-A947-70E740481C1C}">
+                <a14:useLocalDpi xmlns:a14="http://schemas.microsoft.com/office/drawing/2010/main" val="0"/>
+              </a:ext>
+            </a:extLst>
+          </a:blip>
+          <a:srcRect b="26561"/>
+          <a:stretch/>
+        </p:blipFill>
+        <p:spPr>
+          <a:xfrm>
+            <a:off x="10591800" y="416597"/>
+            <a:ext cx="1371362" cy="1183603"/>
+          </a:xfrm>
+          <a:prstGeom prst="rect">
+            <a:avLst/>
+          </a:prstGeom>
+        </p:spPr>
+      </p:pic>
     </p:spTree>
     <p:extLst>
       <p:ext uri="{BB962C8B-B14F-4D97-AF65-F5344CB8AC3E}">
-        <p14:creationId xmlns:p14="http://schemas.microsoft.com/office/powerpoint/2010/main" val="992394703"/>
+        <p14:creationId xmlns:p14="http://schemas.microsoft.com/office/powerpoint/2010/main" val="2850297369"/>
       </p:ext>
     </p:extLst>
   </p:cSld>
   <p:clrMapOvr>
     <a:masterClrMapping/>
   </p:clrMapOvr>
+  <p:timing>
+    <p:tnLst>
+      <p:par>
+        <p:cTn id="1" dur="indefinite" restart="never" nodeType="tmRoot"/>
+      </p:par>
+    </p:tnLst>
+  </p:timing>
+</p:sld>
+</file>
+
+<file path=ppt/slides/slide21.xml><?xml version="1.0" encoding="utf-8"?>
+<p:sld xmlns:a="http://schemas.openxmlformats.org/drawingml/2006/main" xmlns:r="http://schemas.openxmlformats.org/officeDocument/2006/relationships" xmlns:p="http://schemas.openxmlformats.org/presentationml/2006/main">
+  <p:cSld>
+    <p:spTree>
+      <p:nvGrpSpPr>
+        <p:cNvPr id="1" name=""/>
+        <p:cNvGrpSpPr/>
+        <p:nvPr/>
+      </p:nvGrpSpPr>
+      <p:grpSpPr>
+        <a:xfrm>
+          <a:off x="0" y="0"/>
+          <a:ext cx="0" cy="0"/>
+          <a:chOff x="0" y="0"/>
+          <a:chExt cx="0" cy="0"/>
+        </a:xfrm>
+      </p:grpSpPr>
+      <p:sp>
+        <p:nvSpPr>
+          <p:cNvPr id="2" name="Title 1"/>
+          <p:cNvSpPr>
+            <a:spLocks noGrp="1"/>
+          </p:cNvSpPr>
+          <p:nvPr>
+            <p:ph type="title"/>
+          </p:nvPr>
+        </p:nvSpPr>
+        <p:spPr>
+          <a:xfrm>
+            <a:off x="533400" y="838200"/>
+            <a:ext cx="4495800" cy="457200"/>
+          </a:xfrm>
+        </p:spPr>
+        <p:txBody>
+          <a:bodyPr>
+            <a:normAutofit fontScale="90000"/>
+          </a:bodyPr>
+          <a:lstStyle/>
+          <a:p>
+            <a:r>
+              <a:rPr lang="en-US" sz="2800" dirty="0" smtClean="0"/>
+              <a:t>ubuntu:</a:t>
+            </a:r>
+            <a:endParaRPr lang="en-US" sz="2800" dirty="0"/>
+          </a:p>
+        </p:txBody>
+      </p:sp>
+      <p:pic>
+        <p:nvPicPr>
+          <p:cNvPr id="6" name="Picture 5"/>
+          <p:cNvPicPr>
+            <a:picLocks noChangeAspect="1"/>
+          </p:cNvPicPr>
+          <p:nvPr/>
+        </p:nvPicPr>
+        <p:blipFill>
+          <a:blip r:embed="rId2" cstate="print">
+            <a:extLst>
+              <a:ext uri="{28A0092B-C50C-407E-A947-70E740481C1C}">
+                <a14:useLocalDpi xmlns:a14="http://schemas.microsoft.com/office/drawing/2010/main" val="0"/>
+              </a:ext>
+            </a:extLst>
+          </a:blip>
+          <a:stretch>
+            <a:fillRect/>
+          </a:stretch>
+        </p:blipFill>
+        <p:spPr>
+          <a:xfrm>
+            <a:off x="10515600" y="562601"/>
+            <a:ext cx="1219200" cy="1008398"/>
+          </a:xfrm>
+          <a:prstGeom prst="rect">
+            <a:avLst/>
+          </a:prstGeom>
+        </p:spPr>
+      </p:pic>
+    </p:spTree>
+    <p:extLst>
+      <p:ext uri="{BB962C8B-B14F-4D97-AF65-F5344CB8AC3E}">
+        <p14:creationId xmlns:p14="http://schemas.microsoft.com/office/powerpoint/2010/main" val="2880637194"/>
+      </p:ext>
+    </p:extLst>
+  </p:cSld>
+  <p:clrMapOvr>
+    <a:masterClrMapping/>
+  </p:clrMapOvr>
+  <p:timing>
+    <p:tnLst>
+      <p:par>
+        <p:cTn id="1" dur="indefinite" restart="never" nodeType="tmRoot"/>
+      </p:par>
+    </p:tnLst>
+  </p:timing>
+</p:sld>
+</file>
+
+<file path=ppt/slides/slide22.xml><?xml version="1.0" encoding="utf-8"?>
+<p:sld xmlns:a="http://schemas.openxmlformats.org/drawingml/2006/main" xmlns:r="http://schemas.openxmlformats.org/officeDocument/2006/relationships" xmlns:p="http://schemas.openxmlformats.org/presentationml/2006/main">
+  <p:cSld>
+    <p:spTree>
+      <p:nvGrpSpPr>
+        <p:cNvPr id="1" name=""/>
+        <p:cNvGrpSpPr/>
+        <p:nvPr/>
+      </p:nvGrpSpPr>
+      <p:grpSpPr>
+        <a:xfrm>
+          <a:off x="0" y="0"/>
+          <a:ext cx="0" cy="0"/>
+          <a:chOff x="0" y="0"/>
+          <a:chExt cx="0" cy="0"/>
+        </a:xfrm>
+      </p:grpSpPr>
+      <p:sp>
+        <p:nvSpPr>
+          <p:cNvPr id="2" name="Title 1"/>
+          <p:cNvSpPr>
+            <a:spLocks noGrp="1"/>
+          </p:cNvSpPr>
+          <p:nvPr>
+            <p:ph type="title"/>
+          </p:nvPr>
+        </p:nvSpPr>
+        <p:spPr>
+          <a:xfrm>
+            <a:off x="533400" y="838200"/>
+            <a:ext cx="4495800" cy="457200"/>
+          </a:xfrm>
+        </p:spPr>
+        <p:txBody>
+          <a:bodyPr>
+            <a:normAutofit fontScale="90000"/>
+          </a:bodyPr>
+          <a:lstStyle/>
+          <a:p>
+            <a:r>
+              <a:rPr lang="en-US" sz="2800" dirty="0" smtClean="0"/>
+              <a:t>mint:</a:t>
+            </a:r>
+            <a:endParaRPr lang="en-US" sz="2800" dirty="0"/>
+          </a:p>
+        </p:txBody>
+      </p:sp>
+      <p:sp>
+        <p:nvSpPr>
+          <p:cNvPr id="18" name="Rectangle 17"/>
+          <p:cNvSpPr/>
+          <p:nvPr/>
+        </p:nvSpPr>
+        <p:spPr>
+          <a:xfrm>
+            <a:off x="685800" y="1655891"/>
+            <a:ext cx="9525000" cy="369332"/>
+          </a:xfrm>
+          <a:prstGeom prst="rect">
+            <a:avLst/>
+          </a:prstGeom>
+        </p:spPr>
+        <p:txBody>
+          <a:bodyPr wrap="square">
+            <a:spAutoFit/>
+          </a:bodyPr>
+          <a:lstStyle/>
+          <a:p>
+            <a:pPr marL="285750" indent="-285750">
+              <a:buFont typeface="Arial" panose="020B0604020202020204" pitchFamily="34" charset="0"/>
+              <a:buChar char="•"/>
+            </a:pPr>
+            <a:r>
+              <a:rPr lang="en-US" dirty="0">
+                <a:solidFill>
+                  <a:schemeClr val="accent1"/>
+                </a:solidFill>
+              </a:rPr>
+              <a:t>Linux Mint is a </a:t>
+            </a:r>
+            <a:r>
+              <a:rPr lang="en-US" dirty="0">
+                <a:solidFill>
+                  <a:schemeClr val="accent3"/>
+                </a:solidFill>
+              </a:rPr>
+              <a:t>community-driven </a:t>
+            </a:r>
+            <a:r>
+              <a:rPr lang="en-US" dirty="0">
+                <a:solidFill>
+                  <a:schemeClr val="accent1"/>
+                </a:solidFill>
+              </a:rPr>
+              <a:t>Linux </a:t>
+            </a:r>
+            <a:r>
+              <a:rPr lang="en-US" dirty="0" smtClean="0">
+                <a:solidFill>
+                  <a:schemeClr val="accent1"/>
+                </a:solidFill>
+              </a:rPr>
+              <a:t>distribution based </a:t>
+            </a:r>
+            <a:r>
+              <a:rPr lang="en-US" dirty="0">
+                <a:solidFill>
+                  <a:schemeClr val="accent1"/>
+                </a:solidFill>
+              </a:rPr>
+              <a:t>on </a:t>
+            </a:r>
+            <a:r>
+              <a:rPr lang="en-US" dirty="0">
+                <a:solidFill>
+                  <a:schemeClr val="accent3"/>
+                </a:solidFill>
+              </a:rPr>
+              <a:t>Ubuntu</a:t>
+            </a:r>
+            <a:r>
+              <a:rPr lang="en-US" dirty="0">
+                <a:solidFill>
+                  <a:schemeClr val="accent1"/>
+                </a:solidFill>
+              </a:rPr>
+              <a:t> or </a:t>
+            </a:r>
+            <a:r>
+              <a:rPr lang="en-US" dirty="0" smtClean="0">
+                <a:solidFill>
+                  <a:schemeClr val="accent3"/>
+                </a:solidFill>
+              </a:rPr>
+              <a:t>Debian</a:t>
+            </a:r>
+            <a:r>
+              <a:rPr lang="en-US" dirty="0" smtClean="0">
+                <a:solidFill>
+                  <a:schemeClr val="accent1"/>
+                </a:solidFill>
+              </a:rPr>
+              <a:t>.</a:t>
+            </a:r>
+            <a:endParaRPr lang="en-US" dirty="0">
+              <a:solidFill>
+                <a:schemeClr val="accent1"/>
+              </a:solidFill>
+            </a:endParaRPr>
+          </a:p>
+        </p:txBody>
+      </p:sp>
+      <p:pic>
+        <p:nvPicPr>
+          <p:cNvPr id="5" name="Picture 4"/>
+          <p:cNvPicPr>
+            <a:picLocks noChangeAspect="1"/>
+          </p:cNvPicPr>
+          <p:nvPr/>
+        </p:nvPicPr>
+        <p:blipFill>
+          <a:blip r:embed="rId2" cstate="print">
+            <a:extLst>
+              <a:ext uri="{28A0092B-C50C-407E-A947-70E740481C1C}">
+                <a14:useLocalDpi xmlns:a14="http://schemas.microsoft.com/office/drawing/2010/main" val="0"/>
+              </a:ext>
+            </a:extLst>
+          </a:blip>
+          <a:stretch>
+            <a:fillRect/>
+          </a:stretch>
+        </p:blipFill>
+        <p:spPr>
+          <a:xfrm>
+            <a:off x="10363200" y="647700"/>
+            <a:ext cx="1066800" cy="838200"/>
+          </a:xfrm>
+          <a:prstGeom prst="rect">
+            <a:avLst/>
+          </a:prstGeom>
+        </p:spPr>
+      </p:pic>
+      <p:sp>
+        <p:nvSpPr>
+          <p:cNvPr id="6" name="Rectangle 5"/>
+          <p:cNvSpPr/>
+          <p:nvPr/>
+        </p:nvSpPr>
+        <p:spPr>
+          <a:xfrm>
+            <a:off x="685800" y="2268977"/>
+            <a:ext cx="9220200" cy="646331"/>
+          </a:xfrm>
+          <a:prstGeom prst="rect">
+            <a:avLst/>
+          </a:prstGeom>
+        </p:spPr>
+        <p:txBody>
+          <a:bodyPr wrap="square">
+            <a:spAutoFit/>
+          </a:bodyPr>
+          <a:lstStyle/>
+          <a:p>
+            <a:pPr marL="285750" indent="-285750">
+              <a:buFont typeface="Arial" panose="020B0604020202020204" pitchFamily="34" charset="0"/>
+              <a:buChar char="•"/>
+            </a:pPr>
+            <a:r>
+              <a:rPr lang="en-US" dirty="0">
+                <a:solidFill>
+                  <a:schemeClr val="accent1"/>
+                </a:solidFill>
+                <a:latin typeface="Arial" panose="020B0604020202020204" pitchFamily="34" charset="0"/>
+              </a:rPr>
+              <a:t>Linux Mint provides </a:t>
+            </a:r>
+            <a:r>
+              <a:rPr lang="en-US" dirty="0">
+                <a:solidFill>
+                  <a:schemeClr val="accent3"/>
+                </a:solidFill>
+                <a:latin typeface="Arial" panose="020B0604020202020204" pitchFamily="34" charset="0"/>
+              </a:rPr>
+              <a:t>full out-of-the-box multimedia </a:t>
+            </a:r>
+            <a:r>
+              <a:rPr lang="en-US" dirty="0">
+                <a:solidFill>
+                  <a:schemeClr val="accent1"/>
+                </a:solidFill>
+                <a:latin typeface="Arial" panose="020B0604020202020204" pitchFamily="34" charset="0"/>
+              </a:rPr>
+              <a:t>support by </a:t>
+            </a:r>
+            <a:r>
+              <a:rPr lang="en-US" dirty="0" smtClean="0">
+                <a:solidFill>
+                  <a:schemeClr val="accent1"/>
+                </a:solidFill>
+                <a:latin typeface="Arial" panose="020B0604020202020204" pitchFamily="34" charset="0"/>
+              </a:rPr>
+              <a:t>including some</a:t>
+            </a:r>
+            <a:r>
+              <a:rPr lang="en-US" dirty="0">
+                <a:solidFill>
+                  <a:schemeClr val="accent1"/>
+                </a:solidFill>
+                <a:latin typeface="Arial" panose="020B0604020202020204" pitchFamily="34" charset="0"/>
+              </a:rPr>
+              <a:t> </a:t>
+            </a:r>
+            <a:r>
+              <a:rPr lang="en-US" dirty="0">
+                <a:solidFill>
+                  <a:schemeClr val="accent3"/>
+                </a:solidFill>
+                <a:latin typeface="Arial" panose="020B0604020202020204" pitchFamily="34" charset="0"/>
+              </a:rPr>
+              <a:t>proprietary </a:t>
+            </a:r>
+            <a:r>
+              <a:rPr lang="en-US" dirty="0" smtClean="0">
+                <a:solidFill>
+                  <a:schemeClr val="accent3"/>
+                </a:solidFill>
+                <a:latin typeface="Arial" panose="020B0604020202020204" pitchFamily="34" charset="0"/>
+              </a:rPr>
+              <a:t>software</a:t>
+            </a:r>
+            <a:r>
+              <a:rPr lang="en-US" dirty="0" smtClean="0">
+                <a:solidFill>
+                  <a:schemeClr val="accent1"/>
+                </a:solidFill>
+                <a:latin typeface="Arial" panose="020B0604020202020204" pitchFamily="34" charset="0"/>
+              </a:rPr>
+              <a:t>.</a:t>
+            </a:r>
+            <a:endParaRPr lang="en-US" dirty="0">
+              <a:solidFill>
+                <a:schemeClr val="accent3"/>
+              </a:solidFill>
+            </a:endParaRPr>
+          </a:p>
+        </p:txBody>
+      </p:sp>
+      <p:sp>
+        <p:nvSpPr>
+          <p:cNvPr id="7" name="Rectangle 6"/>
+          <p:cNvSpPr/>
+          <p:nvPr/>
+        </p:nvSpPr>
+        <p:spPr>
+          <a:xfrm>
+            <a:off x="685800" y="3759226"/>
+            <a:ext cx="9525000" cy="646331"/>
+          </a:xfrm>
+          <a:prstGeom prst="rect">
+            <a:avLst/>
+          </a:prstGeom>
+        </p:spPr>
+        <p:txBody>
+          <a:bodyPr wrap="square">
+            <a:spAutoFit/>
+          </a:bodyPr>
+          <a:lstStyle/>
+          <a:p>
+            <a:pPr marL="285750" indent="-285750">
+              <a:buFont typeface="Arial" panose="020B0604020202020204" pitchFamily="34" charset="0"/>
+              <a:buChar char="•"/>
+            </a:pPr>
+            <a:r>
+              <a:rPr lang="en-US" dirty="0">
+                <a:solidFill>
+                  <a:schemeClr val="accent1"/>
+                </a:solidFill>
+                <a:latin typeface="Libre Franklin"/>
+              </a:rPr>
+              <a:t>Linux Mint aims to provide an </a:t>
+            </a:r>
+            <a:r>
+              <a:rPr lang="en-US" dirty="0">
+                <a:solidFill>
+                  <a:schemeClr val="accent3"/>
+                </a:solidFill>
+                <a:latin typeface="Libre Franklin"/>
+              </a:rPr>
+              <a:t>extremely easy distribution </a:t>
+            </a:r>
+            <a:r>
+              <a:rPr lang="en-US" dirty="0">
+                <a:solidFill>
+                  <a:schemeClr val="accent1"/>
+                </a:solidFill>
+                <a:latin typeface="Libre Franklin"/>
+              </a:rPr>
+              <a:t>for </a:t>
+            </a:r>
+            <a:r>
+              <a:rPr lang="en-US" dirty="0">
+                <a:solidFill>
+                  <a:schemeClr val="accent3"/>
+                </a:solidFill>
+                <a:latin typeface="Libre Franklin"/>
+              </a:rPr>
+              <a:t>users of other operating </a:t>
+            </a:r>
+            <a:r>
+              <a:rPr lang="en-US" dirty="0">
+                <a:solidFill>
+                  <a:schemeClr val="accent1"/>
+                </a:solidFill>
+                <a:latin typeface="Libre Franklin"/>
+              </a:rPr>
+              <a:t>systems like Windows and Mac OS X to use and get used to </a:t>
+            </a:r>
+            <a:r>
+              <a:rPr lang="en-US" dirty="0" smtClean="0">
+                <a:solidFill>
+                  <a:schemeClr val="accent1"/>
+                </a:solidFill>
+                <a:latin typeface="Libre Franklin"/>
+              </a:rPr>
+              <a:t>Linux.</a:t>
+            </a:r>
+            <a:endParaRPr lang="en-US" dirty="0">
+              <a:solidFill>
+                <a:schemeClr val="accent1"/>
+              </a:solidFill>
+            </a:endParaRPr>
+          </a:p>
+        </p:txBody>
+      </p:sp>
+      <p:sp>
+        <p:nvSpPr>
+          <p:cNvPr id="8" name="Rectangle 7"/>
+          <p:cNvSpPr/>
+          <p:nvPr/>
+        </p:nvSpPr>
+        <p:spPr>
+          <a:xfrm>
+            <a:off x="533400" y="3680705"/>
+            <a:ext cx="6096000" cy="646331"/>
+          </a:xfrm>
+          <a:prstGeom prst="rect">
+            <a:avLst/>
+          </a:prstGeom>
+        </p:spPr>
+        <p:txBody>
+          <a:bodyPr>
+            <a:spAutoFit/>
+          </a:bodyPr>
+          <a:lstStyle/>
+          <a:p>
+            <a:r>
+              <a:rPr lang="en-US" dirty="0">
+                <a:solidFill>
+                  <a:schemeClr val="accent1"/>
+                </a:solidFill>
+              </a:rPr>
+              <a:t/>
+            </a:r>
+            <a:br>
+              <a:rPr lang="en-US" dirty="0">
+                <a:solidFill>
+                  <a:schemeClr val="accent1"/>
+                </a:solidFill>
+              </a:rPr>
+            </a:br>
+            <a:endParaRPr lang="en-US" dirty="0">
+              <a:solidFill>
+                <a:schemeClr val="accent1"/>
+              </a:solidFill>
+            </a:endParaRPr>
+          </a:p>
+        </p:txBody>
+      </p:sp>
+      <p:sp>
+        <p:nvSpPr>
+          <p:cNvPr id="11" name="Rectangle 10"/>
+          <p:cNvSpPr/>
+          <p:nvPr/>
+        </p:nvSpPr>
+        <p:spPr>
+          <a:xfrm>
+            <a:off x="685800" y="4659868"/>
+            <a:ext cx="5097870" cy="369332"/>
+          </a:xfrm>
+          <a:prstGeom prst="rect">
+            <a:avLst/>
+          </a:prstGeom>
+        </p:spPr>
+        <p:txBody>
+          <a:bodyPr wrap="none">
+            <a:spAutoFit/>
+          </a:bodyPr>
+          <a:lstStyle/>
+          <a:p>
+            <a:pPr marL="285750" indent="-285750">
+              <a:buFont typeface="Arial" panose="020B0604020202020204" pitchFamily="34" charset="0"/>
+              <a:buChar char="•"/>
+            </a:pPr>
+            <a:r>
+              <a:rPr lang="en-US" dirty="0" smtClean="0">
+                <a:solidFill>
+                  <a:schemeClr val="accent1"/>
+                </a:solidFill>
+              </a:rPr>
+              <a:t>Mostly used with </a:t>
+            </a:r>
+            <a:r>
+              <a:rPr lang="en-US" dirty="0" smtClean="0">
+                <a:solidFill>
+                  <a:schemeClr val="accent3"/>
+                </a:solidFill>
+              </a:rPr>
+              <a:t>Cinamon</a:t>
+            </a:r>
+            <a:r>
+              <a:rPr lang="en-US" dirty="0" smtClean="0">
+                <a:solidFill>
+                  <a:schemeClr val="accent1"/>
+                </a:solidFill>
+              </a:rPr>
+              <a:t>, </a:t>
+            </a:r>
+            <a:r>
+              <a:rPr lang="en-US" dirty="0" smtClean="0">
+                <a:solidFill>
+                  <a:schemeClr val="accent3"/>
+                </a:solidFill>
+              </a:rPr>
+              <a:t>Mate</a:t>
+            </a:r>
+            <a:r>
+              <a:rPr lang="en-US" dirty="0" smtClean="0">
+                <a:solidFill>
+                  <a:schemeClr val="accent1"/>
+                </a:solidFill>
+              </a:rPr>
+              <a:t> or </a:t>
+            </a:r>
+            <a:r>
+              <a:rPr lang="en-US" dirty="0" smtClean="0">
+                <a:solidFill>
+                  <a:schemeClr val="accent3"/>
+                </a:solidFill>
+              </a:rPr>
+              <a:t>XFCE</a:t>
+            </a:r>
+            <a:r>
+              <a:rPr lang="en-US" dirty="0" smtClean="0">
+                <a:solidFill>
+                  <a:schemeClr val="accent1"/>
+                </a:solidFill>
+              </a:rPr>
+              <a:t> (DEs) .</a:t>
+            </a:r>
+            <a:endParaRPr lang="en-US" dirty="0">
+              <a:solidFill>
+                <a:schemeClr val="accent1"/>
+              </a:solidFill>
+            </a:endParaRPr>
+          </a:p>
+        </p:txBody>
+      </p:sp>
+      <p:sp>
+        <p:nvSpPr>
+          <p:cNvPr id="12" name="Rectangle 11"/>
+          <p:cNvSpPr/>
+          <p:nvPr/>
+        </p:nvSpPr>
+        <p:spPr>
+          <a:xfrm>
+            <a:off x="689776" y="3169619"/>
+            <a:ext cx="4408579" cy="369332"/>
+          </a:xfrm>
+          <a:prstGeom prst="rect">
+            <a:avLst/>
+          </a:prstGeom>
+        </p:spPr>
+        <p:txBody>
+          <a:bodyPr wrap="none">
+            <a:spAutoFit/>
+          </a:bodyPr>
+          <a:lstStyle/>
+          <a:p>
+            <a:pPr marL="285750" indent="-285750">
+              <a:buFont typeface="Arial" panose="020B0604020202020204" pitchFamily="34" charset="0"/>
+              <a:buChar char="•"/>
+            </a:pPr>
+            <a:r>
+              <a:rPr lang="en-US" dirty="0">
+                <a:solidFill>
+                  <a:schemeClr val="accent1"/>
+                </a:solidFill>
+                <a:latin typeface="Trebuchet MS" panose="020B0603020202020204" pitchFamily="34" charset="0"/>
+              </a:rPr>
+              <a:t>It's both </a:t>
+            </a:r>
+            <a:r>
+              <a:rPr lang="en-US" dirty="0">
+                <a:solidFill>
+                  <a:schemeClr val="accent3"/>
+                </a:solidFill>
+                <a:latin typeface="Trebuchet MS" panose="020B0603020202020204" pitchFamily="34" charset="0"/>
+              </a:rPr>
+              <a:t>free of cost </a:t>
+            </a:r>
+            <a:r>
+              <a:rPr lang="en-US" dirty="0">
+                <a:solidFill>
+                  <a:schemeClr val="accent1"/>
+                </a:solidFill>
+                <a:latin typeface="Trebuchet MS" panose="020B0603020202020204" pitchFamily="34" charset="0"/>
+              </a:rPr>
+              <a:t>and </a:t>
+            </a:r>
+            <a:r>
+              <a:rPr lang="en-US" dirty="0">
+                <a:solidFill>
+                  <a:schemeClr val="accent3"/>
+                </a:solidFill>
+                <a:latin typeface="Trebuchet MS" panose="020B0603020202020204" pitchFamily="34" charset="0"/>
+              </a:rPr>
+              <a:t>open source</a:t>
+            </a:r>
+            <a:r>
+              <a:rPr lang="en-US" dirty="0">
+                <a:solidFill>
+                  <a:schemeClr val="accent1"/>
+                </a:solidFill>
+                <a:latin typeface="Trebuchet MS" panose="020B0603020202020204" pitchFamily="34" charset="0"/>
+              </a:rPr>
+              <a:t>.</a:t>
+            </a:r>
+            <a:endParaRPr lang="en-US" dirty="0">
+              <a:solidFill>
+                <a:schemeClr val="accent1"/>
+              </a:solidFill>
+              <a:latin typeface="Trebuchet MS" panose="020B0603020202020204" pitchFamily="34" charset="0"/>
+            </a:endParaRPr>
+          </a:p>
+        </p:txBody>
+      </p:sp>
+    </p:spTree>
+    <p:extLst>
+      <p:ext uri="{BB962C8B-B14F-4D97-AF65-F5344CB8AC3E}">
+        <p14:creationId xmlns:p14="http://schemas.microsoft.com/office/powerpoint/2010/main" val="895465491"/>
+      </p:ext>
+    </p:extLst>
+  </p:cSld>
+  <p:clrMapOvr>
+    <a:masterClrMapping/>
+  </p:clrMapOvr>
+  <p:timing>
+    <p:tnLst>
+      <p:par>
+        <p:cTn id="1" dur="indefinite" restart="never" nodeType="tmRoot"/>
+      </p:par>
+    </p:tnLst>
+  </p:timing>
 </p:sld>
 </file>
 

</xml_diff>

<commit_message>
Ubuntu and fedora added
</commit_message>
<xml_diff>
--- a/PowerPoint/amirkabir_linux_festival.pptx
+++ b/PowerPoint/amirkabir_linux_festival.pptx
@@ -5,10 +5,10 @@
     <p:sldMasterId id="2147483648" r:id="rId1"/>
   </p:sldMasterIdLst>
   <p:notesMasterIdLst>
-    <p:notesMasterId r:id="rId24"/>
+    <p:notesMasterId r:id="rId25"/>
   </p:notesMasterIdLst>
   <p:handoutMasterIdLst>
-    <p:handoutMasterId r:id="rId25"/>
+    <p:handoutMasterId r:id="rId26"/>
   </p:handoutMasterIdLst>
   <p:sldIdLst>
     <p:sldId id="256" r:id="rId2"/>
@@ -33,6 +33,7 @@
     <p:sldId id="282" r:id="rId21"/>
     <p:sldId id="283" r:id="rId22"/>
     <p:sldId id="281" r:id="rId23"/>
+    <p:sldId id="284" r:id="rId24"/>
   </p:sldIdLst>
   <p:sldSz cx="12192000" cy="6858000"/>
   <p:notesSz cx="6858000" cy="9144000"/>
@@ -7228,11 +7229,7 @@
             </a:r>
             <a:r>
               <a:rPr lang="en-US" sz="2800" dirty="0" smtClean="0"/>
-              <a:t>hat_are_linux_distributions</a:t>
-            </a:r>
-            <a:r>
-              <a:rPr lang="en-US" sz="2800" dirty="0" smtClean="0"/>
-              <a:t>:</a:t>
+              <a:t>hat_are_linux_distributions:</a:t>
             </a:r>
             <a:endParaRPr lang="en-US" sz="2800" dirty="0"/>
           </a:p>
@@ -7611,11 +7608,6 @@
               </a:rPr>
               <a:t>, and so on.</a:t>
             </a:r>
-            <a:endParaRPr lang="en-US" dirty="0">
-              <a:solidFill>
-                <a:schemeClr val="accent1"/>
-              </a:solidFill>
-            </a:endParaRPr>
           </a:p>
         </p:txBody>
       </p:sp>
@@ -8326,6 +8318,533 @@
           </a:prstGeom>
         </p:spPr>
       </p:pic>
+      <p:sp>
+        <p:nvSpPr>
+          <p:cNvPr id="3" name="Rectangle 2"/>
+          <p:cNvSpPr/>
+          <p:nvPr/>
+        </p:nvSpPr>
+        <p:spPr>
+          <a:xfrm>
+            <a:off x="534724" y="2220068"/>
+            <a:ext cx="8228276" cy="369332"/>
+          </a:xfrm>
+          <a:prstGeom prst="rect">
+            <a:avLst/>
+          </a:prstGeom>
+        </p:spPr>
+        <p:txBody>
+          <a:bodyPr wrap="square">
+            <a:spAutoFit/>
+          </a:bodyPr>
+          <a:lstStyle/>
+          <a:p>
+            <a:pPr marL="285750" indent="-285750">
+              <a:buFont typeface="Arial" panose="020B0604020202020204" pitchFamily="34" charset="0"/>
+              <a:buChar char="•"/>
+            </a:pPr>
+            <a:r>
+              <a:rPr lang="en-US" dirty="0">
+                <a:solidFill>
+                  <a:schemeClr val="accent1"/>
+                </a:solidFill>
+                <a:latin typeface="Ubuntu"/>
+              </a:rPr>
+              <a:t>Ubuntu is an ancient African word meaning </a:t>
+            </a:r>
+            <a:r>
+              <a:rPr lang="en-US" dirty="0">
+                <a:solidFill>
+                  <a:schemeClr val="accent3"/>
+                </a:solidFill>
+                <a:latin typeface="Ubuntu"/>
+              </a:rPr>
+              <a:t>‘humanity to others’</a:t>
+            </a:r>
+            <a:r>
+              <a:rPr lang="en-US" dirty="0">
+                <a:solidFill>
+                  <a:schemeClr val="accent1"/>
+                </a:solidFill>
+                <a:latin typeface="Ubuntu"/>
+              </a:rPr>
+              <a:t>.</a:t>
+            </a:r>
+            <a:endParaRPr lang="en-US" dirty="0">
+              <a:solidFill>
+                <a:schemeClr val="accent1"/>
+              </a:solidFill>
+            </a:endParaRPr>
+          </a:p>
+        </p:txBody>
+      </p:sp>
+      <p:sp>
+        <p:nvSpPr>
+          <p:cNvPr id="4" name="Rectangle 3"/>
+          <p:cNvSpPr/>
+          <p:nvPr/>
+        </p:nvSpPr>
+        <p:spPr>
+          <a:xfrm>
+            <a:off x="533400" y="2706469"/>
+            <a:ext cx="9525000" cy="646331"/>
+          </a:xfrm>
+          <a:prstGeom prst="rect">
+            <a:avLst/>
+          </a:prstGeom>
+        </p:spPr>
+        <p:txBody>
+          <a:bodyPr wrap="square">
+            <a:spAutoFit/>
+          </a:bodyPr>
+          <a:lstStyle/>
+          <a:p>
+            <a:pPr marL="285750" indent="-285750">
+              <a:buFont typeface="Arial" panose="020B0604020202020204" pitchFamily="34" charset="0"/>
+              <a:buChar char="•"/>
+            </a:pPr>
+            <a:r>
+              <a:rPr lang="en-US" dirty="0" smtClean="0">
+                <a:solidFill>
+                  <a:schemeClr val="accent3"/>
+                </a:solidFill>
+                <a:latin typeface="Ubuntu"/>
+              </a:rPr>
+              <a:t>Mark Shuttleworth gathered </a:t>
+            </a:r>
+            <a:r>
+              <a:rPr lang="en-US" dirty="0" smtClean="0">
+                <a:solidFill>
+                  <a:schemeClr val="accent1"/>
+                </a:solidFill>
+                <a:latin typeface="Ubuntu"/>
+              </a:rPr>
+              <a:t>a small team of </a:t>
+            </a:r>
+            <a:r>
+              <a:rPr lang="en-US" dirty="0" smtClean="0">
+                <a:solidFill>
+                  <a:schemeClr val="accent3"/>
+                </a:solidFill>
+                <a:latin typeface="Ubuntu"/>
+              </a:rPr>
+              <a:t>Debian developers </a:t>
+            </a:r>
+            <a:r>
+              <a:rPr lang="en-US" dirty="0" smtClean="0">
+                <a:solidFill>
+                  <a:schemeClr val="accent1"/>
+                </a:solidFill>
+                <a:latin typeface="Ubuntu"/>
+              </a:rPr>
+              <a:t>who together founded </a:t>
+            </a:r>
+            <a:r>
+              <a:rPr lang="en-US" dirty="0" smtClean="0">
+                <a:solidFill>
+                  <a:schemeClr val="accent3"/>
+                </a:solidFill>
+                <a:latin typeface="Ubuntu"/>
+              </a:rPr>
+              <a:t>Canonical</a:t>
+            </a:r>
+            <a:r>
+              <a:rPr lang="en-US" dirty="0" smtClean="0">
+                <a:solidFill>
+                  <a:schemeClr val="accent1"/>
+                </a:solidFill>
+                <a:latin typeface="Ubuntu"/>
+              </a:rPr>
+              <a:t> and set out to create an </a:t>
+            </a:r>
+            <a:r>
+              <a:rPr lang="en-US" dirty="0" smtClean="0">
+                <a:solidFill>
+                  <a:schemeClr val="accent3"/>
+                </a:solidFill>
+                <a:latin typeface="Ubuntu"/>
+              </a:rPr>
+              <a:t>easy-to-use Linux desktop </a:t>
+            </a:r>
+            <a:r>
+              <a:rPr lang="en-US" dirty="0" smtClean="0">
+                <a:solidFill>
+                  <a:schemeClr val="accent1"/>
+                </a:solidFill>
+                <a:latin typeface="Ubuntu"/>
+              </a:rPr>
+              <a:t>called Ubuntu.</a:t>
+            </a:r>
+            <a:endParaRPr lang="en-US" dirty="0">
+              <a:solidFill>
+                <a:schemeClr val="accent1"/>
+              </a:solidFill>
+            </a:endParaRPr>
+          </a:p>
+        </p:txBody>
+      </p:sp>
+      <p:sp>
+        <p:nvSpPr>
+          <p:cNvPr id="5" name="Rectangle 4"/>
+          <p:cNvSpPr/>
+          <p:nvPr/>
+        </p:nvSpPr>
+        <p:spPr>
+          <a:xfrm>
+            <a:off x="533400" y="3468469"/>
+            <a:ext cx="9525000" cy="646331"/>
+          </a:xfrm>
+          <a:prstGeom prst="rect">
+            <a:avLst/>
+          </a:prstGeom>
+        </p:spPr>
+        <p:txBody>
+          <a:bodyPr wrap="square">
+            <a:spAutoFit/>
+          </a:bodyPr>
+          <a:lstStyle/>
+          <a:p>
+            <a:pPr marL="285750" indent="-285750">
+              <a:buFont typeface="Arial" panose="020B0604020202020204" pitchFamily="34" charset="0"/>
+              <a:buChar char="•"/>
+            </a:pPr>
+            <a:r>
+              <a:rPr lang="en-US" dirty="0">
+                <a:solidFill>
+                  <a:schemeClr val="accent1"/>
+                </a:solidFill>
+                <a:latin typeface="Ubuntu"/>
+              </a:rPr>
+              <a:t>Ubuntu was the first operating system to commit to scheduled releases on a predictable cadence, </a:t>
+            </a:r>
+            <a:r>
+              <a:rPr lang="en-US" dirty="0">
+                <a:solidFill>
+                  <a:schemeClr val="accent3"/>
+                </a:solidFill>
+                <a:latin typeface="Ubuntu"/>
+              </a:rPr>
+              <a:t>every six </a:t>
+            </a:r>
+            <a:r>
+              <a:rPr lang="en-US" dirty="0" smtClean="0">
+                <a:solidFill>
+                  <a:schemeClr val="accent3"/>
+                </a:solidFill>
+                <a:latin typeface="Ubuntu"/>
+              </a:rPr>
+              <a:t>months</a:t>
+            </a:r>
+            <a:r>
+              <a:rPr lang="en-US" dirty="0" smtClean="0">
+                <a:solidFill>
+                  <a:schemeClr val="accent1"/>
+                </a:solidFill>
+                <a:latin typeface="Ubuntu"/>
+              </a:rPr>
+              <a:t>.</a:t>
+            </a:r>
+            <a:endParaRPr lang="en-US" dirty="0">
+              <a:solidFill>
+                <a:schemeClr val="accent1"/>
+              </a:solidFill>
+            </a:endParaRPr>
+          </a:p>
+        </p:txBody>
+      </p:sp>
+      <p:sp>
+        <p:nvSpPr>
+          <p:cNvPr id="7" name="Rectangle 6"/>
+          <p:cNvSpPr/>
+          <p:nvPr/>
+        </p:nvSpPr>
+        <p:spPr>
+          <a:xfrm>
+            <a:off x="533400" y="4230469"/>
+            <a:ext cx="9525000" cy="923330"/>
+          </a:xfrm>
+          <a:prstGeom prst="rect">
+            <a:avLst/>
+          </a:prstGeom>
+        </p:spPr>
+        <p:txBody>
+          <a:bodyPr wrap="square">
+            <a:spAutoFit/>
+          </a:bodyPr>
+          <a:lstStyle/>
+          <a:p>
+            <a:pPr marL="285750" indent="-285750">
+              <a:buFont typeface="Arial" panose="020B0604020202020204" pitchFamily="34" charset="0"/>
+              <a:buChar char="•"/>
+            </a:pPr>
+            <a:r>
+              <a:rPr lang="en-US" dirty="0">
+                <a:solidFill>
+                  <a:schemeClr val="accent1"/>
+                </a:solidFill>
+                <a:latin typeface="Ubuntu"/>
+              </a:rPr>
+              <a:t>every </a:t>
+            </a:r>
+            <a:r>
+              <a:rPr lang="en-US" dirty="0">
+                <a:solidFill>
+                  <a:schemeClr val="accent3"/>
+                </a:solidFill>
+                <a:latin typeface="Ubuntu"/>
+              </a:rPr>
+              <a:t>fourth</a:t>
+            </a:r>
+            <a:r>
+              <a:rPr lang="en-US" dirty="0">
+                <a:solidFill>
+                  <a:schemeClr val="accent1"/>
+                </a:solidFill>
+                <a:latin typeface="Ubuntu"/>
+              </a:rPr>
+              <a:t> release, made </a:t>
+            </a:r>
+            <a:r>
+              <a:rPr lang="en-US" dirty="0">
+                <a:solidFill>
+                  <a:schemeClr val="accent3"/>
+                </a:solidFill>
+                <a:latin typeface="Ubuntu"/>
+              </a:rPr>
+              <a:t>every two years</a:t>
+            </a:r>
+            <a:r>
+              <a:rPr lang="en-US" dirty="0">
+                <a:solidFill>
+                  <a:schemeClr val="accent1"/>
+                </a:solidFill>
+                <a:latin typeface="Ubuntu"/>
+              </a:rPr>
+              <a:t>, would receive </a:t>
+            </a:r>
+            <a:r>
+              <a:rPr lang="en-US" dirty="0">
+                <a:solidFill>
+                  <a:schemeClr val="accent3"/>
+                </a:solidFill>
+                <a:latin typeface="Ubuntu"/>
+              </a:rPr>
+              <a:t>long-term support </a:t>
+            </a:r>
+            <a:r>
+              <a:rPr lang="en-US" dirty="0">
+                <a:solidFill>
+                  <a:schemeClr val="accent1"/>
+                </a:solidFill>
+                <a:latin typeface="Ubuntu"/>
+              </a:rPr>
+              <a:t>for large-scale </a:t>
+            </a:r>
+            <a:r>
+              <a:rPr lang="en-US" dirty="0" smtClean="0">
+                <a:solidFill>
+                  <a:schemeClr val="accent1"/>
+                </a:solidFill>
+                <a:latin typeface="Ubuntu"/>
+              </a:rPr>
+              <a:t>deployments (</a:t>
+            </a:r>
+            <a:r>
+              <a:rPr lang="en-US" dirty="0" smtClean="0">
+                <a:solidFill>
+                  <a:schemeClr val="accent3"/>
+                </a:solidFill>
+                <a:latin typeface="Ubuntu"/>
+              </a:rPr>
+              <a:t>5 year</a:t>
+            </a:r>
+            <a:r>
+              <a:rPr lang="en-US" dirty="0" smtClean="0">
+                <a:solidFill>
+                  <a:schemeClr val="accent1"/>
+                </a:solidFill>
+                <a:latin typeface="Ubuntu"/>
+              </a:rPr>
+              <a:t>) . </a:t>
+            </a:r>
+            <a:r>
+              <a:rPr lang="en-US" dirty="0">
+                <a:solidFill>
+                  <a:schemeClr val="accent1"/>
+                </a:solidFill>
+                <a:latin typeface="Ubuntu"/>
+              </a:rPr>
+              <a:t>This is the origin of the term LTS for stable, maintained releases.</a:t>
+            </a:r>
+            <a:endParaRPr lang="en-US" dirty="0">
+              <a:solidFill>
+                <a:schemeClr val="accent1"/>
+              </a:solidFill>
+            </a:endParaRPr>
+          </a:p>
+        </p:txBody>
+      </p:sp>
+      <p:sp>
+        <p:nvSpPr>
+          <p:cNvPr id="13" name="Rectangle 12"/>
+          <p:cNvSpPr/>
+          <p:nvPr/>
+        </p:nvSpPr>
+        <p:spPr>
+          <a:xfrm>
+            <a:off x="512197" y="1707825"/>
+            <a:ext cx="9525000" cy="369332"/>
+          </a:xfrm>
+          <a:prstGeom prst="rect">
+            <a:avLst/>
+          </a:prstGeom>
+        </p:spPr>
+        <p:txBody>
+          <a:bodyPr wrap="square">
+            <a:spAutoFit/>
+          </a:bodyPr>
+          <a:lstStyle/>
+          <a:p>
+            <a:pPr marL="285750" lvl="0" indent="-285750" eaLnBrk="0" fontAlgn="base" hangingPunct="0">
+              <a:spcBef>
+                <a:spcPct val="0"/>
+              </a:spcBef>
+              <a:spcAft>
+                <a:spcPct val="0"/>
+              </a:spcAft>
+              <a:buFont typeface="Arial" panose="020B0604020202020204" pitchFamily="34" charset="0"/>
+              <a:buChar char="•"/>
+            </a:pPr>
+            <a:r>
+              <a:rPr lang="en-US" altLang="en-US" dirty="0">
+                <a:solidFill>
+                  <a:schemeClr val="accent1"/>
+                </a:solidFill>
+                <a:cs typeface="Arial" panose="020B0604020202020204" pitchFamily="34" charset="0"/>
+              </a:rPr>
+              <a:t>Ubuntu </a:t>
+            </a:r>
+            <a:r>
+              <a:rPr lang="en-US" altLang="en-US" dirty="0" smtClean="0">
+                <a:solidFill>
+                  <a:schemeClr val="accent1"/>
+                </a:solidFill>
+                <a:cs typeface="Arial" panose="020B0604020202020204" pitchFamily="34" charset="0"/>
+              </a:rPr>
+              <a:t>is </a:t>
+            </a:r>
+            <a:r>
+              <a:rPr lang="en-US" altLang="en-US" dirty="0">
+                <a:solidFill>
+                  <a:schemeClr val="accent1"/>
+                </a:solidFill>
+                <a:cs typeface="Arial" panose="020B0604020202020204" pitchFamily="34" charset="0"/>
+              </a:rPr>
+              <a:t>a </a:t>
+            </a:r>
+            <a:r>
+              <a:rPr lang="en-US" altLang="en-US" dirty="0">
+                <a:solidFill>
+                  <a:schemeClr val="accent3"/>
+                </a:solidFill>
+                <a:cs typeface="Arial" panose="020B0604020202020204" pitchFamily="34" charset="0"/>
+              </a:rPr>
+              <a:t>free and </a:t>
+            </a:r>
+            <a:r>
+              <a:rPr lang="en-US" altLang="en-US" dirty="0" smtClean="0">
+                <a:solidFill>
+                  <a:schemeClr val="accent3"/>
+                </a:solidFill>
+                <a:cs typeface="Arial" panose="020B0604020202020204" pitchFamily="34" charset="0"/>
+              </a:rPr>
+              <a:t>open-source</a:t>
+            </a:r>
+            <a:r>
+              <a:rPr lang="en-US" altLang="en-US" dirty="0">
+                <a:solidFill>
+                  <a:schemeClr val="accent1"/>
+                </a:solidFill>
+                <a:cs typeface="Arial" panose="020B0604020202020204" pitchFamily="34" charset="0"/>
+              </a:rPr>
+              <a:t> Linux distribution </a:t>
+            </a:r>
+            <a:r>
+              <a:rPr lang="en-US" altLang="en-US" dirty="0">
+                <a:solidFill>
+                  <a:schemeClr val="accent3"/>
+                </a:solidFill>
+                <a:cs typeface="Arial" panose="020B0604020202020204" pitchFamily="34" charset="0"/>
+              </a:rPr>
+              <a:t>based on Debian</a:t>
+            </a:r>
+            <a:r>
+              <a:rPr lang="en-US" altLang="en-US" dirty="0" smtClean="0">
+                <a:solidFill>
+                  <a:schemeClr val="accent1"/>
+                </a:solidFill>
+                <a:cs typeface="Arial" panose="020B0604020202020204" pitchFamily="34" charset="0"/>
+              </a:rPr>
+              <a:t>.</a:t>
+            </a:r>
+            <a:endParaRPr lang="en-US" altLang="en-US" dirty="0">
+              <a:solidFill>
+                <a:schemeClr val="accent1"/>
+              </a:solidFill>
+              <a:cs typeface="Arial" panose="020B0604020202020204" pitchFamily="34" charset="0"/>
+            </a:endParaRPr>
+          </a:p>
+        </p:txBody>
+      </p:sp>
+      <p:sp>
+        <p:nvSpPr>
+          <p:cNvPr id="19" name="Rectangle 18"/>
+          <p:cNvSpPr/>
+          <p:nvPr/>
+        </p:nvSpPr>
+        <p:spPr>
+          <a:xfrm>
+            <a:off x="512197" y="5176328"/>
+            <a:ext cx="9525000" cy="369332"/>
+          </a:xfrm>
+          <a:prstGeom prst="rect">
+            <a:avLst/>
+          </a:prstGeom>
+        </p:spPr>
+        <p:txBody>
+          <a:bodyPr wrap="square">
+            <a:spAutoFit/>
+          </a:bodyPr>
+          <a:lstStyle/>
+          <a:p>
+            <a:pPr marL="285750" indent="-285750">
+              <a:buFont typeface="Arial" panose="020B0604020202020204" pitchFamily="34" charset="0"/>
+              <a:buChar char="•"/>
+            </a:pPr>
+            <a:r>
+              <a:rPr lang="en-US" dirty="0" smtClean="0">
+                <a:solidFill>
+                  <a:schemeClr val="accent3"/>
+                </a:solidFill>
+              </a:rPr>
+              <a:t>GNOME</a:t>
+            </a:r>
+            <a:r>
+              <a:rPr lang="en-US" dirty="0" smtClean="0">
+                <a:solidFill>
+                  <a:schemeClr val="accent1"/>
+                </a:solidFill>
+              </a:rPr>
+              <a:t> is default Desktop environment for ubuntu.</a:t>
+            </a:r>
+            <a:endParaRPr lang="en-US" dirty="0">
+              <a:solidFill>
+                <a:schemeClr val="accent1"/>
+              </a:solidFill>
+            </a:endParaRPr>
+          </a:p>
+        </p:txBody>
+      </p:sp>
     </p:spTree>
     <p:extLst>
       <p:ext uri="{BB962C8B-B14F-4D97-AF65-F5344CB8AC3E}">
@@ -8923,11 +9442,606 @@
               </a:rPr>
               <a:t>.</a:t>
             </a:r>
+          </a:p>
+        </p:txBody>
+      </p:sp>
+    </p:spTree>
+    <p:extLst>
+      <p:ext uri="{BB962C8B-B14F-4D97-AF65-F5344CB8AC3E}">
+        <p14:creationId xmlns:p14="http://schemas.microsoft.com/office/powerpoint/2010/main" val="895465491"/>
+      </p:ext>
+    </p:extLst>
+  </p:cSld>
+  <p:clrMapOvr>
+    <a:masterClrMapping/>
+  </p:clrMapOvr>
+  <p:timing>
+    <p:tnLst>
+      <p:par>
+        <p:cTn id="1" dur="indefinite" restart="never" nodeType="tmRoot"/>
+      </p:par>
+    </p:tnLst>
+  </p:timing>
+</p:sld>
+</file>
+
+<file path=ppt/slides/slide23.xml><?xml version="1.0" encoding="utf-8"?>
+<p:sld xmlns:a="http://schemas.openxmlformats.org/drawingml/2006/main" xmlns:r="http://schemas.openxmlformats.org/officeDocument/2006/relationships" xmlns:p="http://schemas.openxmlformats.org/presentationml/2006/main">
+  <p:cSld>
+    <p:spTree>
+      <p:nvGrpSpPr>
+        <p:cNvPr id="1" name=""/>
+        <p:cNvGrpSpPr/>
+        <p:nvPr/>
+      </p:nvGrpSpPr>
+      <p:grpSpPr>
+        <a:xfrm>
+          <a:off x="0" y="0"/>
+          <a:ext cx="0" cy="0"/>
+          <a:chOff x="0" y="0"/>
+          <a:chExt cx="0" cy="0"/>
+        </a:xfrm>
+      </p:grpSpPr>
+      <p:sp>
+        <p:nvSpPr>
+          <p:cNvPr id="2" name="Title 1"/>
+          <p:cNvSpPr>
+            <a:spLocks noGrp="1"/>
+          </p:cNvSpPr>
+          <p:nvPr>
+            <p:ph type="title"/>
+          </p:nvPr>
+        </p:nvSpPr>
+        <p:spPr>
+          <a:xfrm>
+            <a:off x="533400" y="838200"/>
+            <a:ext cx="4495800" cy="457200"/>
+          </a:xfrm>
+        </p:spPr>
+        <p:txBody>
+          <a:bodyPr>
+            <a:normAutofit fontScale="90000"/>
+          </a:bodyPr>
+          <a:lstStyle/>
+          <a:p>
+            <a:r>
+              <a:rPr lang="en-US" sz="2800" dirty="0" smtClean="0"/>
+              <a:t>fedora</a:t>
+            </a:r>
+            <a:r>
+              <a:rPr lang="en-US" sz="2800" dirty="0" smtClean="0"/>
+              <a:t>:</a:t>
+            </a:r>
+            <a:endParaRPr lang="en-US" sz="2800" dirty="0"/>
+          </a:p>
+        </p:txBody>
+      </p:sp>
+      <p:pic>
+        <p:nvPicPr>
+          <p:cNvPr id="4" name="Picture 3"/>
+          <p:cNvPicPr>
+            <a:picLocks noChangeAspect="1"/>
+          </p:cNvPicPr>
+          <p:nvPr/>
+        </p:nvPicPr>
+        <p:blipFill>
+          <a:blip r:embed="rId2" cstate="print">
+            <a:extLst>
+              <a:ext uri="{28A0092B-C50C-407E-A947-70E740481C1C}">
+                <a14:useLocalDpi xmlns:a14="http://schemas.microsoft.com/office/drawing/2010/main" val="0"/>
+              </a:ext>
+            </a:extLst>
+          </a:blip>
+          <a:stretch>
+            <a:fillRect/>
+          </a:stretch>
+        </p:blipFill>
+        <p:spPr>
+          <a:xfrm>
+            <a:off x="10591800" y="643724"/>
+            <a:ext cx="838200" cy="838200"/>
+          </a:xfrm>
+          <a:prstGeom prst="rect">
+            <a:avLst/>
+          </a:prstGeom>
+        </p:spPr>
+      </p:pic>
+      <p:sp>
+        <p:nvSpPr>
+          <p:cNvPr id="9" name="Rectangle 8"/>
+          <p:cNvSpPr/>
+          <p:nvPr/>
+        </p:nvSpPr>
+        <p:spPr>
+          <a:xfrm>
+            <a:off x="533400" y="1451444"/>
+            <a:ext cx="9372600" cy="646331"/>
+          </a:xfrm>
+          <a:prstGeom prst="rect">
+            <a:avLst/>
+          </a:prstGeom>
+        </p:spPr>
+        <p:txBody>
+          <a:bodyPr wrap="square">
+            <a:spAutoFit/>
+          </a:bodyPr>
+          <a:lstStyle/>
+          <a:p>
+            <a:pPr marL="285750" indent="-285750">
+              <a:buFont typeface="Arial" panose="020B0604020202020204" pitchFamily="34" charset="0"/>
+              <a:buChar char="•"/>
+            </a:pPr>
+            <a:r>
+              <a:rPr lang="en-US" dirty="0">
+                <a:solidFill>
+                  <a:schemeClr val="accent1"/>
+                </a:solidFill>
+              </a:rPr>
+              <a:t>Fedora Linux is a Linux distribution developed by the </a:t>
+            </a:r>
+            <a:r>
+              <a:rPr lang="en-US" dirty="0">
+                <a:solidFill>
+                  <a:schemeClr val="accent3"/>
+                </a:solidFill>
+              </a:rPr>
+              <a:t>community-supported Fedora Project</a:t>
+            </a:r>
+            <a:r>
+              <a:rPr lang="en-US" dirty="0">
+                <a:solidFill>
+                  <a:schemeClr val="accent1"/>
+                </a:solidFill>
+              </a:rPr>
+              <a:t> which is </a:t>
+            </a:r>
+            <a:r>
+              <a:rPr lang="en-US" dirty="0">
+                <a:solidFill>
+                  <a:schemeClr val="accent3"/>
+                </a:solidFill>
+              </a:rPr>
+              <a:t>sponsored</a:t>
+            </a:r>
+            <a:r>
+              <a:rPr lang="en-US" dirty="0">
+                <a:solidFill>
+                  <a:schemeClr val="accent1"/>
+                </a:solidFill>
+              </a:rPr>
+              <a:t> primarily by</a:t>
+            </a:r>
+            <a:r>
+              <a:rPr lang="en-US" dirty="0">
+                <a:solidFill>
+                  <a:schemeClr val="accent3"/>
+                </a:solidFill>
+              </a:rPr>
+              <a:t> </a:t>
+            </a:r>
+            <a:r>
+              <a:rPr lang="en-US" dirty="0" smtClean="0">
+                <a:solidFill>
+                  <a:schemeClr val="accent3"/>
+                </a:solidFill>
+              </a:rPr>
+              <a:t>Red </a:t>
+            </a:r>
+            <a:r>
+              <a:rPr lang="en-US" dirty="0">
+                <a:solidFill>
+                  <a:schemeClr val="accent3"/>
+                </a:solidFill>
+              </a:rPr>
+              <a:t>Hat </a:t>
+            </a:r>
+            <a:r>
+              <a:rPr lang="en-US" dirty="0" smtClean="0">
+                <a:solidFill>
+                  <a:schemeClr val="accent1"/>
+                </a:solidFill>
+              </a:rPr>
+              <a:t>Inc.</a:t>
+            </a:r>
             <a:endParaRPr lang="en-US" dirty="0">
               <a:solidFill>
                 <a:schemeClr val="accent1"/>
               </a:solidFill>
-              <a:latin typeface="Trebuchet MS" panose="020B0603020202020204" pitchFamily="34" charset="0"/>
+            </a:endParaRPr>
+          </a:p>
+        </p:txBody>
+      </p:sp>
+      <p:sp>
+        <p:nvSpPr>
+          <p:cNvPr id="10" name="Rectangle 9"/>
+          <p:cNvSpPr/>
+          <p:nvPr/>
+        </p:nvSpPr>
+        <p:spPr>
+          <a:xfrm>
+            <a:off x="533400" y="2276985"/>
+            <a:ext cx="9372600" cy="369332"/>
+          </a:xfrm>
+          <a:prstGeom prst="rect">
+            <a:avLst/>
+          </a:prstGeom>
+        </p:spPr>
+        <p:txBody>
+          <a:bodyPr wrap="square">
+            <a:spAutoFit/>
+          </a:bodyPr>
+          <a:lstStyle/>
+          <a:p>
+            <a:pPr marL="285750" indent="-285750">
+              <a:buFont typeface="Arial" panose="020B0604020202020204" pitchFamily="34" charset="0"/>
+              <a:buChar char="•"/>
+            </a:pPr>
+            <a:r>
+              <a:rPr lang="en-US" dirty="0">
+                <a:solidFill>
+                  <a:schemeClr val="accent3"/>
+                </a:solidFill>
+                <a:latin typeface="Roboto"/>
+              </a:rPr>
+              <a:t>F</a:t>
+            </a:r>
+            <a:r>
+              <a:rPr lang="en-US" dirty="0" smtClean="0">
+                <a:solidFill>
+                  <a:schemeClr val="accent3"/>
+                </a:solidFill>
+                <a:latin typeface="Roboto"/>
+              </a:rPr>
+              <a:t>ree</a:t>
+            </a:r>
+            <a:r>
+              <a:rPr lang="en-US" dirty="0" smtClean="0">
+                <a:solidFill>
+                  <a:schemeClr val="accent1"/>
+                </a:solidFill>
+                <a:latin typeface="Roboto"/>
+              </a:rPr>
+              <a:t> </a:t>
+            </a:r>
+            <a:r>
+              <a:rPr lang="en-US" dirty="0">
+                <a:solidFill>
+                  <a:schemeClr val="accent1"/>
+                </a:solidFill>
+                <a:latin typeface="Roboto"/>
+              </a:rPr>
+              <a:t>and </a:t>
+            </a:r>
+            <a:r>
+              <a:rPr lang="en-US" dirty="0">
+                <a:solidFill>
+                  <a:schemeClr val="accent3"/>
+                </a:solidFill>
+                <a:latin typeface="Roboto"/>
+              </a:rPr>
+              <a:t>open source </a:t>
+            </a:r>
+            <a:r>
+              <a:rPr lang="en-US" dirty="0">
+                <a:solidFill>
+                  <a:schemeClr val="accent1"/>
+                </a:solidFill>
+                <a:latin typeface="Roboto"/>
+              </a:rPr>
+              <a:t>software </a:t>
+            </a:r>
+            <a:r>
+              <a:rPr lang="en-US" dirty="0" smtClean="0">
+                <a:solidFill>
+                  <a:schemeClr val="accent1"/>
+                </a:solidFill>
+                <a:latin typeface="Roboto"/>
+              </a:rPr>
+              <a:t>platform.</a:t>
+            </a:r>
+            <a:endParaRPr lang="en-US" dirty="0">
+              <a:solidFill>
+                <a:schemeClr val="accent1"/>
+              </a:solidFill>
+            </a:endParaRPr>
+          </a:p>
+        </p:txBody>
+      </p:sp>
+      <p:sp>
+        <p:nvSpPr>
+          <p:cNvPr id="13" name="Rectangle 12"/>
+          <p:cNvSpPr/>
+          <p:nvPr/>
+        </p:nvSpPr>
+        <p:spPr>
+          <a:xfrm>
+            <a:off x="533400" y="2819400"/>
+            <a:ext cx="9448800" cy="646331"/>
+          </a:xfrm>
+          <a:prstGeom prst="rect">
+            <a:avLst/>
+          </a:prstGeom>
+        </p:spPr>
+        <p:txBody>
+          <a:bodyPr wrap="square">
+            <a:spAutoFit/>
+          </a:bodyPr>
+          <a:lstStyle/>
+          <a:p>
+            <a:pPr marL="285750" indent="-285750">
+              <a:buFont typeface="Arial" panose="020B0604020202020204" pitchFamily="34" charset="0"/>
+              <a:buChar char="•"/>
+            </a:pPr>
+            <a:r>
+              <a:rPr lang="en-US" dirty="0">
+                <a:solidFill>
+                  <a:schemeClr val="accent1"/>
+                </a:solidFill>
+                <a:latin typeface="Libre Franklin"/>
+              </a:rPr>
+              <a:t>Fedora exists to be the </a:t>
+            </a:r>
+            <a:r>
+              <a:rPr lang="en-US" dirty="0">
+                <a:solidFill>
+                  <a:schemeClr val="accent3"/>
+                </a:solidFill>
+                <a:latin typeface="Libre Franklin"/>
+              </a:rPr>
+              <a:t>first to use the latest software</a:t>
+            </a:r>
+            <a:r>
+              <a:rPr lang="en-US" dirty="0">
+                <a:solidFill>
+                  <a:schemeClr val="accent1"/>
+                </a:solidFill>
+                <a:latin typeface="Libre Franklin"/>
+              </a:rPr>
+              <a:t>, meaning that it uses </a:t>
+            </a:r>
+            <a:r>
+              <a:rPr lang="en-US" dirty="0">
+                <a:solidFill>
+                  <a:schemeClr val="accent3"/>
+                </a:solidFill>
+                <a:latin typeface="Libre Franklin"/>
+              </a:rPr>
+              <a:t>both the latest versions</a:t>
+            </a:r>
+            <a:r>
+              <a:rPr lang="en-US" dirty="0">
+                <a:solidFill>
+                  <a:schemeClr val="accent1"/>
+                </a:solidFill>
+                <a:latin typeface="Libre Franklin"/>
+              </a:rPr>
+              <a:t> of software and is the first to include or </a:t>
+            </a:r>
+            <a:r>
+              <a:rPr lang="en-US" dirty="0">
+                <a:solidFill>
+                  <a:schemeClr val="accent3"/>
+                </a:solidFill>
+                <a:latin typeface="Libre Franklin"/>
+              </a:rPr>
+              <a:t>switch to a new technology</a:t>
+            </a:r>
+            <a:endParaRPr lang="en-US" dirty="0">
+              <a:solidFill>
+                <a:schemeClr val="accent3"/>
+              </a:solidFill>
+            </a:endParaRPr>
+          </a:p>
+        </p:txBody>
+      </p:sp>
+      <p:sp>
+        <p:nvSpPr>
+          <p:cNvPr id="14" name="Rectangle 13"/>
+          <p:cNvSpPr/>
+          <p:nvPr/>
+        </p:nvSpPr>
+        <p:spPr>
+          <a:xfrm>
+            <a:off x="539362" y="3725691"/>
+            <a:ext cx="9442837" cy="646331"/>
+          </a:xfrm>
+          <a:prstGeom prst="rect">
+            <a:avLst/>
+          </a:prstGeom>
+        </p:spPr>
+        <p:txBody>
+          <a:bodyPr wrap="square">
+            <a:spAutoFit/>
+          </a:bodyPr>
+          <a:lstStyle/>
+          <a:p>
+            <a:pPr marL="285750" indent="-285750">
+              <a:buFont typeface="Arial" panose="020B0604020202020204" pitchFamily="34" charset="0"/>
+              <a:buChar char="•"/>
+            </a:pPr>
+            <a:r>
+              <a:rPr lang="en-US" dirty="0">
+                <a:solidFill>
+                  <a:schemeClr val="accent1"/>
+                </a:solidFill>
+                <a:latin typeface="Libre Franklin"/>
+              </a:rPr>
+              <a:t>Fedora, on the other hand, has a </a:t>
+            </a:r>
+            <a:r>
+              <a:rPr lang="en-US" dirty="0">
+                <a:solidFill>
+                  <a:schemeClr val="accent3"/>
+                </a:solidFill>
+                <a:latin typeface="Libre Franklin"/>
+              </a:rPr>
+              <a:t>very strong </a:t>
+            </a:r>
+            <a:r>
+              <a:rPr lang="en-US" dirty="0" smtClean="0">
+                <a:solidFill>
+                  <a:schemeClr val="accent3"/>
+                </a:solidFill>
+                <a:latin typeface="Libre Franklin"/>
+              </a:rPr>
+              <a:t>open-source </a:t>
+            </a:r>
+            <a:r>
+              <a:rPr lang="en-US" dirty="0">
+                <a:solidFill>
+                  <a:schemeClr val="accent3"/>
+                </a:solidFill>
+                <a:latin typeface="Libre Franklin"/>
+              </a:rPr>
+              <a:t>policy</a:t>
+            </a:r>
+            <a:r>
+              <a:rPr lang="en-US" dirty="0">
+                <a:solidFill>
+                  <a:schemeClr val="accent1"/>
+                </a:solidFill>
+                <a:latin typeface="Libre Franklin"/>
+              </a:rPr>
+              <a:t> that </a:t>
+            </a:r>
+            <a:r>
+              <a:rPr lang="en-US" dirty="0">
+                <a:solidFill>
+                  <a:schemeClr val="accent3"/>
+                </a:solidFill>
+                <a:latin typeface="Libre Franklin"/>
+              </a:rPr>
+              <a:t>prevents</a:t>
+            </a:r>
+            <a:r>
+              <a:rPr lang="en-US" dirty="0">
+                <a:solidFill>
+                  <a:schemeClr val="accent1"/>
+                </a:solidFill>
+                <a:latin typeface="Libre Franklin"/>
+              </a:rPr>
+              <a:t> it from including any </a:t>
+            </a:r>
+            <a:r>
+              <a:rPr lang="en-US" dirty="0">
+                <a:solidFill>
+                  <a:schemeClr val="accent3"/>
+                </a:solidFill>
+                <a:latin typeface="Libre Franklin"/>
+              </a:rPr>
+              <a:t>proprietary software in its repositories</a:t>
+            </a:r>
+            <a:r>
+              <a:rPr lang="en-US" dirty="0">
+                <a:solidFill>
+                  <a:schemeClr val="accent1"/>
+                </a:solidFill>
+                <a:latin typeface="Libre Franklin"/>
+              </a:rPr>
+              <a:t>.</a:t>
+            </a:r>
+            <a:endParaRPr lang="en-US" dirty="0">
+              <a:solidFill>
+                <a:schemeClr val="accent1"/>
+              </a:solidFill>
+            </a:endParaRPr>
+          </a:p>
+        </p:txBody>
+      </p:sp>
+      <p:sp>
+        <p:nvSpPr>
+          <p:cNvPr id="15" name="Rectangle 14"/>
+          <p:cNvSpPr/>
+          <p:nvPr/>
+        </p:nvSpPr>
+        <p:spPr>
+          <a:xfrm>
+            <a:off x="533400" y="4631982"/>
+            <a:ext cx="6218369" cy="369332"/>
+          </a:xfrm>
+          <a:prstGeom prst="rect">
+            <a:avLst/>
+          </a:prstGeom>
+        </p:spPr>
+        <p:txBody>
+          <a:bodyPr wrap="none">
+            <a:spAutoFit/>
+          </a:bodyPr>
+          <a:lstStyle/>
+          <a:p>
+            <a:pPr marL="285750" indent="-285750">
+              <a:buFont typeface="Arial" panose="020B0604020202020204" pitchFamily="34" charset="0"/>
+              <a:buChar char="•"/>
+            </a:pPr>
+            <a:r>
+              <a:rPr lang="en-US" dirty="0" smtClean="0">
+                <a:solidFill>
+                  <a:schemeClr val="accent1"/>
+                </a:solidFill>
+                <a:latin typeface="Open Sans"/>
+              </a:rPr>
+              <a:t>Fedora uses </a:t>
+            </a:r>
+            <a:r>
+              <a:rPr lang="en-US" dirty="0" smtClean="0">
+                <a:solidFill>
+                  <a:schemeClr val="accent3"/>
+                </a:solidFill>
+                <a:latin typeface="Open Sans"/>
+              </a:rPr>
+              <a:t>GNOME 3 </a:t>
+            </a:r>
+            <a:r>
+              <a:rPr lang="en-US" dirty="0" smtClean="0">
+                <a:solidFill>
+                  <a:schemeClr val="accent1"/>
+                </a:solidFill>
+                <a:latin typeface="Open Sans"/>
+              </a:rPr>
+              <a:t>as </a:t>
+            </a:r>
+            <a:r>
+              <a:rPr lang="en-US" dirty="0" smtClean="0">
+                <a:solidFill>
+                  <a:schemeClr val="accent3"/>
+                </a:solidFill>
+                <a:latin typeface="Open Sans"/>
+              </a:rPr>
+              <a:t>default </a:t>
+            </a:r>
+            <a:r>
+              <a:rPr lang="en-US" dirty="0">
+                <a:solidFill>
+                  <a:schemeClr val="accent3"/>
+                </a:solidFill>
+                <a:latin typeface="Open Sans"/>
+              </a:rPr>
+              <a:t>desktop </a:t>
+            </a:r>
+            <a:r>
+              <a:rPr lang="en-US" dirty="0" smtClean="0">
+                <a:solidFill>
+                  <a:schemeClr val="accent3"/>
+                </a:solidFill>
+                <a:latin typeface="Open Sans"/>
+              </a:rPr>
+              <a:t>environment</a:t>
+            </a:r>
+            <a:r>
+              <a:rPr lang="en-US" dirty="0" smtClean="0">
+                <a:solidFill>
+                  <a:schemeClr val="accent1"/>
+                </a:solidFill>
+                <a:latin typeface="Open Sans"/>
+              </a:rPr>
+              <a:t>.</a:t>
+            </a:r>
+            <a:endParaRPr lang="en-US" b="0" i="0" dirty="0">
+              <a:solidFill>
+                <a:schemeClr val="accent1"/>
+              </a:solidFill>
+              <a:effectLst/>
+              <a:latin typeface="Open Sans"/>
             </a:endParaRPr>
           </a:p>
         </p:txBody>
@@ -8935,7 +10049,7 @@
     </p:spTree>
     <p:extLst>
       <p:ext uri="{BB962C8B-B14F-4D97-AF65-F5344CB8AC3E}">
-        <p14:creationId xmlns:p14="http://schemas.microsoft.com/office/powerpoint/2010/main" val="895465491"/>
+        <p14:creationId xmlns:p14="http://schemas.microsoft.com/office/powerpoint/2010/main" val="3603658470"/>
       </p:ext>
     </p:extLst>
   </p:cSld>

</xml_diff>

<commit_message>
The folowing dir are added: etc, lib, lib64, media, mnt
</commit_message>
<xml_diff>
--- a/PowerPoint/amirkabir_linux_festival.pptx
+++ b/PowerPoint/amirkabir_linux_festival.pptx
@@ -5,10 +5,10 @@
     <p:sldMasterId id="2147483648" r:id="rId1"/>
   </p:sldMasterIdLst>
   <p:notesMasterIdLst>
-    <p:notesMasterId r:id="rId40"/>
+    <p:notesMasterId r:id="rId44"/>
   </p:notesMasterIdLst>
   <p:handoutMasterIdLst>
-    <p:handoutMasterId r:id="rId41"/>
+    <p:handoutMasterId r:id="rId45"/>
   </p:handoutMasterIdLst>
   <p:sldIdLst>
     <p:sldId id="256" r:id="rId2"/>
@@ -49,6 +49,10 @@
     <p:sldId id="299" r:id="rId37"/>
     <p:sldId id="298" r:id="rId38"/>
     <p:sldId id="300" r:id="rId39"/>
+    <p:sldId id="302" r:id="rId40"/>
+    <p:sldId id="303" r:id="rId41"/>
+    <p:sldId id="304" r:id="rId42"/>
+    <p:sldId id="306" r:id="rId43"/>
   </p:sldIdLst>
   <p:sldSz cx="12192000" cy="6858000"/>
   <p:notesSz cx="6858000" cy="9144000"/>
@@ -251,7 +255,7 @@
           <a:p>
             <a:fld id="{762B48F5-BACC-47D6-A0F7-82FBF9C6BC85}" type="datetimeFigureOut">
               <a:rPr lang="en-US"/>
-              <a:t>2/7/2020</a:t>
+              <a:t>2/9/2020</a:t>
             </a:fld>
             <a:endParaRPr/>
           </a:p>
@@ -416,7 +420,7 @@
           <a:p>
             <a:fld id="{0CB1CD00-5424-4675-AB18-2C419B060449}" type="datetimeFigureOut">
               <a:rPr lang="en-US"/>
-              <a:t>2/7/2020</a:t>
+              <a:t>2/9/2020</a:t>
             </a:fld>
             <a:endParaRPr/>
           </a:p>
@@ -1067,7 +1071,7 @@
           <a:p>
             <a:fld id="{37CC0096-1860-4642-9CD2-0079EA5E7CD1}" type="datetimeFigureOut">
               <a:rPr lang="en-US" smtClean="0"/>
-              <a:t>2/7/2020</a:t>
+              <a:t>2/9/2020</a:t>
             </a:fld>
             <a:endParaRPr lang="en-US"/>
           </a:p>
@@ -1247,7 +1251,7 @@
           <a:p>
             <a:fld id="{37CC0096-1860-4642-9CD2-0079EA5E7CD1}" type="datetimeFigureOut">
               <a:rPr lang="en-US" smtClean="0"/>
-              <a:t>2/7/2020</a:t>
+              <a:t>2/9/2020</a:t>
             </a:fld>
             <a:endParaRPr lang="en-US"/>
           </a:p>
@@ -1421,7 +1425,7 @@
           <a:p>
             <a:fld id="{37CC0096-1860-4642-9CD2-0079EA5E7CD1}" type="datetimeFigureOut">
               <a:rPr lang="en-US" smtClean="0"/>
-              <a:t>2/7/2020</a:t>
+              <a:t>2/9/2020</a:t>
             </a:fld>
             <a:endParaRPr lang="en-US"/>
           </a:p>
@@ -1856,7 +1860,7 @@
           <a:p>
             <a:fld id="{37CC0096-1860-4642-9CD2-0079EA5E7CD1}" type="datetimeFigureOut">
               <a:rPr lang="en-US" smtClean="0"/>
-              <a:t>2/7/2020</a:t>
+              <a:t>2/9/2020</a:t>
             </a:fld>
             <a:endParaRPr lang="en-US"/>
           </a:p>
@@ -2296,7 +2300,7 @@
           <a:p>
             <a:fld id="{37CC0096-1860-4642-9CD2-0079EA5E7CD1}" type="datetimeFigureOut">
               <a:rPr lang="en-US" smtClean="0"/>
-              <a:t>2/7/2020</a:t>
+              <a:t>2/9/2020</a:t>
             </a:fld>
             <a:endParaRPr lang="en-US"/>
           </a:p>
@@ -2414,7 +2418,7 @@
           <a:p>
             <a:fld id="{37CC0096-1860-4642-9CD2-0079EA5E7CD1}" type="datetimeFigureOut">
               <a:rPr lang="en-US" smtClean="0"/>
-              <a:t>2/7/2020</a:t>
+              <a:t>2/9/2020</a:t>
             </a:fld>
             <a:endParaRPr lang="en-US"/>
           </a:p>
@@ -2509,7 +2513,7 @@
           <a:p>
             <a:fld id="{37CC0096-1860-4642-9CD2-0079EA5E7CD1}" type="datetimeFigureOut">
               <a:rPr lang="en-US" smtClean="0"/>
-              <a:t>2/7/2020</a:t>
+              <a:t>2/9/2020</a:t>
             </a:fld>
             <a:endParaRPr lang="en-US"/>
           </a:p>
@@ -2793,7 +2797,7 @@
           <a:p>
             <a:fld id="{37CC0096-1860-4642-9CD2-0079EA5E7CD1}" type="datetimeFigureOut">
               <a:rPr lang="en-US" smtClean="0"/>
-              <a:t>2/7/2020</a:t>
+              <a:t>2/9/2020</a:t>
             </a:fld>
             <a:endParaRPr lang="en-US"/>
           </a:p>
@@ -3106,7 +3110,7 @@
           <a:p>
             <a:fld id="{37CC0096-1860-4642-9CD2-0079EA5E7CD1}" type="datetimeFigureOut">
               <a:rPr lang="en-US" smtClean="0"/>
-              <a:t>2/7/2020</a:t>
+              <a:t>2/9/2020</a:t>
             </a:fld>
             <a:endParaRPr lang="en-US"/>
           </a:p>
@@ -3338,7 +3342,7 @@
             <a:fld id="{37CC0096-1860-4642-9CD2-0079EA5E7CD1}" type="datetimeFigureOut">
               <a:rPr lang="en-US" smtClean="0"/>
               <a:pPr/>
-              <a:t>2/7/2020</a:t>
+              <a:t>2/9/2020</a:t>
             </a:fld>
             <a:endParaRPr lang="en-US"/>
           </a:p>
@@ -12484,11 +12488,6 @@
                 </a:rPr>
                 <a:t>└── var</a:t>
               </a:r>
-              <a:endParaRPr lang="en-US" dirty="0">
-                <a:solidFill>
-                  <a:schemeClr val="accent1"/>
-                </a:solidFill>
-              </a:endParaRPr>
             </a:p>
           </p:txBody>
         </p:sp>
@@ -12850,11 +12849,6 @@
               </a:rPr>
               <a:t>shared by the system, the system administrator and the users.</a:t>
             </a:r>
-            <a:endParaRPr lang="en-US" dirty="0">
-              <a:solidFill>
-                <a:schemeClr val="accent1"/>
-              </a:solidFill>
-            </a:endParaRPr>
           </a:p>
         </p:txBody>
       </p:sp>
@@ -13194,11 +13188,6 @@
               </a:rPr>
               <a:t>today.</a:t>
             </a:r>
-            <a:endParaRPr lang="en-US" dirty="0">
-              <a:solidFill>
-                <a:schemeClr val="accent1"/>
-              </a:solidFill>
-            </a:endParaRPr>
           </a:p>
         </p:txBody>
       </p:sp>
@@ -14298,8 +14287,8 @@
         </p:nvSpPr>
         <p:spPr>
           <a:xfrm>
-            <a:off x="533400" y="381000"/>
-            <a:ext cx="1524000" cy="923330"/>
+            <a:off x="533400" y="599902"/>
+            <a:ext cx="2438400" cy="4524315"/>
           </a:xfrm>
           <a:prstGeom prst="rect">
             <a:avLst/>
@@ -14313,10 +14302,176 @@
           <a:p>
             <a:r>
               <a:rPr lang="en-US" dirty="0" smtClean="0"/>
-              <a:t>/etc</a:t>
-            </a:r>
-          </a:p>
-          <a:p>
+              <a:t>/</a:t>
+            </a:r>
+            <a:r>
+              <a:rPr lang="en-US" dirty="0"/>
+              <a:t>etc</a:t>
+            </a:r>
+          </a:p>
+          <a:p>
+            <a:r>
+              <a:rPr lang="en-US" dirty="0">
+                <a:solidFill>
+                  <a:schemeClr val="accent1"/>
+                </a:solidFill>
+              </a:rPr>
+              <a:t>├── </a:t>
+            </a:r>
+            <a:r>
+              <a:rPr lang="en-US" dirty="0" smtClean="0">
+                <a:solidFill>
+                  <a:schemeClr val="accent1"/>
+                </a:solidFill>
+              </a:rPr>
+              <a:t>docker</a:t>
+            </a:r>
+          </a:p>
+          <a:p>
+            <a:r>
+              <a:rPr lang="en-US" dirty="0" smtClean="0">
+                <a:solidFill>
+                  <a:schemeClr val="accent1"/>
+                </a:solidFill>
+              </a:rPr>
+              <a:t>├── fstab</a:t>
+            </a:r>
+            <a:endParaRPr lang="en-US" dirty="0">
+              <a:solidFill>
+                <a:schemeClr val="accent1"/>
+              </a:solidFill>
+            </a:endParaRPr>
+          </a:p>
+          <a:p>
+            <a:r>
+              <a:rPr lang="en-US" dirty="0">
+                <a:solidFill>
+                  <a:schemeClr val="accent1"/>
+                </a:solidFill>
+              </a:rPr>
+              <a:t>├── dpkg</a:t>
+            </a:r>
+          </a:p>
+          <a:p>
+            <a:r>
+              <a:rPr lang="en-US" dirty="0">
+                <a:solidFill>
+                  <a:schemeClr val="accent1"/>
+                </a:solidFill>
+              </a:rPr>
+              <a:t>├── java-8-openjdk</a:t>
+            </a:r>
+          </a:p>
+          <a:p>
+            <a:r>
+              <a:rPr lang="en-US" dirty="0">
+                <a:solidFill>
+                  <a:schemeClr val="accent1"/>
+                </a:solidFill>
+              </a:rPr>
+              <a:t>├── mysql</a:t>
+            </a:r>
+          </a:p>
+          <a:p>
+            <a:r>
+              <a:rPr lang="en-US" dirty="0">
+                <a:solidFill>
+                  <a:schemeClr val="accent1"/>
+                </a:solidFill>
+              </a:rPr>
+              <a:t>├── </a:t>
+            </a:r>
+            <a:r>
+              <a:rPr lang="en-US" dirty="0" smtClean="0">
+                <a:solidFill>
+                  <a:schemeClr val="accent1"/>
+                </a:solidFill>
+              </a:rPr>
+              <a:t>python3.6</a:t>
+            </a:r>
+          </a:p>
+          <a:p>
+            <a:r>
+              <a:rPr lang="en-US" dirty="0">
+                <a:solidFill>
+                  <a:schemeClr val="accent1"/>
+                </a:solidFill>
+              </a:rPr>
+              <a:t>├── </a:t>
+            </a:r>
+            <a:r>
+              <a:rPr lang="en-US" dirty="0" smtClean="0">
+                <a:solidFill>
+                  <a:schemeClr val="accent1"/>
+                </a:solidFill>
+              </a:rPr>
+              <a:t>hostname</a:t>
+            </a:r>
+            <a:endParaRPr lang="en-US" dirty="0">
+              <a:solidFill>
+                <a:schemeClr val="accent1"/>
+              </a:solidFill>
+            </a:endParaRPr>
+          </a:p>
+          <a:p>
+            <a:r>
+              <a:rPr lang="en-US" dirty="0">
+                <a:solidFill>
+                  <a:schemeClr val="accent1"/>
+                </a:solidFill>
+              </a:rPr>
+              <a:t>├── ssh</a:t>
+            </a:r>
+          </a:p>
+          <a:p>
+            <a:r>
+              <a:rPr lang="en-US" dirty="0">
+                <a:solidFill>
+                  <a:schemeClr val="accent1"/>
+                </a:solidFill>
+              </a:rPr>
+              <a:t>├── ufw</a:t>
+            </a:r>
+          </a:p>
+          <a:p>
+            <a:r>
+              <a:rPr lang="en-US" dirty="0">
+                <a:solidFill>
+                  <a:schemeClr val="accent1"/>
+                </a:solidFill>
+              </a:rPr>
+              <a:t>├── vim</a:t>
+            </a:r>
+          </a:p>
+          <a:p>
+            <a:r>
+              <a:rPr lang="en-US" dirty="0">
+                <a:solidFill>
+                  <a:schemeClr val="accent1"/>
+                </a:solidFill>
+              </a:rPr>
+              <a:t>├── X11</a:t>
+            </a:r>
+          </a:p>
+          <a:p>
+            <a:r>
+              <a:rPr lang="en-US" dirty="0">
+                <a:solidFill>
+                  <a:schemeClr val="accent1"/>
+                </a:solidFill>
+              </a:rPr>
+              <a:t>├── xdg</a:t>
+            </a:r>
+          </a:p>
+          <a:p>
+            <a:r>
+              <a:rPr lang="en-US" dirty="0">
+                <a:solidFill>
+                  <a:schemeClr val="accent1"/>
+                </a:solidFill>
+              </a:rPr>
+              <a:t>└── apt</a:t>
+            </a:r>
             <a:endParaRPr lang="en-US" dirty="0" smtClean="0">
               <a:solidFill>
                 <a:schemeClr val="accent1"/>
@@ -14324,6 +14479,13 @@
             </a:endParaRPr>
           </a:p>
           <a:p>
+            <a:endParaRPr lang="en-US" dirty="0" smtClean="0">
+              <a:solidFill>
+                <a:schemeClr val="accent1"/>
+              </a:solidFill>
+            </a:endParaRPr>
+          </a:p>
+          <a:p>
             <a:endParaRPr lang="en-US" dirty="0">
               <a:solidFill>
                 <a:schemeClr val="accent1"/>
@@ -14340,7 +14502,7 @@
         </p:nvSpPr>
         <p:spPr>
           <a:xfrm>
-            <a:off x="3200400" y="609600"/>
+            <a:off x="3214255" y="599902"/>
             <a:ext cx="8153400" cy="646331"/>
           </a:xfrm>
           <a:prstGeom prst="rect">
@@ -14353,23 +14515,89 @@
           </a:bodyPr>
           <a:lstStyle/>
           <a:p>
-            <a:r>
-              <a:rPr lang="en-US" dirty="0"/>
-              <a:t>Contains administrative conﬁ guration </a:t>
-            </a:r>
-            <a:r>
-              <a:rPr lang="en-US" dirty="0" smtClean="0"/>
-              <a:t>ﬁles</a:t>
-            </a:r>
-            <a:r>
-              <a:rPr lang="en-US" dirty="0"/>
-              <a:t>. Most of these ﬁ les are plaintext</a:t>
-            </a:r>
-          </a:p>
-          <a:p>
-            <a:r>
-              <a:rPr lang="en-US" dirty="0"/>
-              <a:t>ﬁ les that can be edited with any text editor if the user has proper permission.</a:t>
+            <a:pPr marL="285750" indent="-285750">
+              <a:buFont typeface="Arial" panose="020B0604020202020204" pitchFamily="34" charset="0"/>
+              <a:buChar char="•"/>
+            </a:pPr>
+            <a:r>
+              <a:rPr lang="en-US" dirty="0">
+                <a:solidFill>
+                  <a:schemeClr val="accent1"/>
+                </a:solidFill>
+              </a:rPr>
+              <a:t>Contains administrative </a:t>
+            </a:r>
+            <a:r>
+              <a:rPr lang="en-US" dirty="0" smtClean="0">
+                <a:solidFill>
+                  <a:schemeClr val="accent3"/>
+                </a:solidFill>
+              </a:rPr>
+              <a:t>conﬁguration</a:t>
+            </a:r>
+            <a:r>
+              <a:rPr lang="en-US" dirty="0" smtClean="0">
+                <a:solidFill>
+                  <a:schemeClr val="accent1"/>
+                </a:solidFill>
+              </a:rPr>
+              <a:t> ﬁles</a:t>
+            </a:r>
+            <a:r>
+              <a:rPr lang="en-US" dirty="0">
+                <a:solidFill>
+                  <a:schemeClr val="accent1"/>
+                </a:solidFill>
+              </a:rPr>
+              <a:t>. </a:t>
+            </a:r>
+            <a:r>
+              <a:rPr lang="en-US" dirty="0">
+                <a:solidFill>
+                  <a:schemeClr val="accent3"/>
+                </a:solidFill>
+              </a:rPr>
+              <a:t>Most of these </a:t>
+            </a:r>
+            <a:r>
+              <a:rPr lang="en-US" dirty="0" smtClean="0">
+                <a:solidFill>
+                  <a:schemeClr val="accent3"/>
+                </a:solidFill>
+              </a:rPr>
+              <a:t>ﬁles </a:t>
+            </a:r>
+            <a:r>
+              <a:rPr lang="en-US" dirty="0">
+                <a:solidFill>
+                  <a:schemeClr val="accent3"/>
+                </a:solidFill>
+              </a:rPr>
+              <a:t>are </a:t>
+            </a:r>
+            <a:r>
+              <a:rPr lang="en-US" dirty="0" smtClean="0">
+                <a:solidFill>
+                  <a:schemeClr val="accent3"/>
+                </a:solidFill>
+              </a:rPr>
+              <a:t>plaintext </a:t>
+            </a:r>
+            <a:r>
+              <a:rPr lang="en-US" dirty="0" smtClean="0">
+                <a:solidFill>
+                  <a:schemeClr val="accent1"/>
+                </a:solidFill>
+              </a:rPr>
+              <a:t>ﬁles </a:t>
+            </a:r>
+            <a:r>
+              <a:rPr lang="en-US" dirty="0">
+                <a:solidFill>
+                  <a:schemeClr val="accent1"/>
+                </a:solidFill>
+              </a:rPr>
+              <a:t>that can be edited with any text editor if the user has proper permission.</a:t>
             </a:r>
             <a:endParaRPr lang="en-US" b="1" dirty="0">
               <a:solidFill>
@@ -14379,10 +14607,903 @@
           </a:p>
         </p:txBody>
       </p:sp>
+      <p:sp>
+        <p:nvSpPr>
+          <p:cNvPr id="4" name="Rectangle 3"/>
+          <p:cNvSpPr/>
+          <p:nvPr/>
+        </p:nvSpPr>
+        <p:spPr>
+          <a:xfrm>
+            <a:off x="3214255" y="1246233"/>
+            <a:ext cx="8153400" cy="369332"/>
+          </a:xfrm>
+          <a:prstGeom prst="rect">
+            <a:avLst/>
+          </a:prstGeom>
+        </p:spPr>
+        <p:txBody>
+          <a:bodyPr wrap="square">
+            <a:spAutoFit/>
+          </a:bodyPr>
+          <a:lstStyle/>
+          <a:p>
+            <a:pPr marL="285750" indent="-285750">
+              <a:buFont typeface="Arial" panose="020B0604020202020204" pitchFamily="34" charset="0"/>
+              <a:buChar char="•"/>
+            </a:pPr>
+            <a:r>
+              <a:rPr lang="en-US" dirty="0" smtClean="0">
+                <a:solidFill>
+                  <a:schemeClr val="accent1"/>
+                </a:solidFill>
+              </a:rPr>
+              <a:t>Almost </a:t>
+            </a:r>
+            <a:r>
+              <a:rPr lang="en-US" dirty="0" smtClean="0">
+                <a:solidFill>
+                  <a:schemeClr val="accent3"/>
+                </a:solidFill>
+              </a:rPr>
+              <a:t>Every program makes </a:t>
+            </a:r>
+            <a:r>
+              <a:rPr lang="en-US" dirty="0" smtClean="0">
+                <a:solidFill>
+                  <a:schemeClr val="accent1"/>
+                </a:solidFill>
+              </a:rPr>
+              <a:t>a file in etc folder.</a:t>
+            </a:r>
+            <a:endParaRPr lang="en-US" b="1" dirty="0">
+              <a:solidFill>
+                <a:schemeClr val="accent1"/>
+              </a:solidFill>
+            </a:endParaRPr>
+          </a:p>
+        </p:txBody>
+      </p:sp>
+      <p:sp>
+        <p:nvSpPr>
+          <p:cNvPr id="2" name="Rectangle 1"/>
+          <p:cNvSpPr/>
+          <p:nvPr/>
+        </p:nvSpPr>
+        <p:spPr>
+          <a:xfrm>
+            <a:off x="3214255" y="1752600"/>
+            <a:ext cx="8153400" cy="923330"/>
+          </a:xfrm>
+          <a:prstGeom prst="rect">
+            <a:avLst/>
+          </a:prstGeom>
+        </p:spPr>
+        <p:txBody>
+          <a:bodyPr wrap="square">
+            <a:spAutoFit/>
+          </a:bodyPr>
+          <a:lstStyle/>
+          <a:p>
+            <a:pPr marL="285750" indent="-285750">
+              <a:buFont typeface="Arial" panose="020B0604020202020204" pitchFamily="34" charset="0"/>
+              <a:buChar char="•"/>
+            </a:pPr>
+            <a:r>
+              <a:rPr lang="en-US" dirty="0" smtClean="0">
+                <a:solidFill>
+                  <a:schemeClr val="accent1"/>
+                </a:solidFill>
+              </a:rPr>
+              <a:t>For </a:t>
+            </a:r>
+            <a:r>
+              <a:rPr lang="en-US" dirty="0">
+                <a:solidFill>
+                  <a:schemeClr val="accent1"/>
+                </a:solidFill>
+              </a:rPr>
+              <a:t>example, the </a:t>
+            </a:r>
+            <a:r>
+              <a:rPr lang="en-US" dirty="0">
+                <a:solidFill>
+                  <a:schemeClr val="accent3"/>
+                </a:solidFill>
+              </a:rPr>
+              <a:t>files</a:t>
+            </a:r>
+            <a:r>
+              <a:rPr lang="en-US" dirty="0">
+                <a:solidFill>
+                  <a:schemeClr val="accent1"/>
+                </a:solidFill>
+              </a:rPr>
+              <a:t> that contain the </a:t>
+            </a:r>
+            <a:r>
+              <a:rPr lang="en-US" dirty="0">
+                <a:solidFill>
+                  <a:schemeClr val="accent3"/>
+                </a:solidFill>
+              </a:rPr>
+              <a:t>name of your system</a:t>
+            </a:r>
+            <a:r>
+              <a:rPr lang="en-US" dirty="0">
+                <a:solidFill>
+                  <a:schemeClr val="accent1"/>
+                </a:solidFill>
+              </a:rPr>
+              <a:t>, the </a:t>
+            </a:r>
+            <a:r>
+              <a:rPr lang="en-US" dirty="0">
+                <a:solidFill>
+                  <a:schemeClr val="accent3"/>
+                </a:solidFill>
+              </a:rPr>
+              <a:t>users</a:t>
+            </a:r>
+            <a:r>
+              <a:rPr lang="en-US" dirty="0">
+                <a:solidFill>
+                  <a:schemeClr val="accent1"/>
+                </a:solidFill>
+              </a:rPr>
+              <a:t> and </a:t>
+            </a:r>
+            <a:r>
+              <a:rPr lang="en-US" dirty="0" smtClean="0">
+                <a:solidFill>
+                  <a:schemeClr val="accent1"/>
+                </a:solidFill>
+              </a:rPr>
+              <a:t>their </a:t>
+            </a:r>
+            <a:r>
+              <a:rPr lang="en-US" dirty="0" smtClean="0">
+                <a:solidFill>
+                  <a:schemeClr val="accent3"/>
+                </a:solidFill>
+              </a:rPr>
+              <a:t>passwords</a:t>
+            </a:r>
+            <a:r>
+              <a:rPr lang="en-US" dirty="0">
+                <a:solidFill>
+                  <a:schemeClr val="accent1"/>
+                </a:solidFill>
+              </a:rPr>
+              <a:t>, the names of machines on your network and when and </a:t>
+            </a:r>
+            <a:r>
+              <a:rPr lang="en-US" dirty="0">
+                <a:solidFill>
+                  <a:schemeClr val="accent3"/>
+                </a:solidFill>
+              </a:rPr>
+              <a:t>where </a:t>
+            </a:r>
+            <a:r>
+              <a:rPr lang="en-US" dirty="0" smtClean="0">
+                <a:solidFill>
+                  <a:schemeClr val="accent3"/>
+                </a:solidFill>
+              </a:rPr>
+              <a:t>the partitions </a:t>
+            </a:r>
+            <a:r>
+              <a:rPr lang="en-US" dirty="0">
+                <a:solidFill>
+                  <a:schemeClr val="accent1"/>
+                </a:solidFill>
+              </a:rPr>
+              <a:t>on your hard disks should be mounted are all in here</a:t>
+            </a:r>
+          </a:p>
+        </p:txBody>
+      </p:sp>
     </p:spTree>
     <p:extLst>
       <p:ext uri="{BB962C8B-B14F-4D97-AF65-F5344CB8AC3E}">
         <p14:creationId xmlns:p14="http://schemas.microsoft.com/office/powerpoint/2010/main" val="402554910"/>
+      </p:ext>
+    </p:extLst>
+  </p:cSld>
+  <p:clrMapOvr>
+    <a:masterClrMapping/>
+  </p:clrMapOvr>
+  <p:timing>
+    <p:tnLst>
+      <p:par>
+        <p:cTn id="1" dur="indefinite" restart="never" nodeType="tmRoot"/>
+      </p:par>
+    </p:tnLst>
+  </p:timing>
+</p:sld>
+</file>
+
+<file path=ppt/slides/slide39.xml><?xml version="1.0" encoding="utf-8"?>
+<p:sld xmlns:a="http://schemas.openxmlformats.org/drawingml/2006/main" xmlns:r="http://schemas.openxmlformats.org/officeDocument/2006/relationships" xmlns:p="http://schemas.openxmlformats.org/presentationml/2006/main">
+  <p:cSld>
+    <p:spTree>
+      <p:nvGrpSpPr>
+        <p:cNvPr id="1" name=""/>
+        <p:cNvGrpSpPr/>
+        <p:nvPr/>
+      </p:nvGrpSpPr>
+      <p:grpSpPr>
+        <a:xfrm>
+          <a:off x="0" y="0"/>
+          <a:ext cx="0" cy="0"/>
+          <a:chOff x="0" y="0"/>
+          <a:chExt cx="0" cy="0"/>
+        </a:xfrm>
+      </p:grpSpPr>
+      <p:sp>
+        <p:nvSpPr>
+          <p:cNvPr id="9" name="Rectangle 8"/>
+          <p:cNvSpPr/>
+          <p:nvPr/>
+        </p:nvSpPr>
+        <p:spPr>
+          <a:xfrm>
+            <a:off x="457200" y="599902"/>
+            <a:ext cx="2590800" cy="4801314"/>
+          </a:xfrm>
+          <a:prstGeom prst="rect">
+            <a:avLst/>
+          </a:prstGeom>
+        </p:spPr>
+        <p:txBody>
+          <a:bodyPr wrap="square">
+            <a:spAutoFit/>
+          </a:bodyPr>
+          <a:lstStyle/>
+          <a:p>
+            <a:r>
+              <a:rPr lang="en-US" dirty="0"/>
+              <a:t>/lib</a:t>
+            </a:r>
+          </a:p>
+          <a:p>
+            <a:r>
+              <a:rPr lang="en-US" dirty="0">
+                <a:solidFill>
+                  <a:schemeClr val="accent1"/>
+                </a:solidFill>
+              </a:rPr>
+              <a:t>├── apparmor</a:t>
+            </a:r>
+          </a:p>
+          <a:p>
+            <a:r>
+              <a:rPr lang="en-US" dirty="0">
+                <a:solidFill>
+                  <a:schemeClr val="accent1"/>
+                </a:solidFill>
+              </a:rPr>
+              <a:t>├── brltty</a:t>
+            </a:r>
+          </a:p>
+          <a:p>
+            <a:r>
+              <a:rPr lang="en-US" dirty="0" smtClean="0">
+                <a:solidFill>
+                  <a:schemeClr val="accent1"/>
+                </a:solidFill>
+              </a:rPr>
+              <a:t>├── </a:t>
+            </a:r>
+            <a:r>
+              <a:rPr lang="en-US" dirty="0">
+                <a:solidFill>
+                  <a:schemeClr val="accent1"/>
+                </a:solidFill>
+              </a:rPr>
+              <a:t>crda</a:t>
+            </a:r>
+          </a:p>
+          <a:p>
+            <a:r>
+              <a:rPr lang="en-US" dirty="0" smtClean="0">
+                <a:solidFill>
+                  <a:schemeClr val="accent1"/>
+                </a:solidFill>
+              </a:rPr>
+              <a:t>├── </a:t>
+            </a:r>
+            <a:r>
+              <a:rPr lang="en-US" dirty="0">
+                <a:solidFill>
+                  <a:schemeClr val="accent1"/>
+                </a:solidFill>
+              </a:rPr>
+              <a:t>hdparm</a:t>
+            </a:r>
+          </a:p>
+          <a:p>
+            <a:r>
+              <a:rPr lang="en-US" dirty="0" smtClean="0">
+                <a:solidFill>
+                  <a:schemeClr val="accent1"/>
+                </a:solidFill>
+              </a:rPr>
+              <a:t>├── </a:t>
+            </a:r>
+            <a:r>
+              <a:rPr lang="en-US" dirty="0">
+                <a:solidFill>
+                  <a:schemeClr val="accent1"/>
+                </a:solidFill>
+              </a:rPr>
+              <a:t>init</a:t>
+            </a:r>
+          </a:p>
+          <a:p>
+            <a:r>
+              <a:rPr lang="en-US" dirty="0">
+                <a:solidFill>
+                  <a:schemeClr val="accent1"/>
+                </a:solidFill>
+              </a:rPr>
+              <a:t>├── </a:t>
+            </a:r>
+            <a:r>
+              <a:rPr lang="en-US" dirty="0" smtClean="0">
+                <a:solidFill>
+                  <a:schemeClr val="accent1"/>
+                </a:solidFill>
+              </a:rPr>
+              <a:t>klibc</a:t>
+            </a:r>
+          </a:p>
+          <a:p>
+            <a:r>
+              <a:rPr lang="en-US" dirty="0" smtClean="0">
+                <a:solidFill>
+                  <a:schemeClr val="accent1"/>
+                </a:solidFill>
+              </a:rPr>
+              <a:t>├── </a:t>
+            </a:r>
+            <a:r>
+              <a:rPr lang="en-US" dirty="0">
+                <a:solidFill>
+                  <a:schemeClr val="accent1"/>
+                </a:solidFill>
+              </a:rPr>
+              <a:t>linux-sound-base</a:t>
+            </a:r>
+          </a:p>
+          <a:p>
+            <a:r>
+              <a:rPr lang="en-US" dirty="0">
+                <a:solidFill>
+                  <a:schemeClr val="accent1"/>
+                </a:solidFill>
+              </a:rPr>
+              <a:t>├── lsb</a:t>
+            </a:r>
+          </a:p>
+          <a:p>
+            <a:r>
+              <a:rPr lang="en-US" dirty="0">
+                <a:solidFill>
+                  <a:schemeClr val="accent1"/>
+                </a:solidFill>
+              </a:rPr>
+              <a:t>├── modprobe.d</a:t>
+            </a:r>
+          </a:p>
+          <a:p>
+            <a:r>
+              <a:rPr lang="en-US" dirty="0">
+                <a:solidFill>
+                  <a:schemeClr val="accent1"/>
+                </a:solidFill>
+              </a:rPr>
+              <a:t>├── modules</a:t>
+            </a:r>
+          </a:p>
+          <a:p>
+            <a:r>
+              <a:rPr lang="en-US" dirty="0">
+                <a:solidFill>
+                  <a:schemeClr val="accent1"/>
+                </a:solidFill>
+              </a:rPr>
+              <a:t>├── netplan</a:t>
+            </a:r>
+          </a:p>
+          <a:p>
+            <a:r>
+              <a:rPr lang="en-US" dirty="0" smtClean="0">
+                <a:solidFill>
+                  <a:schemeClr val="accent1"/>
+                </a:solidFill>
+              </a:rPr>
+              <a:t>├── </a:t>
+            </a:r>
+            <a:r>
+              <a:rPr lang="en-US" dirty="0">
+                <a:solidFill>
+                  <a:schemeClr val="accent1"/>
+                </a:solidFill>
+              </a:rPr>
+              <a:t>systemd</a:t>
+            </a:r>
+          </a:p>
+          <a:p>
+            <a:r>
+              <a:rPr lang="en-US" dirty="0">
+                <a:solidFill>
+                  <a:schemeClr val="accent1"/>
+                </a:solidFill>
+              </a:rPr>
+              <a:t>├── terminfo</a:t>
+            </a:r>
+          </a:p>
+          <a:p>
+            <a:r>
+              <a:rPr lang="en-US" dirty="0">
+                <a:solidFill>
+                  <a:schemeClr val="accent1"/>
+                </a:solidFill>
+              </a:rPr>
+              <a:t>├── udev</a:t>
+            </a:r>
+          </a:p>
+          <a:p>
+            <a:r>
+              <a:rPr lang="en-US" dirty="0" smtClean="0">
+                <a:solidFill>
+                  <a:schemeClr val="accent1"/>
+                </a:solidFill>
+              </a:rPr>
+              <a:t>└── </a:t>
+            </a:r>
+            <a:r>
+              <a:rPr lang="en-US" dirty="0">
+                <a:solidFill>
+                  <a:schemeClr val="accent1"/>
+                </a:solidFill>
+              </a:rPr>
+              <a:t>ufw</a:t>
+            </a:r>
+            <a:endParaRPr lang="en-US" dirty="0" smtClean="0">
+              <a:solidFill>
+                <a:schemeClr val="accent1"/>
+              </a:solidFill>
+            </a:endParaRPr>
+          </a:p>
+          <a:p>
+            <a:endParaRPr lang="en-US" dirty="0">
+              <a:solidFill>
+                <a:schemeClr val="accent1"/>
+              </a:solidFill>
+            </a:endParaRPr>
+          </a:p>
+        </p:txBody>
+      </p:sp>
+      <p:sp>
+        <p:nvSpPr>
+          <p:cNvPr id="8" name="Rectangle 7"/>
+          <p:cNvSpPr/>
+          <p:nvPr/>
+        </p:nvSpPr>
+        <p:spPr>
+          <a:xfrm>
+            <a:off x="3214255" y="599902"/>
+            <a:ext cx="8153400" cy="646331"/>
+          </a:xfrm>
+          <a:prstGeom prst="rect">
+            <a:avLst/>
+          </a:prstGeom>
+        </p:spPr>
+        <p:txBody>
+          <a:bodyPr wrap="square">
+            <a:spAutoFit/>
+          </a:bodyPr>
+          <a:lstStyle/>
+          <a:p>
+            <a:pPr marL="285750" indent="-285750">
+              <a:buFont typeface="Arial" panose="020B0604020202020204" pitchFamily="34" charset="0"/>
+              <a:buChar char="•"/>
+            </a:pPr>
+            <a:r>
+              <a:rPr lang="en-US" dirty="0" smtClean="0">
+                <a:solidFill>
+                  <a:schemeClr val="accent1"/>
+                </a:solidFill>
+              </a:rPr>
+              <a:t>a </a:t>
+            </a:r>
+            <a:r>
+              <a:rPr lang="en-US" dirty="0">
+                <a:solidFill>
+                  <a:schemeClr val="accent1"/>
+                </a:solidFill>
+              </a:rPr>
+              <a:t>library is an </a:t>
+            </a:r>
+            <a:r>
+              <a:rPr lang="en-US" dirty="0">
+                <a:solidFill>
+                  <a:schemeClr val="accent3"/>
+                </a:solidFill>
+              </a:rPr>
+              <a:t>assortment</a:t>
+            </a:r>
+            <a:r>
+              <a:rPr lang="en-US" dirty="0">
+                <a:solidFill>
+                  <a:schemeClr val="accent1"/>
+                </a:solidFill>
+              </a:rPr>
+              <a:t> of </a:t>
+            </a:r>
+            <a:r>
+              <a:rPr lang="en-US" dirty="0">
+                <a:solidFill>
+                  <a:schemeClr val="accent3"/>
+                </a:solidFill>
+              </a:rPr>
+              <a:t>pre-compiled</a:t>
+            </a:r>
+            <a:r>
+              <a:rPr lang="en-US" dirty="0">
+                <a:solidFill>
+                  <a:schemeClr val="accent1"/>
+                </a:solidFill>
+              </a:rPr>
+              <a:t> pieces of code that can be reused in a program</a:t>
+            </a:r>
+            <a:endParaRPr lang="en-US" b="1" dirty="0">
+              <a:solidFill>
+                <a:schemeClr val="accent1"/>
+              </a:solidFill>
+            </a:endParaRPr>
+          </a:p>
+        </p:txBody>
+      </p:sp>
+      <p:sp>
+        <p:nvSpPr>
+          <p:cNvPr id="4" name="Rectangle 3"/>
+          <p:cNvSpPr/>
+          <p:nvPr/>
+        </p:nvSpPr>
+        <p:spPr>
+          <a:xfrm>
+            <a:off x="3214255" y="1447800"/>
+            <a:ext cx="8153400" cy="646331"/>
+          </a:xfrm>
+          <a:prstGeom prst="rect">
+            <a:avLst/>
+          </a:prstGeom>
+        </p:spPr>
+        <p:txBody>
+          <a:bodyPr wrap="square">
+            <a:spAutoFit/>
+          </a:bodyPr>
+          <a:lstStyle/>
+          <a:p>
+            <a:pPr marL="742950" lvl="1" indent="-285750" fontAlgn="base">
+              <a:buFont typeface="Arial" panose="020B0604020202020204" pitchFamily="34" charset="0"/>
+              <a:buChar char="•"/>
+            </a:pPr>
+            <a:r>
+              <a:rPr lang="en-US" dirty="0">
+                <a:solidFill>
+                  <a:schemeClr val="accent6"/>
+                </a:solidFill>
+              </a:rPr>
+              <a:t>Static libraries </a:t>
+            </a:r>
+            <a:r>
+              <a:rPr lang="en-US" dirty="0">
+                <a:solidFill>
+                  <a:schemeClr val="accent1"/>
+                </a:solidFill>
+              </a:rPr>
+              <a:t>– are bound to a program statically at </a:t>
+            </a:r>
+            <a:r>
+              <a:rPr lang="en-US" dirty="0">
+                <a:solidFill>
+                  <a:schemeClr val="accent3"/>
+                </a:solidFill>
+              </a:rPr>
+              <a:t>compile time</a:t>
+            </a:r>
+            <a:r>
+              <a:rPr lang="en-US" dirty="0" smtClean="0">
+                <a:solidFill>
+                  <a:schemeClr val="accent3"/>
+                </a:solidFill>
+              </a:rPr>
+              <a:t>.</a:t>
+            </a:r>
+          </a:p>
+          <a:p>
+            <a:pPr marL="285750" indent="-285750" fontAlgn="base">
+              <a:buFont typeface="Arial" panose="020B0604020202020204" pitchFamily="34" charset="0"/>
+              <a:buChar char="•"/>
+            </a:pPr>
+            <a:endParaRPr lang="en-US" dirty="0"/>
+          </a:p>
+        </p:txBody>
+      </p:sp>
+      <p:sp>
+        <p:nvSpPr>
+          <p:cNvPr id="3" name="Rectangle 2"/>
+          <p:cNvSpPr/>
+          <p:nvPr/>
+        </p:nvSpPr>
+        <p:spPr>
+          <a:xfrm>
+            <a:off x="3214255" y="2020669"/>
+            <a:ext cx="8140931" cy="646331"/>
+          </a:xfrm>
+          <a:prstGeom prst="rect">
+            <a:avLst/>
+          </a:prstGeom>
+        </p:spPr>
+        <p:txBody>
+          <a:bodyPr wrap="square">
+            <a:spAutoFit/>
+          </a:bodyPr>
+          <a:lstStyle/>
+          <a:p>
+            <a:pPr marL="742950" lvl="1" indent="-285750" fontAlgn="base">
+              <a:buFont typeface="Arial" panose="020B0604020202020204" pitchFamily="34" charset="0"/>
+              <a:buChar char="•"/>
+            </a:pPr>
+            <a:r>
+              <a:rPr lang="en-US" dirty="0">
+                <a:solidFill>
+                  <a:schemeClr val="accent6"/>
+                </a:solidFill>
+              </a:rPr>
+              <a:t>Dynamic or shared libraries</a:t>
+            </a:r>
+            <a:r>
+              <a:rPr lang="en-US" dirty="0">
+                <a:solidFill>
+                  <a:schemeClr val="accent1"/>
+                </a:solidFill>
+              </a:rPr>
+              <a:t> – are loaded when a program is </a:t>
+            </a:r>
+            <a:r>
+              <a:rPr lang="en-US" dirty="0">
+                <a:solidFill>
+                  <a:schemeClr val="accent3"/>
+                </a:solidFill>
+              </a:rPr>
+              <a:t>launched</a:t>
+            </a:r>
+            <a:r>
+              <a:rPr lang="en-US" dirty="0">
+                <a:solidFill>
+                  <a:schemeClr val="accent1"/>
+                </a:solidFill>
+              </a:rPr>
+              <a:t> and </a:t>
+            </a:r>
+            <a:r>
+              <a:rPr lang="en-US" dirty="0">
+                <a:solidFill>
+                  <a:schemeClr val="accent3"/>
+                </a:solidFill>
+              </a:rPr>
+              <a:t>loaded into memory</a:t>
+            </a:r>
+            <a:r>
+              <a:rPr lang="en-US" dirty="0">
+                <a:solidFill>
+                  <a:schemeClr val="accent1"/>
+                </a:solidFill>
+              </a:rPr>
+              <a:t> and binding occurs at </a:t>
+            </a:r>
+            <a:r>
+              <a:rPr lang="en-US" dirty="0">
+                <a:solidFill>
+                  <a:schemeClr val="accent3"/>
+                </a:solidFill>
+              </a:rPr>
+              <a:t>run</a:t>
+            </a:r>
+          </a:p>
+        </p:txBody>
+      </p:sp>
+      <p:sp>
+        <p:nvSpPr>
+          <p:cNvPr id="2" name="Rectangle 1"/>
+          <p:cNvSpPr/>
+          <p:nvPr/>
+        </p:nvSpPr>
+        <p:spPr>
+          <a:xfrm>
+            <a:off x="3214255" y="2819400"/>
+            <a:ext cx="7697586" cy="923330"/>
+          </a:xfrm>
+          <a:prstGeom prst="rect">
+            <a:avLst/>
+          </a:prstGeom>
+        </p:spPr>
+        <p:txBody>
+          <a:bodyPr wrap="square">
+            <a:spAutoFit/>
+          </a:bodyPr>
+          <a:lstStyle/>
+          <a:p>
+            <a:pPr marL="285750" indent="-285750">
+              <a:buFont typeface="Arial" panose="020B0604020202020204" pitchFamily="34" charset="0"/>
+              <a:buChar char="•"/>
+            </a:pPr>
+            <a:r>
+              <a:rPr lang="en-US" dirty="0">
+                <a:solidFill>
+                  <a:schemeClr val="accent1"/>
+                </a:solidFill>
+              </a:rPr>
+              <a:t>There are </a:t>
+            </a:r>
+            <a:r>
+              <a:rPr lang="en-US" dirty="0">
+                <a:solidFill>
+                  <a:schemeClr val="accent3"/>
+                </a:solidFill>
+              </a:rPr>
+              <a:t>more </a:t>
+            </a:r>
+            <a:r>
+              <a:rPr lang="en-US" i="1" dirty="0">
+                <a:solidFill>
+                  <a:schemeClr val="accent3"/>
+                </a:solidFill>
+              </a:rPr>
+              <a:t>lib</a:t>
+            </a:r>
+            <a:r>
+              <a:rPr lang="en-US" dirty="0">
+                <a:solidFill>
+                  <a:schemeClr val="accent1"/>
+                </a:solidFill>
+              </a:rPr>
+              <a:t> directories </a:t>
+            </a:r>
+            <a:r>
+              <a:rPr lang="en-US" dirty="0">
+                <a:solidFill>
+                  <a:schemeClr val="accent3"/>
+                </a:solidFill>
+              </a:rPr>
+              <a:t>scattered around the file system</a:t>
+            </a:r>
+            <a:r>
+              <a:rPr lang="en-US" dirty="0">
+                <a:solidFill>
+                  <a:schemeClr val="accent1"/>
+                </a:solidFill>
+              </a:rPr>
+              <a:t>, but this one, the one </a:t>
+            </a:r>
+            <a:r>
+              <a:rPr lang="en-US" dirty="0">
+                <a:solidFill>
+                  <a:schemeClr val="accent3"/>
+                </a:solidFill>
+              </a:rPr>
+              <a:t>hanging directly off of </a:t>
+            </a:r>
+            <a:r>
+              <a:rPr lang="en-US" i="1" dirty="0">
+                <a:solidFill>
+                  <a:schemeClr val="accent3"/>
+                </a:solidFill>
+              </a:rPr>
+              <a:t>/</a:t>
+            </a:r>
+            <a:r>
+              <a:rPr lang="en-US" dirty="0">
+                <a:solidFill>
+                  <a:schemeClr val="accent3"/>
+                </a:solidFill>
+              </a:rPr>
+              <a:t> </a:t>
+            </a:r>
+            <a:r>
+              <a:rPr lang="en-US" dirty="0">
+                <a:solidFill>
+                  <a:schemeClr val="accent1"/>
+                </a:solidFill>
+              </a:rPr>
+              <a:t>is special in that, among other things, </a:t>
+            </a:r>
+            <a:r>
+              <a:rPr lang="en-US" dirty="0">
+                <a:solidFill>
+                  <a:schemeClr val="accent3"/>
+                </a:solidFill>
+              </a:rPr>
+              <a:t>it contains the all-important kernel modules</a:t>
+            </a:r>
+            <a:r>
+              <a:rPr lang="en-US" dirty="0">
+                <a:solidFill>
+                  <a:schemeClr val="accent1"/>
+                </a:solidFill>
+              </a:rPr>
+              <a:t>. </a:t>
+            </a:r>
+          </a:p>
+        </p:txBody>
+      </p:sp>
+      <p:sp>
+        <p:nvSpPr>
+          <p:cNvPr id="7" name="Rectangle 6"/>
+          <p:cNvSpPr/>
+          <p:nvPr/>
+        </p:nvSpPr>
+        <p:spPr>
+          <a:xfrm>
+            <a:off x="3214255" y="3801070"/>
+            <a:ext cx="7697586" cy="369332"/>
+          </a:xfrm>
+          <a:prstGeom prst="rect">
+            <a:avLst/>
+          </a:prstGeom>
+        </p:spPr>
+        <p:txBody>
+          <a:bodyPr wrap="square">
+            <a:spAutoFit/>
+          </a:bodyPr>
+          <a:lstStyle/>
+          <a:p>
+            <a:pPr marL="285750" indent="-285750">
+              <a:buFont typeface="Arial" panose="020B0604020202020204" pitchFamily="34" charset="0"/>
+              <a:buChar char="•"/>
+            </a:pPr>
+            <a:r>
+              <a:rPr lang="en-US" dirty="0" smtClean="0">
+                <a:solidFill>
+                  <a:schemeClr val="accent1"/>
+                </a:solidFill>
+              </a:rPr>
+              <a:t>lib holds </a:t>
+            </a:r>
+            <a:r>
+              <a:rPr lang="en-US" dirty="0" smtClean="0">
+                <a:solidFill>
+                  <a:schemeClr val="accent3"/>
+                </a:solidFill>
+              </a:rPr>
+              <a:t>32 bit </a:t>
+            </a:r>
+            <a:r>
+              <a:rPr lang="en-US" dirty="0" smtClean="0">
+                <a:solidFill>
+                  <a:schemeClr val="accent1"/>
+                </a:solidFill>
+              </a:rPr>
+              <a:t>libraries</a:t>
+            </a:r>
+            <a:endParaRPr lang="en-US" dirty="0">
+              <a:solidFill>
+                <a:schemeClr val="accent1"/>
+              </a:solidFill>
+            </a:endParaRPr>
+          </a:p>
+        </p:txBody>
+      </p:sp>
+    </p:spTree>
+    <p:extLst>
+      <p:ext uri="{BB962C8B-B14F-4D97-AF65-F5344CB8AC3E}">
+        <p14:creationId xmlns:p14="http://schemas.microsoft.com/office/powerpoint/2010/main" val="2536094547"/>
       </p:ext>
     </p:extLst>
   </p:cSld>
@@ -14452,6 +15573,375 @@
     <p:extLst>
       <p:ext uri="{BB962C8B-B14F-4D97-AF65-F5344CB8AC3E}">
         <p14:creationId xmlns:p14="http://schemas.microsoft.com/office/powerpoint/2010/main" val="2238825460"/>
+      </p:ext>
+    </p:extLst>
+  </p:cSld>
+  <p:clrMapOvr>
+    <a:masterClrMapping/>
+  </p:clrMapOvr>
+  <p:timing>
+    <p:tnLst>
+      <p:par>
+        <p:cTn id="1" dur="indefinite" restart="never" nodeType="tmRoot"/>
+      </p:par>
+    </p:tnLst>
+  </p:timing>
+</p:sld>
+</file>
+
+<file path=ppt/slides/slide40.xml><?xml version="1.0" encoding="utf-8"?>
+<p:sld xmlns:a="http://schemas.openxmlformats.org/drawingml/2006/main" xmlns:r="http://schemas.openxmlformats.org/officeDocument/2006/relationships" xmlns:p="http://schemas.openxmlformats.org/presentationml/2006/main">
+  <p:cSld>
+    <p:spTree>
+      <p:nvGrpSpPr>
+        <p:cNvPr id="1" name=""/>
+        <p:cNvGrpSpPr/>
+        <p:nvPr/>
+      </p:nvGrpSpPr>
+      <p:grpSpPr>
+        <a:xfrm>
+          <a:off x="0" y="0"/>
+          <a:ext cx="0" cy="0"/>
+          <a:chOff x="0" y="0"/>
+          <a:chExt cx="0" cy="0"/>
+        </a:xfrm>
+      </p:grpSpPr>
+      <p:sp>
+        <p:nvSpPr>
+          <p:cNvPr id="9" name="Rectangle 8"/>
+          <p:cNvSpPr/>
+          <p:nvPr/>
+        </p:nvSpPr>
+        <p:spPr>
+          <a:xfrm>
+            <a:off x="457200" y="599902"/>
+            <a:ext cx="2590800" cy="369332"/>
+          </a:xfrm>
+          <a:prstGeom prst="rect">
+            <a:avLst/>
+          </a:prstGeom>
+        </p:spPr>
+        <p:txBody>
+          <a:bodyPr wrap="square">
+            <a:spAutoFit/>
+          </a:bodyPr>
+          <a:lstStyle/>
+          <a:p>
+            <a:r>
+              <a:rPr lang="en-US" dirty="0" smtClean="0"/>
+              <a:t>/lib64</a:t>
+            </a:r>
+            <a:endParaRPr lang="en-US" dirty="0"/>
+          </a:p>
+        </p:txBody>
+      </p:sp>
+      <p:sp>
+        <p:nvSpPr>
+          <p:cNvPr id="10" name="Rectangle 9"/>
+          <p:cNvSpPr/>
+          <p:nvPr/>
+        </p:nvSpPr>
+        <p:spPr>
+          <a:xfrm>
+            <a:off x="3046615" y="982504"/>
+            <a:ext cx="8153400" cy="369332"/>
+          </a:xfrm>
+          <a:prstGeom prst="rect">
+            <a:avLst/>
+          </a:prstGeom>
+        </p:spPr>
+        <p:txBody>
+          <a:bodyPr wrap="square">
+            <a:spAutoFit/>
+          </a:bodyPr>
+          <a:lstStyle/>
+          <a:p>
+            <a:pPr marL="285750" indent="-285750">
+              <a:buFont typeface="Arial" panose="020B0604020202020204" pitchFamily="34" charset="0"/>
+              <a:buChar char="•"/>
+            </a:pPr>
+            <a:r>
+              <a:rPr lang="en-US" dirty="0" smtClean="0">
+                <a:solidFill>
+                  <a:schemeClr val="accent1"/>
+                </a:solidFill>
+              </a:rPr>
+              <a:t>lib64 contains 64 bit libraries.</a:t>
+            </a:r>
+            <a:endParaRPr lang="en-US" b="1" dirty="0">
+              <a:solidFill>
+                <a:schemeClr val="accent1"/>
+              </a:solidFill>
+            </a:endParaRPr>
+          </a:p>
+        </p:txBody>
+      </p:sp>
+    </p:spTree>
+    <p:extLst>
+      <p:ext uri="{BB962C8B-B14F-4D97-AF65-F5344CB8AC3E}">
+        <p14:creationId xmlns:p14="http://schemas.microsoft.com/office/powerpoint/2010/main" val="1034765634"/>
+      </p:ext>
+    </p:extLst>
+  </p:cSld>
+  <p:clrMapOvr>
+    <a:masterClrMapping/>
+  </p:clrMapOvr>
+  <p:timing>
+    <p:tnLst>
+      <p:par>
+        <p:cTn id="1" dur="indefinite" restart="never" nodeType="tmRoot"/>
+      </p:par>
+    </p:tnLst>
+  </p:timing>
+</p:sld>
+</file>
+
+<file path=ppt/slides/slide41.xml><?xml version="1.0" encoding="utf-8"?>
+<p:sld xmlns:a="http://schemas.openxmlformats.org/drawingml/2006/main" xmlns:r="http://schemas.openxmlformats.org/officeDocument/2006/relationships" xmlns:p="http://schemas.openxmlformats.org/presentationml/2006/main">
+  <p:cSld>
+    <p:spTree>
+      <p:nvGrpSpPr>
+        <p:cNvPr id="1" name=""/>
+        <p:cNvGrpSpPr/>
+        <p:nvPr/>
+      </p:nvGrpSpPr>
+      <p:grpSpPr>
+        <a:xfrm>
+          <a:off x="0" y="0"/>
+          <a:ext cx="0" cy="0"/>
+          <a:chOff x="0" y="0"/>
+          <a:chExt cx="0" cy="0"/>
+        </a:xfrm>
+      </p:grpSpPr>
+      <p:sp>
+        <p:nvSpPr>
+          <p:cNvPr id="9" name="Rectangle 8"/>
+          <p:cNvSpPr/>
+          <p:nvPr/>
+        </p:nvSpPr>
+        <p:spPr>
+          <a:xfrm>
+            <a:off x="457200" y="599902"/>
+            <a:ext cx="2590800" cy="369332"/>
+          </a:xfrm>
+          <a:prstGeom prst="rect">
+            <a:avLst/>
+          </a:prstGeom>
+        </p:spPr>
+        <p:txBody>
+          <a:bodyPr wrap="square">
+            <a:spAutoFit/>
+          </a:bodyPr>
+          <a:lstStyle/>
+          <a:p>
+            <a:r>
+              <a:rPr lang="en-US" dirty="0" smtClean="0"/>
+              <a:t>/media</a:t>
+            </a:r>
+            <a:endParaRPr lang="en-US" dirty="0"/>
+          </a:p>
+        </p:txBody>
+      </p:sp>
+      <p:sp>
+        <p:nvSpPr>
+          <p:cNvPr id="10" name="Rectangle 9"/>
+          <p:cNvSpPr/>
+          <p:nvPr/>
+        </p:nvSpPr>
+        <p:spPr>
+          <a:xfrm>
+            <a:off x="3048000" y="969234"/>
+            <a:ext cx="8153400" cy="646331"/>
+          </a:xfrm>
+          <a:prstGeom prst="rect">
+            <a:avLst/>
+          </a:prstGeom>
+        </p:spPr>
+        <p:txBody>
+          <a:bodyPr wrap="square">
+            <a:spAutoFit/>
+          </a:bodyPr>
+          <a:lstStyle/>
+          <a:p>
+            <a:pPr marL="285750" indent="-285750">
+              <a:buFont typeface="Arial" panose="020B0604020202020204" pitchFamily="34" charset="0"/>
+              <a:buChar char="•"/>
+            </a:pPr>
+            <a:r>
+              <a:rPr lang="en-US" dirty="0">
+                <a:solidFill>
+                  <a:schemeClr val="accent1"/>
+                </a:solidFill>
+              </a:rPr>
+              <a:t>The </a:t>
+            </a:r>
+            <a:r>
+              <a:rPr lang="en-US" i="1" dirty="0">
+                <a:solidFill>
+                  <a:schemeClr val="accent1"/>
+                </a:solidFill>
+              </a:rPr>
+              <a:t>/media</a:t>
+            </a:r>
+            <a:r>
+              <a:rPr lang="en-US" dirty="0">
+                <a:solidFill>
+                  <a:schemeClr val="accent1"/>
+                </a:solidFill>
+              </a:rPr>
+              <a:t> directory is </a:t>
+            </a:r>
+            <a:r>
+              <a:rPr lang="en-US" dirty="0">
+                <a:solidFill>
+                  <a:schemeClr val="accent3"/>
+                </a:solidFill>
+              </a:rPr>
+              <a:t>where external storage </a:t>
+            </a:r>
+            <a:r>
+              <a:rPr lang="en-US" dirty="0">
+                <a:solidFill>
+                  <a:schemeClr val="accent1"/>
+                </a:solidFill>
+              </a:rPr>
+              <a:t>will be </a:t>
+            </a:r>
+            <a:r>
+              <a:rPr lang="en-US" dirty="0">
+                <a:solidFill>
+                  <a:schemeClr val="accent3"/>
+                </a:solidFill>
+              </a:rPr>
+              <a:t>automatically mounted </a:t>
+            </a:r>
+            <a:r>
+              <a:rPr lang="en-US" dirty="0">
+                <a:solidFill>
+                  <a:schemeClr val="accent1"/>
+                </a:solidFill>
+              </a:rPr>
+              <a:t>when you plug it in and try to access</a:t>
+            </a:r>
+            <a:endParaRPr lang="en-US" b="1" dirty="0">
+              <a:solidFill>
+                <a:schemeClr val="accent1"/>
+              </a:solidFill>
+            </a:endParaRPr>
+          </a:p>
+        </p:txBody>
+      </p:sp>
+    </p:spTree>
+    <p:extLst>
+      <p:ext uri="{BB962C8B-B14F-4D97-AF65-F5344CB8AC3E}">
+        <p14:creationId xmlns:p14="http://schemas.microsoft.com/office/powerpoint/2010/main" val="1014269410"/>
+      </p:ext>
+    </p:extLst>
+  </p:cSld>
+  <p:clrMapOvr>
+    <a:masterClrMapping/>
+  </p:clrMapOvr>
+  <p:timing>
+    <p:tnLst>
+      <p:par>
+        <p:cTn id="1" dur="indefinite" restart="never" nodeType="tmRoot"/>
+      </p:par>
+    </p:tnLst>
+  </p:timing>
+</p:sld>
+</file>
+
+<file path=ppt/slides/slide42.xml><?xml version="1.0" encoding="utf-8"?>
+<p:sld xmlns:a="http://schemas.openxmlformats.org/drawingml/2006/main" xmlns:r="http://schemas.openxmlformats.org/officeDocument/2006/relationships" xmlns:p="http://schemas.openxmlformats.org/presentationml/2006/main">
+  <p:cSld>
+    <p:spTree>
+      <p:nvGrpSpPr>
+        <p:cNvPr id="1" name=""/>
+        <p:cNvGrpSpPr/>
+        <p:nvPr/>
+      </p:nvGrpSpPr>
+      <p:grpSpPr>
+        <a:xfrm>
+          <a:off x="0" y="0"/>
+          <a:ext cx="0" cy="0"/>
+          <a:chOff x="0" y="0"/>
+          <a:chExt cx="0" cy="0"/>
+        </a:xfrm>
+      </p:grpSpPr>
+      <p:sp>
+        <p:nvSpPr>
+          <p:cNvPr id="9" name="Rectangle 8"/>
+          <p:cNvSpPr/>
+          <p:nvPr/>
+        </p:nvSpPr>
+        <p:spPr>
+          <a:xfrm>
+            <a:off x="457200" y="599902"/>
+            <a:ext cx="2590800" cy="369332"/>
+          </a:xfrm>
+          <a:prstGeom prst="rect">
+            <a:avLst/>
+          </a:prstGeom>
+        </p:spPr>
+        <p:txBody>
+          <a:bodyPr wrap="square">
+            <a:spAutoFit/>
+          </a:bodyPr>
+          <a:lstStyle/>
+          <a:p>
+            <a:r>
+              <a:rPr lang="en-US" dirty="0" smtClean="0"/>
+              <a:t>/mnt</a:t>
+            </a:r>
+            <a:endParaRPr lang="en-US" dirty="0"/>
+          </a:p>
+        </p:txBody>
+      </p:sp>
+      <p:sp>
+        <p:nvSpPr>
+          <p:cNvPr id="10" name="Rectangle 9"/>
+          <p:cNvSpPr/>
+          <p:nvPr/>
+        </p:nvSpPr>
+        <p:spPr>
+          <a:xfrm>
+            <a:off x="3048000" y="969234"/>
+            <a:ext cx="8153400" cy="646331"/>
+          </a:xfrm>
+          <a:prstGeom prst="rect">
+            <a:avLst/>
+          </a:prstGeom>
+        </p:spPr>
+        <p:txBody>
+          <a:bodyPr wrap="square">
+            <a:spAutoFit/>
+          </a:bodyPr>
+          <a:lstStyle/>
+          <a:p>
+            <a:pPr marL="285750" indent="-285750">
+              <a:buFont typeface="Arial" panose="020B0604020202020204" pitchFamily="34" charset="0"/>
+              <a:buChar char="•"/>
+            </a:pPr>
+            <a:r>
+              <a:rPr lang="en-US" dirty="0">
+                <a:solidFill>
+                  <a:schemeClr val="accent1"/>
+                </a:solidFill>
+              </a:rPr>
+              <a:t>This is where you would manually mount storage devices or partitions. It is not used very often nowadays.</a:t>
+            </a:r>
+            <a:endParaRPr lang="en-US" b="1" dirty="0">
+              <a:solidFill>
+                <a:schemeClr val="accent1"/>
+              </a:solidFill>
+            </a:endParaRPr>
+          </a:p>
+        </p:txBody>
+      </p:sp>
+    </p:spTree>
+    <p:extLst>
+      <p:ext uri="{BB962C8B-B14F-4D97-AF65-F5344CB8AC3E}">
+        <p14:creationId xmlns:p14="http://schemas.microsoft.com/office/powerpoint/2010/main" val="2643463877"/>
       </p:ext>
     </p:extLst>
   </p:cSld>

</xml_diff>

<commit_message>
Just a little fix
</commit_message>
<xml_diff>
--- a/PowerPoint/amirkabir_linux_festival.pptx
+++ b/PowerPoint/amirkabir_linux_festival.pptx
@@ -5,10 +5,10 @@
     <p:sldMasterId id="2147483648" r:id="rId1"/>
   </p:sldMasterIdLst>
   <p:notesMasterIdLst>
-    <p:notesMasterId r:id="rId44"/>
+    <p:notesMasterId r:id="rId46"/>
   </p:notesMasterIdLst>
   <p:handoutMasterIdLst>
-    <p:handoutMasterId r:id="rId45"/>
+    <p:handoutMasterId r:id="rId47"/>
   </p:handoutMasterIdLst>
   <p:sldIdLst>
     <p:sldId id="256" r:id="rId2"/>
@@ -53,6 +53,8 @@
     <p:sldId id="303" r:id="rId41"/>
     <p:sldId id="304" r:id="rId42"/>
     <p:sldId id="306" r:id="rId43"/>
+    <p:sldId id="307" r:id="rId44"/>
+    <p:sldId id="308" r:id="rId45"/>
   </p:sldIdLst>
   <p:sldSz cx="12192000" cy="6858000"/>
   <p:notesSz cx="6858000" cy="9144000"/>
@@ -14192,7 +14194,23 @@
                   <a:schemeClr val="accent1"/>
                 </a:solidFill>
               </a:rPr>
-              <a:t>terminal devices (tty*), ﬂ oppy disks (fd*), hard disks (hd* or sd*), </a:t>
+              <a:t>terminal devices (tty*), ﬂ oppy disks (fd*), hard disks </a:t>
+            </a:r>
+            <a:r>
+              <a:rPr lang="en-US" dirty="0" smtClean="0">
+                <a:solidFill>
+                  <a:schemeClr val="accent1"/>
+                </a:solidFill>
+              </a:rPr>
+              <a:t>(sd</a:t>
+            </a:r>
+            <a:r>
+              <a:rPr lang="en-US" dirty="0">
+                <a:solidFill>
+                  <a:schemeClr val="accent1"/>
+                </a:solidFill>
+              </a:rPr>
+              <a:t>*), </a:t>
             </a:r>
             <a:r>
               <a:rPr lang="en-US" dirty="0" smtClean="0">
@@ -14237,6 +14255,87 @@
             <a:endParaRPr lang="en-US" dirty="0">
               <a:solidFill>
                 <a:schemeClr val="accent1"/>
+              </a:solidFill>
+            </a:endParaRPr>
+          </a:p>
+        </p:txBody>
+      </p:sp>
+      <p:sp>
+        <p:nvSpPr>
+          <p:cNvPr id="4" name="Rectangle 3"/>
+          <p:cNvSpPr/>
+          <p:nvPr/>
+        </p:nvSpPr>
+        <p:spPr>
+          <a:xfrm>
+            <a:off x="3200400" y="1845951"/>
+            <a:ext cx="8153400" cy="369332"/>
+          </a:xfrm>
+          <a:prstGeom prst="rect">
+            <a:avLst/>
+          </a:prstGeom>
+        </p:spPr>
+        <p:txBody>
+          <a:bodyPr wrap="square">
+            <a:spAutoFit/>
+          </a:bodyPr>
+          <a:lstStyle/>
+          <a:p>
+            <a:pPr marL="285750" indent="-285750">
+              <a:buFont typeface="Arial" panose="020B0604020202020204" pitchFamily="34" charset="0"/>
+              <a:buChar char="•"/>
+            </a:pPr>
+            <a:r>
+              <a:rPr lang="en-US" dirty="0" smtClean="0">
+                <a:solidFill>
+                  <a:schemeClr val="accent1"/>
+                </a:solidFill>
+              </a:rPr>
+              <a:t>Every </a:t>
+            </a:r>
+            <a:r>
+              <a:rPr lang="en-US" dirty="0" smtClean="0">
+                <a:solidFill>
+                  <a:schemeClr val="accent3"/>
+                </a:solidFill>
+              </a:rPr>
+              <a:t>hard drive </a:t>
+            </a:r>
+            <a:r>
+              <a:rPr lang="en-US" dirty="0" smtClean="0">
+                <a:solidFill>
+                  <a:schemeClr val="accent1"/>
+                </a:solidFill>
+              </a:rPr>
+              <a:t>is shown as </a:t>
+            </a:r>
+            <a:r>
+              <a:rPr lang="en-US" dirty="0" smtClean="0">
+                <a:solidFill>
+                  <a:schemeClr val="accent3"/>
+                </a:solidFill>
+              </a:rPr>
+              <a:t>sd[x]</a:t>
+            </a:r>
+            <a:r>
+              <a:rPr lang="en-US" dirty="0" smtClean="0">
+                <a:solidFill>
+                  <a:schemeClr val="accent1"/>
+                </a:solidFill>
+              </a:rPr>
+              <a:t> and every partition is shown ad </a:t>
+            </a:r>
+            <a:r>
+              <a:rPr lang="en-US" dirty="0" smtClean="0">
+                <a:solidFill>
+                  <a:schemeClr val="accent3"/>
+                </a:solidFill>
+              </a:rPr>
+              <a:t>sd[x][n] </a:t>
+            </a:r>
+            <a:endParaRPr lang="en-US" dirty="0">
+              <a:solidFill>
+                <a:schemeClr val="accent3"/>
               </a:solidFill>
             </a:endParaRPr>
           </a:p>
@@ -15942,6 +16041,302 @@
     <p:extLst>
       <p:ext uri="{BB962C8B-B14F-4D97-AF65-F5344CB8AC3E}">
         <p14:creationId xmlns:p14="http://schemas.microsoft.com/office/powerpoint/2010/main" val="2643463877"/>
+      </p:ext>
+    </p:extLst>
+  </p:cSld>
+  <p:clrMapOvr>
+    <a:masterClrMapping/>
+  </p:clrMapOvr>
+  <p:timing>
+    <p:tnLst>
+      <p:par>
+        <p:cTn id="1" dur="indefinite" restart="never" nodeType="tmRoot"/>
+      </p:par>
+    </p:tnLst>
+  </p:timing>
+</p:sld>
+</file>
+
+<file path=ppt/slides/slide43.xml><?xml version="1.0" encoding="utf-8"?>
+<p:sld xmlns:a="http://schemas.openxmlformats.org/drawingml/2006/main" xmlns:r="http://schemas.openxmlformats.org/officeDocument/2006/relationships" xmlns:p="http://schemas.openxmlformats.org/presentationml/2006/main">
+  <p:cSld>
+    <p:spTree>
+      <p:nvGrpSpPr>
+        <p:cNvPr id="1" name=""/>
+        <p:cNvGrpSpPr/>
+        <p:nvPr/>
+      </p:nvGrpSpPr>
+      <p:grpSpPr>
+        <a:xfrm>
+          <a:off x="0" y="0"/>
+          <a:ext cx="0" cy="0"/>
+          <a:chOff x="0" y="0"/>
+          <a:chExt cx="0" cy="0"/>
+        </a:xfrm>
+      </p:grpSpPr>
+      <p:sp>
+        <p:nvSpPr>
+          <p:cNvPr id="9" name="Rectangle 8"/>
+          <p:cNvSpPr/>
+          <p:nvPr/>
+        </p:nvSpPr>
+        <p:spPr>
+          <a:xfrm>
+            <a:off x="457200" y="599902"/>
+            <a:ext cx="2590800" cy="369332"/>
+          </a:xfrm>
+          <a:prstGeom prst="rect">
+            <a:avLst/>
+          </a:prstGeom>
+        </p:spPr>
+        <p:txBody>
+          <a:bodyPr wrap="square">
+            <a:spAutoFit/>
+          </a:bodyPr>
+          <a:lstStyle/>
+          <a:p>
+            <a:r>
+              <a:rPr lang="en-US" dirty="0" smtClean="0"/>
+              <a:t>/opt</a:t>
+            </a:r>
+            <a:endParaRPr lang="en-US" dirty="0"/>
+          </a:p>
+        </p:txBody>
+      </p:sp>
+      <p:sp>
+        <p:nvSpPr>
+          <p:cNvPr id="2" name="Rectangle 1"/>
+          <p:cNvSpPr/>
+          <p:nvPr/>
+        </p:nvSpPr>
+        <p:spPr>
+          <a:xfrm>
+            <a:off x="457200" y="1155285"/>
+            <a:ext cx="4842992" cy="369332"/>
+          </a:xfrm>
+          <a:prstGeom prst="rect">
+            <a:avLst/>
+          </a:prstGeom>
+        </p:spPr>
+        <p:txBody>
+          <a:bodyPr wrap="none">
+            <a:spAutoFit/>
+          </a:bodyPr>
+          <a:lstStyle/>
+          <a:p>
+            <a:pPr marL="285750" indent="-285750">
+              <a:buFont typeface="Arial" panose="020B0604020202020204" pitchFamily="34" charset="0"/>
+              <a:buChar char="•"/>
+            </a:pPr>
+            <a:r>
+              <a:rPr lang="en-US" dirty="0" smtClean="0">
+                <a:solidFill>
+                  <a:schemeClr val="accent1"/>
+                </a:solidFill>
+                <a:latin typeface="NimbusRomNo9L"/>
+              </a:rPr>
+              <a:t>con</a:t>
+            </a:r>
+            <a:r>
+              <a:rPr lang="en-US" dirty="0">
+                <a:solidFill>
+                  <a:schemeClr val="accent1"/>
+                </a:solidFill>
+              </a:rPr>
+              <a:t>contains </a:t>
+            </a:r>
+            <a:r>
+              <a:rPr lang="en-US" dirty="0">
+                <a:solidFill>
+                  <a:schemeClr val="accent3"/>
+                </a:solidFill>
+              </a:rPr>
+              <a:t>extra</a:t>
+            </a:r>
+            <a:r>
+              <a:rPr lang="en-US" dirty="0">
+                <a:solidFill>
+                  <a:schemeClr val="accent1"/>
+                </a:solidFill>
+              </a:rPr>
+              <a:t> and </a:t>
+            </a:r>
+            <a:r>
+              <a:rPr lang="en-US" dirty="0">
+                <a:solidFill>
+                  <a:schemeClr val="accent3"/>
+                </a:solidFill>
+              </a:rPr>
+              <a:t>third party </a:t>
+            </a:r>
+            <a:r>
+              <a:rPr lang="en-US" dirty="0" smtClean="0">
+                <a:solidFill>
+                  <a:schemeClr val="accent1"/>
+                </a:solidFill>
+              </a:rPr>
+              <a:t>software .</a:t>
+            </a:r>
+            <a:endParaRPr lang="en-US" dirty="0">
+              <a:solidFill>
+                <a:schemeClr val="accent1"/>
+              </a:solidFill>
+            </a:endParaRPr>
+          </a:p>
+        </p:txBody>
+      </p:sp>
+    </p:spTree>
+    <p:extLst>
+      <p:ext uri="{BB962C8B-B14F-4D97-AF65-F5344CB8AC3E}">
+        <p14:creationId xmlns:p14="http://schemas.microsoft.com/office/powerpoint/2010/main" val="422547573"/>
+      </p:ext>
+    </p:extLst>
+  </p:cSld>
+  <p:clrMapOvr>
+    <a:masterClrMapping/>
+  </p:clrMapOvr>
+  <p:timing>
+    <p:tnLst>
+      <p:par>
+        <p:cTn id="1" dur="indefinite" restart="never" nodeType="tmRoot"/>
+      </p:par>
+    </p:tnLst>
+  </p:timing>
+</p:sld>
+</file>
+
+<file path=ppt/slides/slide44.xml><?xml version="1.0" encoding="utf-8"?>
+<p:sld xmlns:a="http://schemas.openxmlformats.org/drawingml/2006/main" xmlns:r="http://schemas.openxmlformats.org/officeDocument/2006/relationships" xmlns:p="http://schemas.openxmlformats.org/presentationml/2006/main">
+  <p:cSld>
+    <p:spTree>
+      <p:nvGrpSpPr>
+        <p:cNvPr id="1" name=""/>
+        <p:cNvGrpSpPr/>
+        <p:nvPr/>
+      </p:nvGrpSpPr>
+      <p:grpSpPr>
+        <a:xfrm>
+          <a:off x="0" y="0"/>
+          <a:ext cx="0" cy="0"/>
+          <a:chOff x="0" y="0"/>
+          <a:chExt cx="0" cy="0"/>
+        </a:xfrm>
+      </p:grpSpPr>
+      <p:sp>
+        <p:nvSpPr>
+          <p:cNvPr id="9" name="Rectangle 8"/>
+          <p:cNvSpPr/>
+          <p:nvPr/>
+        </p:nvSpPr>
+        <p:spPr>
+          <a:xfrm>
+            <a:off x="457200" y="599902"/>
+            <a:ext cx="2590800" cy="369332"/>
+          </a:xfrm>
+          <a:prstGeom prst="rect">
+            <a:avLst/>
+          </a:prstGeom>
+        </p:spPr>
+        <p:txBody>
+          <a:bodyPr wrap="square">
+            <a:spAutoFit/>
+          </a:bodyPr>
+          <a:lstStyle/>
+          <a:p>
+            <a:r>
+              <a:rPr lang="en-US" dirty="0" smtClean="0"/>
+              <a:t>/opt</a:t>
+            </a:r>
+            <a:endParaRPr lang="en-US" dirty="0"/>
+          </a:p>
+        </p:txBody>
+      </p:sp>
+      <p:sp>
+        <p:nvSpPr>
+          <p:cNvPr id="2" name="Rectangle 1"/>
+          <p:cNvSpPr/>
+          <p:nvPr/>
+        </p:nvSpPr>
+        <p:spPr>
+          <a:xfrm>
+            <a:off x="457200" y="1155285"/>
+            <a:ext cx="4842992" cy="369332"/>
+          </a:xfrm>
+          <a:prstGeom prst="rect">
+            <a:avLst/>
+          </a:prstGeom>
+        </p:spPr>
+        <p:txBody>
+          <a:bodyPr wrap="none">
+            <a:spAutoFit/>
+          </a:bodyPr>
+          <a:lstStyle/>
+          <a:p>
+            <a:pPr marL="285750" indent="-285750">
+              <a:buFont typeface="Arial" panose="020B0604020202020204" pitchFamily="34" charset="0"/>
+              <a:buChar char="•"/>
+            </a:pPr>
+            <a:r>
+              <a:rPr lang="en-US" dirty="0" smtClean="0">
+                <a:solidFill>
+                  <a:schemeClr val="accent1"/>
+                </a:solidFill>
+                <a:latin typeface="NimbusRomNo9L"/>
+              </a:rPr>
+              <a:t>con</a:t>
+            </a:r>
+            <a:r>
+              <a:rPr lang="en-US" dirty="0">
+                <a:solidFill>
+                  <a:schemeClr val="accent1"/>
+                </a:solidFill>
+              </a:rPr>
+              <a:t>contains </a:t>
+            </a:r>
+            <a:r>
+              <a:rPr lang="en-US" dirty="0">
+                <a:solidFill>
+                  <a:schemeClr val="accent3"/>
+                </a:solidFill>
+              </a:rPr>
+              <a:t>extra</a:t>
+            </a:r>
+            <a:r>
+              <a:rPr lang="en-US" dirty="0">
+                <a:solidFill>
+                  <a:schemeClr val="accent1"/>
+                </a:solidFill>
+              </a:rPr>
+              <a:t> and </a:t>
+            </a:r>
+            <a:r>
+              <a:rPr lang="en-US" dirty="0">
+                <a:solidFill>
+                  <a:schemeClr val="accent3"/>
+                </a:solidFill>
+              </a:rPr>
+              <a:t>third party </a:t>
+            </a:r>
+            <a:r>
+              <a:rPr lang="en-US" dirty="0" smtClean="0">
+                <a:solidFill>
+                  <a:schemeClr val="accent1"/>
+                </a:solidFill>
+              </a:rPr>
+              <a:t>software .</a:t>
+            </a:r>
+            <a:endParaRPr lang="en-US" dirty="0">
+              <a:solidFill>
+                <a:schemeClr val="accent1"/>
+              </a:solidFill>
+            </a:endParaRPr>
+          </a:p>
+        </p:txBody>
+      </p:sp>
+    </p:spTree>
+    <p:extLst>
+      <p:ext uri="{BB962C8B-B14F-4D97-AF65-F5344CB8AC3E}">
+        <p14:creationId xmlns:p14="http://schemas.microsoft.com/office/powerpoint/2010/main" val="2518099114"/>
       </p:ext>
     </p:extLst>
   </p:cSld>

</xml_diff>

<commit_message>
Directories home, root, run and sbin added
</commit_message>
<xml_diff>
--- a/PowerPoint/amirkabir_linux_festival.pptx
+++ b/PowerPoint/amirkabir_linux_festival.pptx
@@ -5,10 +5,10 @@
     <p:sldMasterId id="2147483648" r:id="rId1"/>
   </p:sldMasterIdLst>
   <p:notesMasterIdLst>
-    <p:notesMasterId r:id="rId46"/>
+    <p:notesMasterId r:id="rId50"/>
   </p:notesMasterIdLst>
   <p:handoutMasterIdLst>
-    <p:handoutMasterId r:id="rId47"/>
+    <p:handoutMasterId r:id="rId51"/>
   </p:handoutMasterIdLst>
   <p:sldIdLst>
     <p:sldId id="256" r:id="rId2"/>
@@ -55,6 +55,10 @@
     <p:sldId id="306" r:id="rId43"/>
     <p:sldId id="307" r:id="rId44"/>
     <p:sldId id="308" r:id="rId45"/>
+    <p:sldId id="309" r:id="rId46"/>
+    <p:sldId id="310" r:id="rId47"/>
+    <p:sldId id="311" r:id="rId48"/>
+    <p:sldId id="312" r:id="rId49"/>
   </p:sldIdLst>
   <p:sldSz cx="12192000" cy="6858000"/>
   <p:notesSz cx="6858000" cy="9144000"/>
@@ -257,7 +261,7 @@
           <a:p>
             <a:fld id="{762B48F5-BACC-47D6-A0F7-82FBF9C6BC85}" type="datetimeFigureOut">
               <a:rPr lang="en-US"/>
-              <a:t>2/9/2020</a:t>
+              <a:t>2/10/2020</a:t>
             </a:fld>
             <a:endParaRPr/>
           </a:p>
@@ -422,7 +426,7 @@
           <a:p>
             <a:fld id="{0CB1CD00-5424-4675-AB18-2C419B060449}" type="datetimeFigureOut">
               <a:rPr lang="en-US"/>
-              <a:t>2/9/2020</a:t>
+              <a:t>2/10/2020</a:t>
             </a:fld>
             <a:endParaRPr/>
           </a:p>
@@ -1073,7 +1077,7 @@
           <a:p>
             <a:fld id="{37CC0096-1860-4642-9CD2-0079EA5E7CD1}" type="datetimeFigureOut">
               <a:rPr lang="en-US" smtClean="0"/>
-              <a:t>2/9/2020</a:t>
+              <a:t>2/10/2020</a:t>
             </a:fld>
             <a:endParaRPr lang="en-US"/>
           </a:p>
@@ -1253,7 +1257,7 @@
           <a:p>
             <a:fld id="{37CC0096-1860-4642-9CD2-0079EA5E7CD1}" type="datetimeFigureOut">
               <a:rPr lang="en-US" smtClean="0"/>
-              <a:t>2/9/2020</a:t>
+              <a:t>2/10/2020</a:t>
             </a:fld>
             <a:endParaRPr lang="en-US"/>
           </a:p>
@@ -1427,7 +1431,7 @@
           <a:p>
             <a:fld id="{37CC0096-1860-4642-9CD2-0079EA5E7CD1}" type="datetimeFigureOut">
               <a:rPr lang="en-US" smtClean="0"/>
-              <a:t>2/9/2020</a:t>
+              <a:t>2/10/2020</a:t>
             </a:fld>
             <a:endParaRPr lang="en-US"/>
           </a:p>
@@ -1862,7 +1866,7 @@
           <a:p>
             <a:fld id="{37CC0096-1860-4642-9CD2-0079EA5E7CD1}" type="datetimeFigureOut">
               <a:rPr lang="en-US" smtClean="0"/>
-              <a:t>2/9/2020</a:t>
+              <a:t>2/10/2020</a:t>
             </a:fld>
             <a:endParaRPr lang="en-US"/>
           </a:p>
@@ -2302,7 +2306,7 @@
           <a:p>
             <a:fld id="{37CC0096-1860-4642-9CD2-0079EA5E7CD1}" type="datetimeFigureOut">
               <a:rPr lang="en-US" smtClean="0"/>
-              <a:t>2/9/2020</a:t>
+              <a:t>2/10/2020</a:t>
             </a:fld>
             <a:endParaRPr lang="en-US"/>
           </a:p>
@@ -2420,7 +2424,7 @@
           <a:p>
             <a:fld id="{37CC0096-1860-4642-9CD2-0079EA5E7CD1}" type="datetimeFigureOut">
               <a:rPr lang="en-US" smtClean="0"/>
-              <a:t>2/9/2020</a:t>
+              <a:t>2/10/2020</a:t>
             </a:fld>
             <a:endParaRPr lang="en-US"/>
           </a:p>
@@ -2515,7 +2519,7 @@
           <a:p>
             <a:fld id="{37CC0096-1860-4642-9CD2-0079EA5E7CD1}" type="datetimeFigureOut">
               <a:rPr lang="en-US" smtClean="0"/>
-              <a:t>2/9/2020</a:t>
+              <a:t>2/10/2020</a:t>
             </a:fld>
             <a:endParaRPr lang="en-US"/>
           </a:p>
@@ -2799,7 +2803,7 @@
           <a:p>
             <a:fld id="{37CC0096-1860-4642-9CD2-0079EA5E7CD1}" type="datetimeFigureOut">
               <a:rPr lang="en-US" smtClean="0"/>
-              <a:t>2/9/2020</a:t>
+              <a:t>2/10/2020</a:t>
             </a:fld>
             <a:endParaRPr lang="en-US"/>
           </a:p>
@@ -3112,7 +3116,7 @@
           <a:p>
             <a:fld id="{37CC0096-1860-4642-9CD2-0079EA5E7CD1}" type="datetimeFigureOut">
               <a:rPr lang="en-US" smtClean="0"/>
-              <a:t>2/9/2020</a:t>
+              <a:t>2/10/2020</a:t>
             </a:fld>
             <a:endParaRPr lang="en-US"/>
           </a:p>
@@ -3344,7 +3348,7 @@
             <a:fld id="{37CC0096-1860-4642-9CD2-0079EA5E7CD1}" type="datetimeFigureOut">
               <a:rPr lang="en-US" smtClean="0"/>
               <a:pPr/>
-              <a:t>2/9/2020</a:t>
+              <a:t>2/10/2020</a:t>
             </a:fld>
             <a:endParaRPr lang="en-US"/>
           </a:p>
@@ -17186,11 +17190,6 @@
               </a:rPr>
               <a:t>directory.</a:t>
             </a:r>
-            <a:endParaRPr lang="en-US" dirty="0">
-              <a:solidFill>
-                <a:schemeClr val="accent1"/>
-              </a:solidFill>
-            </a:endParaRPr>
           </a:p>
         </p:txBody>
       </p:sp>
@@ -17198,6 +17197,1171 @@
     <p:extLst>
       <p:ext uri="{BB962C8B-B14F-4D97-AF65-F5344CB8AC3E}">
         <p14:creationId xmlns:p14="http://schemas.microsoft.com/office/powerpoint/2010/main" val="2518099114"/>
+      </p:ext>
+    </p:extLst>
+  </p:cSld>
+  <p:clrMapOvr>
+    <a:masterClrMapping/>
+  </p:clrMapOvr>
+  <p:timing>
+    <p:tnLst>
+      <p:par>
+        <p:cTn id="1" dur="indefinite" restart="never" nodeType="tmRoot"/>
+      </p:par>
+    </p:tnLst>
+  </p:timing>
+</p:sld>
+</file>
+
+<file path=ppt/slides/slide45.xml><?xml version="1.0" encoding="utf-8"?>
+<p:sld xmlns:a="http://schemas.openxmlformats.org/drawingml/2006/main" xmlns:r="http://schemas.openxmlformats.org/officeDocument/2006/relationships" xmlns:p="http://schemas.openxmlformats.org/presentationml/2006/main">
+  <p:cSld>
+    <p:spTree>
+      <p:nvGrpSpPr>
+        <p:cNvPr id="1" name=""/>
+        <p:cNvGrpSpPr/>
+        <p:nvPr/>
+      </p:nvGrpSpPr>
+      <p:grpSpPr>
+        <a:xfrm>
+          <a:off x="0" y="0"/>
+          <a:ext cx="0" cy="0"/>
+          <a:chOff x="0" y="0"/>
+          <a:chExt cx="0" cy="0"/>
+        </a:xfrm>
+      </p:grpSpPr>
+      <p:sp>
+        <p:nvSpPr>
+          <p:cNvPr id="9" name="Rectangle 8"/>
+          <p:cNvSpPr/>
+          <p:nvPr/>
+        </p:nvSpPr>
+        <p:spPr>
+          <a:xfrm>
+            <a:off x="457200" y="599902"/>
+            <a:ext cx="2895600" cy="3416320"/>
+          </a:xfrm>
+          <a:prstGeom prst="rect">
+            <a:avLst/>
+          </a:prstGeom>
+        </p:spPr>
+        <p:txBody>
+          <a:bodyPr wrap="square">
+            <a:spAutoFit/>
+          </a:bodyPr>
+          <a:lstStyle/>
+          <a:p>
+            <a:r>
+              <a:rPr lang="en-US" dirty="0" smtClean="0"/>
+              <a:t>/home</a:t>
+            </a:r>
+            <a:endParaRPr lang="en-US" dirty="0"/>
+          </a:p>
+          <a:p>
+            <a:r>
+              <a:rPr lang="en-US" dirty="0" smtClean="0">
+                <a:solidFill>
+                  <a:schemeClr val="accent1"/>
+                </a:solidFill>
+              </a:rPr>
+              <a:t>├── </a:t>
+            </a:r>
+            <a:r>
+              <a:rPr lang="en-US" dirty="0" smtClean="0">
+                <a:solidFill>
+                  <a:schemeClr val="accent1"/>
+                </a:solidFill>
+              </a:rPr>
+              <a:t>[username]</a:t>
+            </a:r>
+          </a:p>
+          <a:p>
+            <a:r>
+              <a:rPr lang="en-US" dirty="0">
+                <a:solidFill>
+                  <a:schemeClr val="accent1"/>
+                </a:solidFill>
+              </a:rPr>
+              <a:t>	 </a:t>
+            </a:r>
+            <a:r>
+              <a:rPr lang="en-US" dirty="0" smtClean="0">
+                <a:solidFill>
+                  <a:schemeClr val="accent1"/>
+                </a:solidFill>
+              </a:rPr>
+              <a:t>├── Downloads</a:t>
+            </a:r>
+          </a:p>
+          <a:p>
+            <a:r>
+              <a:rPr lang="en-US" dirty="0">
+                <a:solidFill>
+                  <a:schemeClr val="accent1"/>
+                </a:solidFill>
+              </a:rPr>
+              <a:t>	</a:t>
+            </a:r>
+            <a:r>
+              <a:rPr lang="en-US" dirty="0">
+                <a:solidFill>
+                  <a:schemeClr val="accent1"/>
+                </a:solidFill>
+              </a:rPr>
+              <a:t> </a:t>
+            </a:r>
+            <a:r>
+              <a:rPr lang="en-US" dirty="0" smtClean="0">
+                <a:solidFill>
+                  <a:schemeClr val="accent1"/>
+                </a:solidFill>
+              </a:rPr>
+              <a:t>├── Documents</a:t>
+            </a:r>
+          </a:p>
+          <a:p>
+            <a:r>
+              <a:rPr lang="en-US" dirty="0">
+                <a:solidFill>
+                  <a:schemeClr val="accent1"/>
+                </a:solidFill>
+              </a:rPr>
+              <a:t>	 ├── </a:t>
+            </a:r>
+            <a:r>
+              <a:rPr lang="en-US" dirty="0" smtClean="0">
+                <a:solidFill>
+                  <a:schemeClr val="accent1"/>
+                </a:solidFill>
+              </a:rPr>
+              <a:t>Desktop</a:t>
+            </a:r>
+          </a:p>
+          <a:p>
+            <a:r>
+              <a:rPr lang="en-US" dirty="0">
+                <a:solidFill>
+                  <a:schemeClr val="accent1"/>
+                </a:solidFill>
+              </a:rPr>
+              <a:t>	 </a:t>
+            </a:r>
+            <a:r>
+              <a:rPr lang="en-US" dirty="0" smtClean="0">
+                <a:solidFill>
+                  <a:schemeClr val="accent1"/>
+                </a:solidFill>
+              </a:rPr>
+              <a:t>├── Pictures</a:t>
+            </a:r>
+          </a:p>
+          <a:p>
+            <a:r>
+              <a:rPr lang="en-US" dirty="0">
+                <a:solidFill>
+                  <a:schemeClr val="accent1"/>
+                </a:solidFill>
+              </a:rPr>
+              <a:t>	 </a:t>
+            </a:r>
+            <a:r>
+              <a:rPr lang="en-US" dirty="0" smtClean="0">
+                <a:solidFill>
+                  <a:schemeClr val="accent1"/>
+                </a:solidFill>
+              </a:rPr>
+              <a:t>├── Public</a:t>
+            </a:r>
+          </a:p>
+          <a:p>
+            <a:r>
+              <a:rPr lang="en-US" dirty="0">
+                <a:solidFill>
+                  <a:schemeClr val="accent1"/>
+                </a:solidFill>
+              </a:rPr>
+              <a:t>	 </a:t>
+            </a:r>
+            <a:r>
+              <a:rPr lang="en-US" dirty="0" smtClean="0">
+                <a:solidFill>
+                  <a:schemeClr val="accent1"/>
+                </a:solidFill>
+              </a:rPr>
+              <a:t>├── videos</a:t>
+            </a:r>
+            <a:endParaRPr lang="en-US" dirty="0">
+              <a:solidFill>
+                <a:schemeClr val="accent1"/>
+              </a:solidFill>
+            </a:endParaRPr>
+          </a:p>
+          <a:p>
+            <a:endParaRPr lang="en-US" dirty="0">
+              <a:solidFill>
+                <a:schemeClr val="accent1"/>
+              </a:solidFill>
+            </a:endParaRPr>
+          </a:p>
+          <a:p>
+            <a:endParaRPr lang="en-US" dirty="0" smtClean="0">
+              <a:solidFill>
+                <a:schemeClr val="accent1"/>
+              </a:solidFill>
+            </a:endParaRPr>
+          </a:p>
+          <a:p>
+            <a:endParaRPr lang="en-US" dirty="0">
+              <a:solidFill>
+                <a:schemeClr val="accent1"/>
+              </a:solidFill>
+            </a:endParaRPr>
+          </a:p>
+          <a:p>
+            <a:endParaRPr lang="en-US" dirty="0"/>
+          </a:p>
+        </p:txBody>
+      </p:sp>
+      <p:sp>
+        <p:nvSpPr>
+          <p:cNvPr id="2" name="Rectangle 1"/>
+          <p:cNvSpPr/>
+          <p:nvPr/>
+        </p:nvSpPr>
+        <p:spPr>
+          <a:xfrm>
+            <a:off x="3810000" y="990600"/>
+            <a:ext cx="7772400" cy="1477328"/>
+          </a:xfrm>
+          <a:prstGeom prst="rect">
+            <a:avLst/>
+          </a:prstGeom>
+        </p:spPr>
+        <p:txBody>
+          <a:bodyPr wrap="square">
+            <a:spAutoFit/>
+          </a:bodyPr>
+          <a:lstStyle/>
+          <a:p>
+            <a:pPr marL="285750" indent="-285750">
+              <a:buFont typeface="Arial" panose="020B0604020202020204" pitchFamily="34" charset="0"/>
+              <a:buChar char="•"/>
+            </a:pPr>
+            <a:r>
+              <a:rPr lang="en-US" dirty="0">
+                <a:solidFill>
+                  <a:schemeClr val="accent1"/>
+                </a:solidFill>
+              </a:rPr>
+              <a:t>Home directories of the common users</a:t>
+            </a:r>
+            <a:r>
+              <a:rPr lang="en-US" dirty="0" smtClean="0">
+                <a:solidFill>
+                  <a:schemeClr val="accent1"/>
+                </a:solidFill>
+              </a:rPr>
+              <a:t>.</a:t>
+            </a:r>
+          </a:p>
+          <a:p>
+            <a:pPr marL="285750" indent="-285750">
+              <a:buFont typeface="Arial" panose="020B0604020202020204" pitchFamily="34" charset="0"/>
+              <a:buChar char="•"/>
+            </a:pPr>
+            <a:endParaRPr lang="en-US" dirty="0">
+              <a:solidFill>
+                <a:schemeClr val="accent1"/>
+              </a:solidFill>
+            </a:endParaRPr>
+          </a:p>
+          <a:p>
+            <a:pPr marL="285750" indent="-285750">
+              <a:buFont typeface="Arial" panose="020B0604020202020204" pitchFamily="34" charset="0"/>
+              <a:buChar char="•"/>
+            </a:pPr>
+            <a:r>
+              <a:rPr lang="en-US" dirty="0" smtClean="0">
+                <a:solidFill>
+                  <a:schemeClr val="accent1"/>
+                </a:solidFill>
+              </a:rPr>
+              <a:t>Usually shown as </a:t>
+            </a:r>
+            <a:r>
+              <a:rPr lang="en-US" dirty="0" smtClean="0">
+                <a:solidFill>
+                  <a:schemeClr val="accent3"/>
+                </a:solidFill>
+              </a:rPr>
+              <a:t>~</a:t>
+            </a:r>
+            <a:r>
+              <a:rPr lang="en-US" dirty="0" smtClean="0">
+                <a:solidFill>
+                  <a:schemeClr val="accent1"/>
+                </a:solidFill>
+              </a:rPr>
+              <a:t> .</a:t>
+            </a:r>
+          </a:p>
+          <a:p>
+            <a:pPr marL="285750" indent="-285750">
+              <a:buFont typeface="Arial" panose="020B0604020202020204" pitchFamily="34" charset="0"/>
+              <a:buChar char="•"/>
+            </a:pPr>
+            <a:endParaRPr lang="en-US" dirty="0">
+              <a:solidFill>
+                <a:schemeClr val="accent1"/>
+              </a:solidFill>
+            </a:endParaRPr>
+          </a:p>
+          <a:p>
+            <a:pPr marL="285750" indent="-285750">
+              <a:buFont typeface="Arial" panose="020B0604020202020204" pitchFamily="34" charset="0"/>
+              <a:buChar char="•"/>
+            </a:pPr>
+            <a:r>
+              <a:rPr lang="en-US" dirty="0" smtClean="0">
+                <a:solidFill>
+                  <a:schemeClr val="accent1"/>
+                </a:solidFill>
+              </a:rPr>
+              <a:t>Custom configuration are mostly here like</a:t>
+            </a:r>
+            <a:r>
+              <a:rPr lang="en-US" dirty="0" smtClean="0">
+                <a:solidFill>
+                  <a:schemeClr val="accent3"/>
+                </a:solidFill>
+              </a:rPr>
+              <a:t>: .vimrc</a:t>
+            </a:r>
+            <a:r>
+              <a:rPr lang="en-US" dirty="0" smtClean="0">
+                <a:solidFill>
+                  <a:schemeClr val="accent1"/>
+                </a:solidFill>
+              </a:rPr>
+              <a:t>, </a:t>
+            </a:r>
+            <a:r>
+              <a:rPr lang="en-US" dirty="0" smtClean="0">
+                <a:solidFill>
+                  <a:schemeClr val="accent3"/>
+                </a:solidFill>
+              </a:rPr>
+              <a:t>.bashrc </a:t>
+            </a:r>
+            <a:r>
+              <a:rPr lang="en-US" dirty="0" smtClean="0">
+                <a:solidFill>
+                  <a:schemeClr val="accent1"/>
+                </a:solidFill>
+              </a:rPr>
+              <a:t>.</a:t>
+            </a:r>
+            <a:endParaRPr lang="en-US" dirty="0" smtClean="0">
+              <a:solidFill>
+                <a:schemeClr val="accent1"/>
+              </a:solidFill>
+            </a:endParaRPr>
+          </a:p>
+        </p:txBody>
+      </p:sp>
+    </p:spTree>
+    <p:extLst>
+      <p:ext uri="{BB962C8B-B14F-4D97-AF65-F5344CB8AC3E}">
+        <p14:creationId xmlns:p14="http://schemas.microsoft.com/office/powerpoint/2010/main" val="3730159218"/>
+      </p:ext>
+    </p:extLst>
+  </p:cSld>
+  <p:clrMapOvr>
+    <a:masterClrMapping/>
+  </p:clrMapOvr>
+  <p:timing>
+    <p:tnLst>
+      <p:par>
+        <p:cTn id="1" dur="indefinite" restart="never" nodeType="tmRoot"/>
+      </p:par>
+    </p:tnLst>
+  </p:timing>
+</p:sld>
+</file>
+
+<file path=ppt/slides/slide46.xml><?xml version="1.0" encoding="utf-8"?>
+<p:sld xmlns:a="http://schemas.openxmlformats.org/drawingml/2006/main" xmlns:r="http://schemas.openxmlformats.org/officeDocument/2006/relationships" xmlns:p="http://schemas.openxmlformats.org/presentationml/2006/main">
+  <p:cSld>
+    <p:spTree>
+      <p:nvGrpSpPr>
+        <p:cNvPr id="1" name=""/>
+        <p:cNvGrpSpPr/>
+        <p:nvPr/>
+      </p:nvGrpSpPr>
+      <p:grpSpPr>
+        <a:xfrm>
+          <a:off x="0" y="0"/>
+          <a:ext cx="0" cy="0"/>
+          <a:chOff x="0" y="0"/>
+          <a:chExt cx="0" cy="0"/>
+        </a:xfrm>
+      </p:grpSpPr>
+      <p:sp>
+        <p:nvSpPr>
+          <p:cNvPr id="9" name="Rectangle 8"/>
+          <p:cNvSpPr/>
+          <p:nvPr/>
+        </p:nvSpPr>
+        <p:spPr>
+          <a:xfrm>
+            <a:off x="457200" y="599902"/>
+            <a:ext cx="2895600" cy="1477328"/>
+          </a:xfrm>
+          <a:prstGeom prst="rect">
+            <a:avLst/>
+          </a:prstGeom>
+        </p:spPr>
+        <p:txBody>
+          <a:bodyPr wrap="square">
+            <a:spAutoFit/>
+          </a:bodyPr>
+          <a:lstStyle/>
+          <a:p>
+            <a:r>
+              <a:rPr lang="en-US" dirty="0" smtClean="0"/>
+              <a:t>/root</a:t>
+            </a:r>
+            <a:endParaRPr lang="en-US" dirty="0"/>
+          </a:p>
+          <a:p>
+            <a:endParaRPr lang="en-US" dirty="0">
+              <a:solidFill>
+                <a:schemeClr val="accent1"/>
+              </a:solidFill>
+            </a:endParaRPr>
+          </a:p>
+          <a:p>
+            <a:endParaRPr lang="en-US" dirty="0" smtClean="0">
+              <a:solidFill>
+                <a:schemeClr val="accent1"/>
+              </a:solidFill>
+            </a:endParaRPr>
+          </a:p>
+          <a:p>
+            <a:endParaRPr lang="en-US" dirty="0">
+              <a:solidFill>
+                <a:schemeClr val="accent1"/>
+              </a:solidFill>
+            </a:endParaRPr>
+          </a:p>
+          <a:p>
+            <a:endParaRPr lang="en-US" dirty="0"/>
+          </a:p>
+        </p:txBody>
+      </p:sp>
+      <p:sp>
+        <p:nvSpPr>
+          <p:cNvPr id="2" name="Rectangle 1"/>
+          <p:cNvSpPr/>
+          <p:nvPr/>
+        </p:nvSpPr>
+        <p:spPr>
+          <a:xfrm>
+            <a:off x="3810000" y="990600"/>
+            <a:ext cx="7772400" cy="646331"/>
+          </a:xfrm>
+          <a:prstGeom prst="rect">
+            <a:avLst/>
+          </a:prstGeom>
+        </p:spPr>
+        <p:txBody>
+          <a:bodyPr wrap="square">
+            <a:spAutoFit/>
+          </a:bodyPr>
+          <a:lstStyle/>
+          <a:p>
+            <a:pPr marL="285750" indent="-285750">
+              <a:buFont typeface="Arial" panose="020B0604020202020204" pitchFamily="34" charset="0"/>
+              <a:buChar char="•"/>
+            </a:pPr>
+            <a:r>
+              <a:rPr lang="en-US" dirty="0" smtClean="0">
+                <a:solidFill>
+                  <a:schemeClr val="accent1"/>
+                </a:solidFill>
+              </a:rPr>
+              <a:t>The </a:t>
+            </a:r>
+            <a:r>
+              <a:rPr lang="en-US" dirty="0">
+                <a:solidFill>
+                  <a:schemeClr val="accent3"/>
+                </a:solidFill>
+              </a:rPr>
+              <a:t>administrative user's home </a:t>
+            </a:r>
+            <a:r>
+              <a:rPr lang="en-US" dirty="0">
+                <a:solidFill>
+                  <a:schemeClr val="accent1"/>
+                </a:solidFill>
+              </a:rPr>
+              <a:t>directory. Mind the difference between </a:t>
+            </a:r>
+            <a:r>
+              <a:rPr lang="en-US" dirty="0">
+                <a:solidFill>
+                  <a:schemeClr val="accent3"/>
+                </a:solidFill>
+              </a:rPr>
+              <a:t>/</a:t>
+            </a:r>
+            <a:r>
+              <a:rPr lang="en-US" dirty="0">
+                <a:solidFill>
+                  <a:schemeClr val="accent1"/>
+                </a:solidFill>
+              </a:rPr>
+              <a:t>, </a:t>
+            </a:r>
+            <a:r>
+              <a:rPr lang="en-US" dirty="0">
+                <a:solidFill>
+                  <a:schemeClr val="accent3"/>
+                </a:solidFill>
+              </a:rPr>
+              <a:t>the </a:t>
+            </a:r>
+            <a:r>
+              <a:rPr lang="en-US" dirty="0" smtClean="0">
+                <a:solidFill>
+                  <a:schemeClr val="accent3"/>
+                </a:solidFill>
+              </a:rPr>
+              <a:t>root directory </a:t>
+            </a:r>
+            <a:r>
+              <a:rPr lang="en-US" dirty="0">
+                <a:solidFill>
+                  <a:schemeClr val="accent3"/>
+                </a:solidFill>
+              </a:rPr>
+              <a:t>and /root</a:t>
+            </a:r>
+            <a:r>
+              <a:rPr lang="en-US" dirty="0">
+                <a:solidFill>
+                  <a:schemeClr val="accent1"/>
+                </a:solidFill>
+              </a:rPr>
+              <a:t>, the home directory of the root user.</a:t>
+            </a:r>
+            <a:endParaRPr lang="en-US" dirty="0" smtClean="0">
+              <a:solidFill>
+                <a:schemeClr val="accent1"/>
+              </a:solidFill>
+            </a:endParaRPr>
+          </a:p>
+        </p:txBody>
+      </p:sp>
+    </p:spTree>
+    <p:extLst>
+      <p:ext uri="{BB962C8B-B14F-4D97-AF65-F5344CB8AC3E}">
+        <p14:creationId xmlns:p14="http://schemas.microsoft.com/office/powerpoint/2010/main" val="2479562649"/>
+      </p:ext>
+    </p:extLst>
+  </p:cSld>
+  <p:clrMapOvr>
+    <a:masterClrMapping/>
+  </p:clrMapOvr>
+  <p:timing>
+    <p:tnLst>
+      <p:par>
+        <p:cTn id="1" dur="indefinite" restart="never" nodeType="tmRoot"/>
+      </p:par>
+    </p:tnLst>
+  </p:timing>
+</p:sld>
+</file>
+
+<file path=ppt/slides/slide47.xml><?xml version="1.0" encoding="utf-8"?>
+<p:sld xmlns:a="http://schemas.openxmlformats.org/drawingml/2006/main" xmlns:r="http://schemas.openxmlformats.org/officeDocument/2006/relationships" xmlns:p="http://schemas.openxmlformats.org/presentationml/2006/main">
+  <p:cSld>
+    <p:spTree>
+      <p:nvGrpSpPr>
+        <p:cNvPr id="1" name=""/>
+        <p:cNvGrpSpPr/>
+        <p:nvPr/>
+      </p:nvGrpSpPr>
+      <p:grpSpPr>
+        <a:xfrm>
+          <a:off x="0" y="0"/>
+          <a:ext cx="0" cy="0"/>
+          <a:chOff x="0" y="0"/>
+          <a:chExt cx="0" cy="0"/>
+        </a:xfrm>
+      </p:grpSpPr>
+      <p:sp>
+        <p:nvSpPr>
+          <p:cNvPr id="9" name="Rectangle 8"/>
+          <p:cNvSpPr/>
+          <p:nvPr/>
+        </p:nvSpPr>
+        <p:spPr>
+          <a:xfrm>
+            <a:off x="457200" y="599902"/>
+            <a:ext cx="2895600" cy="1477328"/>
+          </a:xfrm>
+          <a:prstGeom prst="rect">
+            <a:avLst/>
+          </a:prstGeom>
+        </p:spPr>
+        <p:txBody>
+          <a:bodyPr wrap="square">
+            <a:spAutoFit/>
+          </a:bodyPr>
+          <a:lstStyle/>
+          <a:p>
+            <a:r>
+              <a:rPr lang="en-US" dirty="0" smtClean="0"/>
+              <a:t>/run</a:t>
+            </a:r>
+            <a:endParaRPr lang="en-US" dirty="0"/>
+          </a:p>
+          <a:p>
+            <a:endParaRPr lang="en-US" dirty="0">
+              <a:solidFill>
+                <a:schemeClr val="accent1"/>
+              </a:solidFill>
+            </a:endParaRPr>
+          </a:p>
+          <a:p>
+            <a:endParaRPr lang="en-US" dirty="0" smtClean="0">
+              <a:solidFill>
+                <a:schemeClr val="accent1"/>
+              </a:solidFill>
+            </a:endParaRPr>
+          </a:p>
+          <a:p>
+            <a:endParaRPr lang="en-US" dirty="0">
+              <a:solidFill>
+                <a:schemeClr val="accent1"/>
+              </a:solidFill>
+            </a:endParaRPr>
+          </a:p>
+          <a:p>
+            <a:endParaRPr lang="en-US" dirty="0"/>
+          </a:p>
+        </p:txBody>
+      </p:sp>
+      <p:sp>
+        <p:nvSpPr>
+          <p:cNvPr id="2" name="Rectangle 1"/>
+          <p:cNvSpPr/>
+          <p:nvPr/>
+        </p:nvSpPr>
+        <p:spPr>
+          <a:xfrm>
+            <a:off x="3352800" y="1143000"/>
+            <a:ext cx="8001000" cy="1200329"/>
+          </a:xfrm>
+          <a:prstGeom prst="rect">
+            <a:avLst/>
+          </a:prstGeom>
+        </p:spPr>
+        <p:txBody>
+          <a:bodyPr wrap="square">
+            <a:spAutoFit/>
+          </a:bodyPr>
+          <a:lstStyle/>
+          <a:p>
+            <a:pPr marL="285750" indent="-285750">
+              <a:buFont typeface="Arial" panose="020B0604020202020204" pitchFamily="34" charset="0"/>
+              <a:buChar char="•"/>
+            </a:pPr>
+            <a:r>
+              <a:rPr lang="en-US" dirty="0">
+                <a:solidFill>
+                  <a:schemeClr val="accent1"/>
+                </a:solidFill>
+              </a:rPr>
+              <a:t>is a </a:t>
+            </a:r>
+            <a:r>
+              <a:rPr lang="en-US" i="1" dirty="0" err="1">
+                <a:solidFill>
+                  <a:schemeClr val="accent1"/>
+                </a:solidFill>
+              </a:rPr>
+              <a:t>tmpfs</a:t>
+            </a:r>
+            <a:r>
+              <a:rPr lang="en-US" dirty="0">
+                <a:solidFill>
+                  <a:schemeClr val="accent1"/>
+                </a:solidFill>
+              </a:rPr>
+              <a:t> (</a:t>
+            </a:r>
+            <a:r>
+              <a:rPr lang="en-US" dirty="0">
+                <a:solidFill>
+                  <a:schemeClr val="accent3"/>
+                </a:solidFill>
+              </a:rPr>
+              <a:t>temporary file system</a:t>
+            </a:r>
+            <a:r>
+              <a:rPr lang="en-US" dirty="0">
+                <a:solidFill>
+                  <a:schemeClr val="accent1"/>
+                </a:solidFill>
+              </a:rPr>
+              <a:t>) available early in </a:t>
+            </a:r>
+            <a:r>
+              <a:rPr lang="en-US" dirty="0">
+                <a:solidFill>
+                  <a:schemeClr val="accent3"/>
+                </a:solidFill>
+              </a:rPr>
+              <a:t>the boot process </a:t>
+            </a:r>
+            <a:r>
+              <a:rPr lang="en-US" dirty="0">
+                <a:solidFill>
+                  <a:schemeClr val="accent1"/>
+                </a:solidFill>
+              </a:rPr>
+              <a:t>where </a:t>
+            </a:r>
+            <a:r>
+              <a:rPr lang="en-US" dirty="0">
+                <a:solidFill>
+                  <a:schemeClr val="accent3"/>
+                </a:solidFill>
+              </a:rPr>
+              <a:t>ephemeral </a:t>
+            </a:r>
+            <a:r>
+              <a:rPr lang="en-US" dirty="0" smtClean="0">
+                <a:solidFill>
+                  <a:schemeClr val="accent3"/>
+                </a:solidFill>
+              </a:rPr>
+              <a:t>run-time </a:t>
+            </a:r>
+            <a:r>
+              <a:rPr lang="en-US" dirty="0" smtClean="0">
+                <a:solidFill>
+                  <a:schemeClr val="accent1"/>
+                </a:solidFill>
+              </a:rPr>
+              <a:t>(</a:t>
+            </a:r>
+            <a:r>
+              <a:rPr lang="en-US" dirty="0">
+                <a:solidFill>
+                  <a:schemeClr val="accent1"/>
+                </a:solidFill>
+              </a:rPr>
+              <a:t>currently logged-in users and running daemons</a:t>
+            </a:r>
+            <a:r>
+              <a:rPr lang="en-US" dirty="0" smtClean="0">
+                <a:solidFill>
+                  <a:schemeClr val="accent1"/>
+                </a:solidFill>
+              </a:rPr>
+              <a:t>) </a:t>
+            </a:r>
+            <a:r>
+              <a:rPr lang="en-US" dirty="0">
+                <a:solidFill>
+                  <a:schemeClr val="accent1"/>
+                </a:solidFill>
+              </a:rPr>
+              <a:t>data is stored. Files under this directory are </a:t>
+            </a:r>
+            <a:r>
+              <a:rPr lang="en-US" dirty="0">
+                <a:solidFill>
+                  <a:schemeClr val="accent3"/>
+                </a:solidFill>
+              </a:rPr>
+              <a:t>removed</a:t>
+            </a:r>
+            <a:r>
+              <a:rPr lang="en-US" dirty="0">
+                <a:solidFill>
+                  <a:schemeClr val="accent1"/>
+                </a:solidFill>
+              </a:rPr>
+              <a:t> or </a:t>
+            </a:r>
+            <a:r>
+              <a:rPr lang="en-US" dirty="0">
+                <a:solidFill>
+                  <a:schemeClr val="accent3"/>
+                </a:solidFill>
+              </a:rPr>
+              <a:t>truncated</a:t>
+            </a:r>
+            <a:r>
+              <a:rPr lang="en-US" dirty="0">
+                <a:solidFill>
+                  <a:schemeClr val="accent1"/>
+                </a:solidFill>
+              </a:rPr>
+              <a:t> at the beginning of the boot process.</a:t>
+            </a:r>
+            <a:endParaRPr lang="en-US" dirty="0" smtClean="0">
+              <a:solidFill>
+                <a:schemeClr val="accent1"/>
+              </a:solidFill>
+            </a:endParaRPr>
+          </a:p>
+        </p:txBody>
+      </p:sp>
+    </p:spTree>
+    <p:extLst>
+      <p:ext uri="{BB962C8B-B14F-4D97-AF65-F5344CB8AC3E}">
+        <p14:creationId xmlns:p14="http://schemas.microsoft.com/office/powerpoint/2010/main" val="278175297"/>
+      </p:ext>
+    </p:extLst>
+  </p:cSld>
+  <p:clrMapOvr>
+    <a:masterClrMapping/>
+  </p:clrMapOvr>
+  <p:timing>
+    <p:tnLst>
+      <p:par>
+        <p:cTn id="1" dur="indefinite" restart="never" nodeType="tmRoot"/>
+      </p:par>
+    </p:tnLst>
+  </p:timing>
+</p:sld>
+</file>
+
+<file path=ppt/slides/slide48.xml><?xml version="1.0" encoding="utf-8"?>
+<p:sld xmlns:a="http://schemas.openxmlformats.org/drawingml/2006/main" xmlns:r="http://schemas.openxmlformats.org/officeDocument/2006/relationships" xmlns:p="http://schemas.openxmlformats.org/presentationml/2006/main">
+  <p:cSld>
+    <p:spTree>
+      <p:nvGrpSpPr>
+        <p:cNvPr id="1" name=""/>
+        <p:cNvGrpSpPr/>
+        <p:nvPr/>
+      </p:nvGrpSpPr>
+      <p:grpSpPr>
+        <a:xfrm>
+          <a:off x="0" y="0"/>
+          <a:ext cx="0" cy="0"/>
+          <a:chOff x="0" y="0"/>
+          <a:chExt cx="0" cy="0"/>
+        </a:xfrm>
+      </p:grpSpPr>
+      <p:sp>
+        <p:nvSpPr>
+          <p:cNvPr id="9" name="Rectangle 8"/>
+          <p:cNvSpPr/>
+          <p:nvPr/>
+        </p:nvSpPr>
+        <p:spPr>
+          <a:xfrm>
+            <a:off x="457200" y="599902"/>
+            <a:ext cx="2895600" cy="3693319"/>
+          </a:xfrm>
+          <a:prstGeom prst="rect">
+            <a:avLst/>
+          </a:prstGeom>
+        </p:spPr>
+        <p:txBody>
+          <a:bodyPr wrap="square">
+            <a:spAutoFit/>
+          </a:bodyPr>
+          <a:lstStyle/>
+          <a:p>
+            <a:r>
+              <a:rPr lang="en-US" dirty="0" smtClean="0"/>
+              <a:t>/sbin</a:t>
+            </a:r>
+          </a:p>
+          <a:p>
+            <a:r>
+              <a:rPr lang="en-US" dirty="0" smtClean="0">
+                <a:solidFill>
+                  <a:schemeClr val="accent1"/>
+                </a:solidFill>
+              </a:rPr>
+              <a:t>├── fdisk</a:t>
+            </a:r>
+            <a:endParaRPr lang="en-US" dirty="0">
+              <a:solidFill>
+                <a:schemeClr val="accent1"/>
+              </a:solidFill>
+            </a:endParaRPr>
+          </a:p>
+          <a:p>
+            <a:r>
+              <a:rPr lang="en-US" dirty="0" smtClean="0">
+                <a:solidFill>
+                  <a:schemeClr val="accent1"/>
+                </a:solidFill>
+              </a:rPr>
+              <a:t>├── chroot</a:t>
+            </a:r>
+          </a:p>
+          <a:p>
+            <a:r>
+              <a:rPr lang="en-US" dirty="0" smtClean="0">
+                <a:solidFill>
+                  <a:schemeClr val="accent1"/>
+                </a:solidFill>
+              </a:rPr>
+              <a:t>├── ifconfig</a:t>
+            </a:r>
+          </a:p>
+          <a:p>
+            <a:r>
+              <a:rPr lang="en-US" dirty="0" smtClean="0">
+                <a:solidFill>
+                  <a:schemeClr val="accent1"/>
+                </a:solidFill>
+              </a:rPr>
+              <a:t>├── </a:t>
+            </a:r>
+            <a:r>
+              <a:rPr lang="en-US" dirty="0">
+                <a:solidFill>
+                  <a:schemeClr val="accent1"/>
+                </a:solidFill>
+              </a:rPr>
+              <a:t>cpuinfo</a:t>
+            </a:r>
+          </a:p>
+          <a:p>
+            <a:r>
+              <a:rPr lang="en-US" dirty="0" smtClean="0">
+                <a:solidFill>
+                  <a:schemeClr val="accent1"/>
+                </a:solidFill>
+              </a:rPr>
+              <a:t>├── ip</a:t>
+            </a:r>
+            <a:endParaRPr lang="en-US" dirty="0">
+              <a:solidFill>
+                <a:schemeClr val="accent1"/>
+              </a:solidFill>
+            </a:endParaRPr>
+          </a:p>
+          <a:p>
+            <a:r>
+              <a:rPr lang="en-US" dirty="0">
+                <a:solidFill>
+                  <a:schemeClr val="accent1"/>
+                </a:solidFill>
+              </a:rPr>
+              <a:t>├── …</a:t>
+            </a:r>
+          </a:p>
+          <a:p>
+            <a:r>
+              <a:rPr lang="en-US" dirty="0" smtClean="0">
+                <a:solidFill>
+                  <a:schemeClr val="accent1"/>
+                </a:solidFill>
+              </a:rPr>
+              <a:t>└── mkfs</a:t>
+            </a:r>
+            <a:endParaRPr lang="en-US" dirty="0">
+              <a:solidFill>
+                <a:schemeClr val="accent1"/>
+              </a:solidFill>
+            </a:endParaRPr>
+          </a:p>
+          <a:p>
+            <a:endParaRPr lang="en-US" dirty="0"/>
+          </a:p>
+          <a:p>
+            <a:endParaRPr lang="en-US" dirty="0">
+              <a:solidFill>
+                <a:schemeClr val="accent1"/>
+              </a:solidFill>
+            </a:endParaRPr>
+          </a:p>
+          <a:p>
+            <a:endParaRPr lang="en-US" dirty="0" smtClean="0">
+              <a:solidFill>
+                <a:schemeClr val="accent1"/>
+              </a:solidFill>
+            </a:endParaRPr>
+          </a:p>
+          <a:p>
+            <a:endParaRPr lang="en-US" dirty="0">
+              <a:solidFill>
+                <a:schemeClr val="accent1"/>
+              </a:solidFill>
+            </a:endParaRPr>
+          </a:p>
+          <a:p>
+            <a:endParaRPr lang="en-US" dirty="0"/>
+          </a:p>
+        </p:txBody>
+      </p:sp>
+      <p:sp>
+        <p:nvSpPr>
+          <p:cNvPr id="2" name="Rectangle 1"/>
+          <p:cNvSpPr/>
+          <p:nvPr/>
+        </p:nvSpPr>
+        <p:spPr>
+          <a:xfrm>
+            <a:off x="3352800" y="1143000"/>
+            <a:ext cx="8001000" cy="1754326"/>
+          </a:xfrm>
+          <a:prstGeom prst="rect">
+            <a:avLst/>
+          </a:prstGeom>
+        </p:spPr>
+        <p:txBody>
+          <a:bodyPr wrap="square">
+            <a:spAutoFit/>
+          </a:bodyPr>
+          <a:lstStyle/>
+          <a:p>
+            <a:pPr marL="285750" indent="-285750">
+              <a:buFont typeface="Arial" panose="020B0604020202020204" pitchFamily="34" charset="0"/>
+              <a:buChar char="•"/>
+            </a:pPr>
+            <a:r>
+              <a:rPr lang="en-US" dirty="0">
+                <a:solidFill>
+                  <a:schemeClr val="accent1"/>
+                </a:solidFill>
+              </a:rPr>
+              <a:t>/sbin is </a:t>
+            </a:r>
+            <a:r>
+              <a:rPr lang="en-US" dirty="0">
+                <a:solidFill>
+                  <a:schemeClr val="accent3"/>
+                </a:solidFill>
+              </a:rPr>
+              <a:t>similar</a:t>
+            </a:r>
+            <a:r>
+              <a:rPr lang="en-US" dirty="0">
+                <a:solidFill>
+                  <a:schemeClr val="accent1"/>
+                </a:solidFill>
+              </a:rPr>
+              <a:t> to </a:t>
+            </a:r>
+            <a:r>
+              <a:rPr lang="en-US" dirty="0">
+                <a:solidFill>
+                  <a:schemeClr val="accent3"/>
+                </a:solidFill>
+              </a:rPr>
+              <a:t>/bin</a:t>
+            </a:r>
+            <a:r>
+              <a:rPr lang="en-US" dirty="0">
+                <a:solidFill>
+                  <a:schemeClr val="accent1"/>
+                </a:solidFill>
+              </a:rPr>
+              <a:t>, but it contains applications that </a:t>
+            </a:r>
+            <a:r>
+              <a:rPr lang="en-US" dirty="0">
+                <a:solidFill>
+                  <a:schemeClr val="accent3"/>
+                </a:solidFill>
+              </a:rPr>
+              <a:t>only the superuser </a:t>
+            </a:r>
+            <a:r>
+              <a:rPr lang="en-US" dirty="0" smtClean="0">
+                <a:solidFill>
+                  <a:schemeClr val="accent1"/>
+                </a:solidFill>
+              </a:rPr>
+              <a:t>will </a:t>
+            </a:r>
+            <a:r>
+              <a:rPr lang="en-US" dirty="0">
+                <a:solidFill>
+                  <a:schemeClr val="accent1"/>
+                </a:solidFill>
+              </a:rPr>
+              <a:t>need. You can use these applications with the </a:t>
+            </a:r>
+            <a:r>
+              <a:rPr lang="en-US" dirty="0" smtClean="0">
+                <a:solidFill>
+                  <a:schemeClr val="accent1"/>
+                </a:solidFill>
+              </a:rPr>
+              <a:t>sudo  command.</a:t>
+            </a:r>
+          </a:p>
+          <a:p>
+            <a:pPr marL="285750" indent="-285750">
+              <a:buFont typeface="Arial" panose="020B0604020202020204" pitchFamily="34" charset="0"/>
+              <a:buChar char="•"/>
+            </a:pPr>
+            <a:endParaRPr lang="en-US" dirty="0">
+              <a:solidFill>
+                <a:schemeClr val="accent1"/>
+              </a:solidFill>
+            </a:endParaRPr>
+          </a:p>
+          <a:p>
+            <a:pPr marL="285750" indent="-285750">
+              <a:buFont typeface="Arial" panose="020B0604020202020204" pitchFamily="34" charset="0"/>
+              <a:buChar char="•"/>
+            </a:pPr>
+            <a:r>
+              <a:rPr lang="en-US" dirty="0" smtClean="0">
+                <a:solidFill>
+                  <a:schemeClr val="accent1"/>
+                </a:solidFill>
+              </a:rPr>
+              <a:t>/sbin files are not needed for start up.</a:t>
+            </a:r>
+          </a:p>
+          <a:p>
+            <a:pPr marL="285750" indent="-285750">
+              <a:buFont typeface="Arial" panose="020B0604020202020204" pitchFamily="34" charset="0"/>
+              <a:buChar char="•"/>
+            </a:pPr>
+            <a:endParaRPr lang="en-US" dirty="0">
+              <a:solidFill>
+                <a:schemeClr val="accent1"/>
+              </a:solidFill>
+            </a:endParaRPr>
+          </a:p>
+          <a:p>
+            <a:pPr marL="285750" indent="-285750">
+              <a:buFont typeface="Arial" panose="020B0604020202020204" pitchFamily="34" charset="0"/>
+              <a:buChar char="•"/>
+            </a:pPr>
+            <a:r>
+              <a:rPr lang="en-US" dirty="0" smtClean="0">
+                <a:solidFill>
+                  <a:schemeClr val="accent1"/>
+                </a:solidFill>
+              </a:rPr>
+              <a:t>Files in /sbin are usually used to configure the system. </a:t>
+            </a:r>
+          </a:p>
+        </p:txBody>
+      </p:sp>
+    </p:spTree>
+    <p:extLst>
+      <p:ext uri="{BB962C8B-B14F-4D97-AF65-F5344CB8AC3E}">
+        <p14:creationId xmlns:p14="http://schemas.microsoft.com/office/powerpoint/2010/main" val="3924909334"/>
       </p:ext>
     </p:extLst>
   </p:cSld>

</xml_diff>

<commit_message>
some instruction notes are added for history_of_linux, distributions, ubuntu_gui, linux_file_system
</commit_message>
<xml_diff>
--- a/PowerPoint/amirkabir_linux_festival.pptx
+++ b/PowerPoint/amirkabir_linux_festival.pptx
@@ -269,7 +269,7 @@
           <a:p>
             <a:fld id="{762B48F5-BACC-47D6-A0F7-82FBF9C6BC85}" type="datetimeFigureOut">
               <a:rPr lang="en-US"/>
-              <a:t>2/12/2020</a:t>
+              <a:t>2/16/2020</a:t>
             </a:fld>
             <a:endParaRPr/>
           </a:p>
@@ -434,7 +434,7 @@
           <a:p>
             <a:fld id="{0CB1CD00-5424-4675-AB18-2C419B060449}" type="datetimeFigureOut">
               <a:rPr lang="en-US"/>
-              <a:t>2/12/2020</a:t>
+              <a:t>2/16/2020</a:t>
             </a:fld>
             <a:endParaRPr/>
           </a:p>
@@ -1085,7 +1085,7 @@
           <a:p>
             <a:fld id="{37CC0096-1860-4642-9CD2-0079EA5E7CD1}" type="datetimeFigureOut">
               <a:rPr lang="en-US" smtClean="0"/>
-              <a:t>2/12/2020</a:t>
+              <a:t>2/16/2020</a:t>
             </a:fld>
             <a:endParaRPr lang="en-US"/>
           </a:p>
@@ -1265,7 +1265,7 @@
           <a:p>
             <a:fld id="{37CC0096-1860-4642-9CD2-0079EA5E7CD1}" type="datetimeFigureOut">
               <a:rPr lang="en-US" smtClean="0"/>
-              <a:t>2/12/2020</a:t>
+              <a:t>2/16/2020</a:t>
             </a:fld>
             <a:endParaRPr lang="en-US"/>
           </a:p>
@@ -1439,7 +1439,7 @@
           <a:p>
             <a:fld id="{37CC0096-1860-4642-9CD2-0079EA5E7CD1}" type="datetimeFigureOut">
               <a:rPr lang="en-US" smtClean="0"/>
-              <a:t>2/12/2020</a:t>
+              <a:t>2/16/2020</a:t>
             </a:fld>
             <a:endParaRPr lang="en-US"/>
           </a:p>
@@ -1874,7 +1874,7 @@
           <a:p>
             <a:fld id="{37CC0096-1860-4642-9CD2-0079EA5E7CD1}" type="datetimeFigureOut">
               <a:rPr lang="en-US" smtClean="0"/>
-              <a:t>2/12/2020</a:t>
+              <a:t>2/16/2020</a:t>
             </a:fld>
             <a:endParaRPr lang="en-US"/>
           </a:p>
@@ -2314,7 +2314,7 @@
           <a:p>
             <a:fld id="{37CC0096-1860-4642-9CD2-0079EA5E7CD1}" type="datetimeFigureOut">
               <a:rPr lang="en-US" smtClean="0"/>
-              <a:t>2/12/2020</a:t>
+              <a:t>2/16/2020</a:t>
             </a:fld>
             <a:endParaRPr lang="en-US"/>
           </a:p>
@@ -2432,7 +2432,7 @@
           <a:p>
             <a:fld id="{37CC0096-1860-4642-9CD2-0079EA5E7CD1}" type="datetimeFigureOut">
               <a:rPr lang="en-US" smtClean="0"/>
-              <a:t>2/12/2020</a:t>
+              <a:t>2/16/2020</a:t>
             </a:fld>
             <a:endParaRPr lang="en-US"/>
           </a:p>
@@ -2527,7 +2527,7 @@
           <a:p>
             <a:fld id="{37CC0096-1860-4642-9CD2-0079EA5E7CD1}" type="datetimeFigureOut">
               <a:rPr lang="en-US" smtClean="0"/>
-              <a:t>2/12/2020</a:t>
+              <a:t>2/16/2020</a:t>
             </a:fld>
             <a:endParaRPr lang="en-US"/>
           </a:p>
@@ -2811,7 +2811,7 @@
           <a:p>
             <a:fld id="{37CC0096-1860-4642-9CD2-0079EA5E7CD1}" type="datetimeFigureOut">
               <a:rPr lang="en-US" smtClean="0"/>
-              <a:t>2/12/2020</a:t>
+              <a:t>2/16/2020</a:t>
             </a:fld>
             <a:endParaRPr lang="en-US"/>
           </a:p>
@@ -3124,7 +3124,7 @@
           <a:p>
             <a:fld id="{37CC0096-1860-4642-9CD2-0079EA5E7CD1}" type="datetimeFigureOut">
               <a:rPr lang="en-US" smtClean="0"/>
-              <a:t>2/12/2020</a:t>
+              <a:t>2/16/2020</a:t>
             </a:fld>
             <a:endParaRPr lang="en-US"/>
           </a:p>
@@ -3356,7 +3356,7 @@
             <a:fld id="{37CC0096-1860-4642-9CD2-0079EA5E7CD1}" type="datetimeFigureOut">
               <a:rPr lang="en-US" smtClean="0"/>
               <a:pPr/>
-              <a:t>2/12/2020</a:t>
+              <a:t>2/16/2020</a:t>
             </a:fld>
             <a:endParaRPr lang="en-US"/>
           </a:p>
@@ -11395,6 +11395,13 @@
   <p:clrMapOvr>
     <a:masterClrMapping/>
   </p:clrMapOvr>
+  <p:timing>
+    <p:tnLst>
+      <p:par>
+        <p:cTn id="1" dur="indefinite" restart="never" nodeType="tmRoot"/>
+      </p:par>
+    </p:tnLst>
+  </p:timing>
 </p:sld>
 </file>
 
@@ -11714,6 +11721,13 @@
   <p:clrMapOvr>
     <a:masterClrMapping/>
   </p:clrMapOvr>
+  <p:timing>
+    <p:tnLst>
+      <p:par>
+        <p:cTn id="1" dur="indefinite" restart="never" nodeType="tmRoot"/>
+      </p:par>
+    </p:tnLst>
+  </p:timing>
 </p:sld>
 </file>
 
@@ -11756,12 +11770,20 @@
           <a:p>
             <a:pPr algn="ctr"/>
             <a:r>
-              <a:rPr lang="en-US" dirty="0" smtClean="0">
+              <a:rPr lang="en-US" dirty="0">
                 <a:solidFill>
                   <a:schemeClr val="accent5"/>
                 </a:solidFill>
               </a:rPr>
-              <a:t>Linux_filesystem</a:t>
+              <a:t>l</a:t>
+            </a:r>
+            <a:r>
+              <a:rPr lang="en-US" dirty="0" smtClean="0">
+                <a:solidFill>
+                  <a:schemeClr val="accent5"/>
+                </a:solidFill>
+              </a:rPr>
+              <a:t>inux_filesystem</a:t>
             </a:r>
             <a:endParaRPr lang="en-US" dirty="0">
               <a:solidFill>
@@ -22919,7 +22941,31 @@
             </a:pPr>
             <a:r>
               <a:rPr lang="en-US" dirty="0" smtClean="0"/>
-              <a:t>BSD (Berkeley Software Distribution) was the first major variant of unix created at University of California at Berkeley.</a:t>
+              <a:t>BSD (Berkeley Software Distribution) was </a:t>
+            </a:r>
+            <a:r>
+              <a:rPr lang="en-US" dirty="0" smtClean="0">
+                <a:solidFill>
+                  <a:schemeClr val="accent3"/>
+                </a:solidFill>
+              </a:rPr>
+              <a:t>the first major variant</a:t>
+            </a:r>
+            <a:r>
+              <a:rPr lang="en-US" dirty="0" smtClean="0"/>
+              <a:t> of unix created at </a:t>
+            </a:r>
+            <a:r>
+              <a:rPr lang="en-US" dirty="0" smtClean="0">
+                <a:solidFill>
+                  <a:schemeClr val="accent3"/>
+                </a:solidFill>
+              </a:rPr>
+              <a:t>University of California at Berkeley</a:t>
+            </a:r>
+            <a:r>
+              <a:rPr lang="en-US" dirty="0" smtClean="0"/>
+              <a:t>.</a:t>
             </a:r>
           </a:p>
           <a:p>
@@ -22975,12 +23021,20 @@
                   <a:schemeClr val="accent1"/>
                 </a:solidFill>
               </a:rPr>
-              <a:t>. BSD continued forward in the </a:t>
-            </a:r>
-            <a:r>
-              <a:rPr lang="en-US" dirty="0" smtClean="0">
-                <a:solidFill>
-                  <a:schemeClr val="accent1"/>
+              <a:t>. </a:t>
+            </a:r>
+            <a:r>
+              <a:rPr lang="en-US" dirty="0">
+                <a:solidFill>
+                  <a:schemeClr val="accent3"/>
+                </a:solidFill>
+              </a:rPr>
+              <a:t>BSD continued forward in the </a:t>
+            </a:r>
+            <a:r>
+              <a:rPr lang="en-US" dirty="0" smtClean="0">
+                <a:solidFill>
+                  <a:schemeClr val="accent3"/>
                 </a:solidFill>
               </a:rPr>
               <a:t>free-ﬂowing</a:t>
@@ -22991,7 +23045,23 @@
                   <a:schemeClr val="accent1"/>
                 </a:solidFill>
               </a:rPr>
-              <a:t>, share-the-code manner that </a:t>
+              <a:t>, </a:t>
+            </a:r>
+            <a:r>
+              <a:rPr lang="en-US" dirty="0">
+                <a:solidFill>
+                  <a:schemeClr val="accent3"/>
+                </a:solidFill>
+              </a:rPr>
+              <a:t>share-the-code manne</a:t>
+            </a:r>
+            <a:r>
+              <a:rPr lang="en-US" dirty="0">
+                <a:solidFill>
+                  <a:schemeClr val="accent1"/>
+                </a:solidFill>
+              </a:rPr>
+              <a:t>r that </a:t>
             </a:r>
             <a:r>
               <a:rPr lang="en-US" dirty="0" smtClean="0">
@@ -23007,19 +23077,43 @@
                   <a:schemeClr val="accent1"/>
                 </a:solidFill>
               </a:rPr>
-              <a:t>hallmark of the early Bell Labs UNIX, whereas AT&amp;T started steering UNIX </a:t>
-            </a:r>
-            <a:r>
-              <a:rPr lang="en-US" dirty="0" smtClean="0">
-                <a:solidFill>
-                  <a:schemeClr val="accent1"/>
-                </a:solidFill>
-              </a:rPr>
-              <a:t>toward  commercialization</a:t>
+              <a:t>hallmark of the early Bell Labs UNIX, whereas </a:t>
+            </a:r>
+            <a:r>
+              <a:rPr lang="en-US" dirty="0">
+                <a:solidFill>
+                  <a:schemeClr val="accent3"/>
+                </a:solidFill>
+              </a:rPr>
+              <a:t>AT&amp;T</a:t>
+            </a:r>
+            <a:r>
+              <a:rPr lang="en-US" dirty="0">
+                <a:solidFill>
+                  <a:schemeClr val="accent1"/>
+                </a:solidFill>
+              </a:rPr>
+              <a:t> started steering UNIX </a:t>
+            </a:r>
+            <a:r>
+              <a:rPr lang="en-US" dirty="0" smtClean="0">
+                <a:solidFill>
+                  <a:schemeClr val="accent1"/>
+                </a:solidFill>
+              </a:rPr>
+              <a:t>toward  </a:t>
+            </a:r>
+            <a:r>
+              <a:rPr lang="en-US" dirty="0" smtClean="0">
+                <a:solidFill>
+                  <a:schemeClr val="accent3"/>
+                </a:solidFill>
+              </a:rPr>
+              <a:t>commercialization</a:t>
             </a:r>
             <a:endParaRPr lang="en-US" dirty="0">
               <a:solidFill>
-                <a:schemeClr val="accent1"/>
+                <a:schemeClr val="accent3"/>
               </a:solidFill>
             </a:endParaRPr>
           </a:p>
@@ -23456,7 +23550,15 @@
                   <a:schemeClr val="accent1"/>
                 </a:solidFill>
               </a:rPr>
-              <a:t>By 1990, the GNU system was almost complete; the only major missing component was the kernel</a:t>
+              <a:t>By 1990, the GNU system was almost complete; the only </a:t>
+            </a:r>
+            <a:r>
+              <a:rPr lang="en-US" dirty="0">
+                <a:solidFill>
+                  <a:schemeClr val="accent3"/>
+                </a:solidFill>
+              </a:rPr>
+              <a:t>major missing component was the kernel</a:t>
             </a:r>
             <a:r>
               <a:rPr lang="en-US" dirty="0" smtClean="0">
@@ -23473,11 +23575,56 @@
                 </a:solidFill>
                 <a:latin typeface="Arial" panose="020B0604020202020204" pitchFamily="34" charset="0"/>
               </a:rPr>
-              <a:t>Initially the components required for kernel development were written: editors, shell, compiler</a:t>
+              <a:t>Initially the components required for kernel development were written: </a:t>
+            </a:r>
+            <a:r>
+              <a:rPr lang="en-US" dirty="0">
+                <a:solidFill>
+                  <a:schemeClr val="accent3"/>
+                </a:solidFill>
+                <a:latin typeface="Arial" panose="020B0604020202020204" pitchFamily="34" charset="0"/>
+              </a:rPr>
+              <a:t>editors</a:t>
+            </a:r>
+            <a:r>
+              <a:rPr lang="en-US" dirty="0">
+                <a:solidFill>
+                  <a:schemeClr val="accent1"/>
+                </a:solidFill>
+                <a:latin typeface="Arial" panose="020B0604020202020204" pitchFamily="34" charset="0"/>
+              </a:rPr>
+              <a:t>, </a:t>
+            </a:r>
+            <a:r>
+              <a:rPr lang="en-US" dirty="0">
+                <a:solidFill>
+                  <a:schemeClr val="accent3"/>
+                </a:solidFill>
+                <a:latin typeface="Arial" panose="020B0604020202020204" pitchFamily="34" charset="0"/>
+              </a:rPr>
+              <a:t>shell</a:t>
+            </a:r>
+            <a:r>
+              <a:rPr lang="en-US" dirty="0">
+                <a:solidFill>
+                  <a:schemeClr val="accent1"/>
+                </a:solidFill>
+                <a:latin typeface="Arial" panose="020B0604020202020204" pitchFamily="34" charset="0"/>
+              </a:rPr>
+              <a:t>, </a:t>
+            </a:r>
+            <a:r>
+              <a:rPr lang="en-US" dirty="0">
+                <a:solidFill>
+                  <a:schemeClr val="accent3"/>
+                </a:solidFill>
+                <a:latin typeface="Arial" panose="020B0604020202020204" pitchFamily="34" charset="0"/>
+              </a:rPr>
+              <a:t>compiler</a:t>
             </a:r>
             <a:endParaRPr lang="en-US" dirty="0">
               <a:solidFill>
-                <a:schemeClr val="accent1"/>
+                <a:schemeClr val="accent3"/>
               </a:solidFill>
             </a:endParaRPr>
           </a:p>
@@ -23598,14 +23745,14 @@
           </a:bodyPr>
           <a:lstStyle/>
           <a:p>
-            <a:pPr marL="285750" indent="-285750">
+            <a:pPr marL="285750" indent="-285750" algn="r">
               <a:buFont typeface="Arial" panose="020B0604020202020204" pitchFamily="34" charset="0"/>
               <a:buChar char="•"/>
             </a:pPr>
             <a:r>
               <a:rPr lang="en-US" altLang="en-US" dirty="0" smtClean="0">
                 <a:solidFill>
-                  <a:schemeClr val="accent1"/>
+                  <a:schemeClr val="accent3"/>
                 </a:solidFill>
               </a:rPr>
               <a:t>GNU/Hurd was </a:t>
@@ -23613,7 +23760,7 @@
             <a:r>
               <a:rPr lang="en-US" altLang="en-US" dirty="0">
                 <a:solidFill>
-                  <a:schemeClr val="accent1"/>
+                  <a:schemeClr val="accent3"/>
                 </a:solidFill>
               </a:rPr>
               <a:t>not successful</a:t>

</xml_diff>